<commit_message>
Added more diagrams to powerpoint
</commit_message>
<xml_diff>
--- a/Resistance_Model_Diagram.pptx
+++ b/Resistance_Model_Diagram.pptx
@@ -7,6 +7,7 @@
   <p:sldIdLst>
     <p:sldId id="256" r:id="rId2"/>
     <p:sldId id="257" r:id="rId3"/>
+    <p:sldId id="258" r:id="rId4"/>
   </p:sldIdLst>
   <p:sldSz cx="12192000" cy="6858000"/>
   <p:notesSz cx="6858000" cy="9144000"/>
@@ -105,6 +106,11 @@
       </a:defRPr>
     </a:lvl9pPr>
   </p:defaultTextStyle>
+  <p:extLst>
+    <p:ext uri="{EFAFB233-063F-42B5-8137-9DF3F51BA10A}">
+      <p15:sldGuideLst xmlns:p15="http://schemas.microsoft.com/office/powerpoint/2012/main"/>
+    </p:ext>
+  </p:extLst>
 </p:presentation>
 </file>
 
@@ -3646,7 +3652,7 @@
             <a:p>
               <a:r>
                 <a:rPr lang="en-GB" dirty="0"/>
-                <a:t>Death</a:t>
+                <a:t> Dead</a:t>
               </a:r>
             </a:p>
           </p:txBody>
@@ -5607,10 +5613,10 @@
       </p:grpSp>
       <p:grpSp>
         <p:nvGrpSpPr>
-          <p:cNvPr id="83" name="Group 82">
-            <a:extLst>
-              <a:ext uri="{FF2B5EF4-FFF2-40B4-BE49-F238E27FC236}">
-                <a16:creationId xmlns:a16="http://schemas.microsoft.com/office/drawing/2014/main" id="{A3FAA0ED-FB08-4495-ADBA-EFF812E7F11E}"/>
+          <p:cNvPr id="2" name="Group 1">
+            <a:extLst>
+              <a:ext uri="{FF2B5EF4-FFF2-40B4-BE49-F238E27FC236}">
+                <a16:creationId xmlns:a16="http://schemas.microsoft.com/office/drawing/2014/main" id="{AC148486-A8BE-48DE-A487-69851E88ADE8}"/>
               </a:ext>
             </a:extLst>
           </p:cNvPr>
@@ -5619,30 +5625,333 @@
         </p:nvGrpSpPr>
         <p:grpSpPr>
           <a:xfrm>
-            <a:off x="8818647" y="232059"/>
-            <a:ext cx="2852407" cy="1477328"/>
-            <a:chOff x="7353775" y="157018"/>
-            <a:chExt cx="2852407" cy="1477328"/>
+            <a:off x="9102207" y="146471"/>
+            <a:ext cx="2852407" cy="1754326"/>
+            <a:chOff x="8818647" y="232059"/>
+            <a:chExt cx="2852407" cy="1754326"/>
           </a:xfrm>
         </p:grpSpPr>
-        <p:sp>
-          <p:nvSpPr>
-            <p:cNvPr id="78" name="TextBox 77">
+        <p:grpSp>
+          <p:nvGrpSpPr>
+            <p:cNvPr id="83" name="Group 82">
               <a:extLst>
                 <a:ext uri="{FF2B5EF4-FFF2-40B4-BE49-F238E27FC236}">
-                  <a16:creationId xmlns:a16="http://schemas.microsoft.com/office/drawing/2014/main" id="{D8EC32A6-70C8-4E57-AD4F-BFFAFFADD17D}"/>
+                  <a16:creationId xmlns:a16="http://schemas.microsoft.com/office/drawing/2014/main" id="{A3FAA0ED-FB08-4495-ADBA-EFF812E7F11E}"/>
                 </a:ext>
               </a:extLst>
             </p:cNvPr>
-            <p:cNvSpPr txBox="1"/>
+            <p:cNvGrpSpPr/>
+            <p:nvPr/>
+          </p:nvGrpSpPr>
+          <p:grpSpPr>
+            <a:xfrm>
+              <a:off x="8818647" y="232059"/>
+              <a:ext cx="2852407" cy="1754326"/>
+              <a:chOff x="7353775" y="157018"/>
+              <a:chExt cx="2852407" cy="1754326"/>
+            </a:xfrm>
+          </p:grpSpPr>
+          <p:sp>
+            <p:nvSpPr>
+              <p:cNvPr id="78" name="TextBox 77">
+                <a:extLst>
+                  <a:ext uri="{FF2B5EF4-FFF2-40B4-BE49-F238E27FC236}">
+                    <a16:creationId xmlns:a16="http://schemas.microsoft.com/office/drawing/2014/main" id="{D8EC32A6-70C8-4E57-AD4F-BFFAFFADD17D}"/>
+                  </a:ext>
+                </a:extLst>
+              </p:cNvPr>
+              <p:cNvSpPr txBox="1"/>
+              <p:nvPr/>
+            </p:nvSpPr>
+            <p:spPr>
+              <a:xfrm>
+                <a:off x="7353775" y="157018"/>
+                <a:ext cx="2852407" cy="1754326"/>
+              </a:xfrm>
+              <a:prstGeom prst="rect">
+                <a:avLst/>
+              </a:prstGeom>
+            </p:spPr>
+            <p:style>
+              <a:lnRef idx="2">
+                <a:schemeClr val="dk1"/>
+              </a:lnRef>
+              <a:fillRef idx="1">
+                <a:schemeClr val="lt1"/>
+              </a:fillRef>
+              <a:effectRef idx="0">
+                <a:schemeClr val="dk1"/>
+              </a:effectRef>
+              <a:fontRef idx="minor">
+                <a:schemeClr val="dk1"/>
+              </a:fontRef>
+            </p:style>
+            <p:txBody>
+              <a:bodyPr wrap="square" rtlCol="0">
+                <a:spAutoFit/>
+              </a:bodyPr>
+              <a:lstStyle/>
+              <a:p>
+                <a:r>
+                  <a:rPr lang="en-GB" dirty="0"/>
+                  <a:t>Types of transition:</a:t>
+                </a:r>
+              </a:p>
+              <a:p>
+                <a:pPr marL="285750" indent="-285750">
+                  <a:buFont typeface="Arial" panose="020B0604020202020204" pitchFamily="34" charset="0"/>
+                  <a:buChar char="•"/>
+                </a:pPr>
+                <a:r>
+                  <a:rPr lang="en-GB" dirty="0"/>
+                  <a:t>Death         -</a:t>
+                </a:r>
+              </a:p>
+              <a:p>
+                <a:pPr marL="285750" indent="-285750">
+                  <a:buFont typeface="Arial" panose="020B0604020202020204" pitchFamily="34" charset="0"/>
+                  <a:buChar char="•"/>
+                </a:pPr>
+                <a:r>
+                  <a:rPr lang="en-GB" dirty="0"/>
+                  <a:t>Spread       -</a:t>
+                </a:r>
+              </a:p>
+              <a:p>
+                <a:pPr marL="285750" indent="-285750">
+                  <a:buFont typeface="Arial" panose="020B0604020202020204" pitchFamily="34" charset="0"/>
+                  <a:buChar char="•"/>
+                </a:pPr>
+                <a:r>
+                  <a:rPr lang="en-GB" dirty="0"/>
+                  <a:t>Recovery   -</a:t>
+                </a:r>
+              </a:p>
+              <a:p>
+                <a:pPr marL="285750" indent="-285750">
+                  <a:buFont typeface="Arial" panose="020B0604020202020204" pitchFamily="34" charset="0"/>
+                  <a:buChar char="•"/>
+                </a:pPr>
+                <a:r>
+                  <a:rPr lang="en-GB" dirty="0"/>
+                  <a:t>Mutation   -</a:t>
+                </a:r>
+              </a:p>
+              <a:p>
+                <a:pPr marL="285750" indent="-285750">
+                  <a:buFont typeface="Arial" panose="020B0604020202020204" pitchFamily="34" charset="0"/>
+                  <a:buChar char="•"/>
+                </a:pPr>
+                <a:r>
+                  <a:rPr lang="en-GB" dirty="0"/>
+                  <a:t>No change - </a:t>
+                </a:r>
+              </a:p>
+            </p:txBody>
+          </p:sp>
+          <p:sp>
+            <p:nvSpPr>
+              <p:cNvPr id="79" name="Rectangle 78">
+                <a:extLst>
+                  <a:ext uri="{FF2B5EF4-FFF2-40B4-BE49-F238E27FC236}">
+                    <a16:creationId xmlns:a16="http://schemas.microsoft.com/office/drawing/2014/main" id="{64DE77D6-4E8F-463F-931A-F7D14808EEEA}"/>
+                  </a:ext>
+                </a:extLst>
+              </p:cNvPr>
+              <p:cNvSpPr/>
+              <p:nvPr/>
+            </p:nvSpPr>
+            <p:spPr>
+              <a:xfrm>
+                <a:off x="8859792" y="554243"/>
+                <a:ext cx="958463" cy="111471"/>
+              </a:xfrm>
+              <a:prstGeom prst="rect">
+                <a:avLst/>
+              </a:prstGeom>
+            </p:spPr>
+            <p:style>
+              <a:lnRef idx="2">
+                <a:schemeClr val="accent2">
+                  <a:shade val="50000"/>
+                </a:schemeClr>
+              </a:lnRef>
+              <a:fillRef idx="1">
+                <a:schemeClr val="accent2"/>
+              </a:fillRef>
+              <a:effectRef idx="0">
+                <a:schemeClr val="accent2"/>
+              </a:effectRef>
+              <a:fontRef idx="minor">
+                <a:schemeClr val="lt1"/>
+              </a:fontRef>
+            </p:style>
+            <p:txBody>
+              <a:bodyPr rtlCol="0" anchor="ctr"/>
+              <a:lstStyle/>
+              <a:p>
+                <a:pPr algn="ctr"/>
+                <a:endParaRPr lang="en-GB"/>
+              </a:p>
+            </p:txBody>
+          </p:sp>
+          <p:sp>
+            <p:nvSpPr>
+              <p:cNvPr id="80" name="Rectangle 79">
+                <a:extLst>
+                  <a:ext uri="{FF2B5EF4-FFF2-40B4-BE49-F238E27FC236}">
+                    <a16:creationId xmlns:a16="http://schemas.microsoft.com/office/drawing/2014/main" id="{1A98B002-80C8-424D-90D5-BD7979977AEF}"/>
+                  </a:ext>
+                </a:extLst>
+              </p:cNvPr>
+              <p:cNvSpPr/>
+              <p:nvPr/>
+            </p:nvSpPr>
+            <p:spPr>
+              <a:xfrm>
+                <a:off x="8859791" y="848577"/>
+                <a:ext cx="958463" cy="111471"/>
+              </a:xfrm>
+              <a:prstGeom prst="rect">
+                <a:avLst/>
+              </a:prstGeom>
+            </p:spPr>
+            <p:style>
+              <a:lnRef idx="2">
+                <a:schemeClr val="accent3">
+                  <a:shade val="50000"/>
+                </a:schemeClr>
+              </a:lnRef>
+              <a:fillRef idx="1">
+                <a:schemeClr val="accent3"/>
+              </a:fillRef>
+              <a:effectRef idx="0">
+                <a:schemeClr val="accent3"/>
+              </a:effectRef>
+              <a:fontRef idx="minor">
+                <a:schemeClr val="lt1"/>
+              </a:fontRef>
+            </p:style>
+            <p:txBody>
+              <a:bodyPr rtlCol="0" anchor="ctr"/>
+              <a:lstStyle/>
+              <a:p>
+                <a:pPr algn="ctr"/>
+                <a:endParaRPr lang="en-GB"/>
+              </a:p>
+            </p:txBody>
+          </p:sp>
+          <p:sp>
+            <p:nvSpPr>
+              <p:cNvPr id="81" name="Rectangle 80">
+                <a:extLst>
+                  <a:ext uri="{FF2B5EF4-FFF2-40B4-BE49-F238E27FC236}">
+                    <a16:creationId xmlns:a16="http://schemas.microsoft.com/office/drawing/2014/main" id="{BC82A7DE-86A2-4F01-9AA8-88BEBD534AEB}"/>
+                  </a:ext>
+                </a:extLst>
+              </p:cNvPr>
+              <p:cNvSpPr/>
+              <p:nvPr/>
+            </p:nvSpPr>
+            <p:spPr>
+              <a:xfrm>
+                <a:off x="8859790" y="1134432"/>
+                <a:ext cx="958463" cy="111471"/>
+              </a:xfrm>
+              <a:prstGeom prst="rect">
+                <a:avLst/>
+              </a:prstGeom>
+            </p:spPr>
+            <p:style>
+              <a:lnRef idx="2">
+                <a:schemeClr val="accent6">
+                  <a:shade val="50000"/>
+                </a:schemeClr>
+              </a:lnRef>
+              <a:fillRef idx="1">
+                <a:schemeClr val="accent6"/>
+              </a:fillRef>
+              <a:effectRef idx="0">
+                <a:schemeClr val="accent6"/>
+              </a:effectRef>
+              <a:fontRef idx="minor">
+                <a:schemeClr val="lt1"/>
+              </a:fontRef>
+            </p:style>
+            <p:txBody>
+              <a:bodyPr rtlCol="0" anchor="ctr"/>
+              <a:lstStyle/>
+              <a:p>
+                <a:pPr algn="ctr"/>
+                <a:endParaRPr lang="en-GB"/>
+              </a:p>
+            </p:txBody>
+          </p:sp>
+          <p:sp>
+            <p:nvSpPr>
+              <p:cNvPr id="82" name="Rectangle 81">
+                <a:extLst>
+                  <a:ext uri="{FF2B5EF4-FFF2-40B4-BE49-F238E27FC236}">
+                    <a16:creationId xmlns:a16="http://schemas.microsoft.com/office/drawing/2014/main" id="{51988EDD-5CBB-48EC-9BC8-60C3D7619AAB}"/>
+                  </a:ext>
+                </a:extLst>
+              </p:cNvPr>
+              <p:cNvSpPr/>
+              <p:nvPr/>
+            </p:nvSpPr>
+            <p:spPr>
+              <a:xfrm>
+                <a:off x="8859790" y="1402050"/>
+                <a:ext cx="958463" cy="111471"/>
+              </a:xfrm>
+              <a:prstGeom prst="rect">
+                <a:avLst/>
+              </a:prstGeom>
+            </p:spPr>
+            <p:style>
+              <a:lnRef idx="2">
+                <a:schemeClr val="accent5">
+                  <a:shade val="50000"/>
+                </a:schemeClr>
+              </a:lnRef>
+              <a:fillRef idx="1">
+                <a:schemeClr val="accent5"/>
+              </a:fillRef>
+              <a:effectRef idx="0">
+                <a:schemeClr val="accent5"/>
+              </a:effectRef>
+              <a:fontRef idx="minor">
+                <a:schemeClr val="lt1"/>
+              </a:fontRef>
+            </p:style>
+            <p:txBody>
+              <a:bodyPr rtlCol="0" anchor="ctr"/>
+              <a:lstStyle/>
+              <a:p>
+                <a:pPr algn="ctr"/>
+                <a:endParaRPr lang="en-GB"/>
+              </a:p>
+            </p:txBody>
+          </p:sp>
+        </p:grpSp>
+        <p:sp>
+          <p:nvSpPr>
+            <p:cNvPr id="84" name="Arrow: Curved Right 83">
+              <a:extLst>
+                <a:ext uri="{FF2B5EF4-FFF2-40B4-BE49-F238E27FC236}">
+                  <a16:creationId xmlns:a16="http://schemas.microsoft.com/office/drawing/2014/main" id="{8A6DCBDE-5063-4B1C-AFDB-ABEEB51C72CB}"/>
+                </a:ext>
+              </a:extLst>
+            </p:cNvPr>
+            <p:cNvSpPr/>
             <p:nvPr/>
           </p:nvSpPr>
           <p:spPr>
-            <a:xfrm>
-              <a:off x="7353775" y="157018"/>
-              <a:ext cx="2852407" cy="1477328"/>
+            <a:xfrm rot="5400000">
+              <a:off x="10681394" y="1669326"/>
+              <a:ext cx="252000" cy="252000"/>
             </a:xfrm>
-            <a:prstGeom prst="rect">
+            <a:prstGeom prst="curvedRightArrow">
               <a:avLst/>
             </a:prstGeom>
           </p:spPr>
@@ -5661,239 +5970,15 @@
             </a:fontRef>
           </p:style>
           <p:txBody>
-            <a:bodyPr wrap="square" rtlCol="0">
-              <a:spAutoFit/>
-            </a:bodyPr>
-            <a:lstStyle/>
-            <a:p>
-              <a:r>
-                <a:rPr lang="en-GB" dirty="0"/>
-                <a:t>Types of transition:</a:t>
-              </a:r>
-            </a:p>
-            <a:p>
-              <a:pPr marL="285750" indent="-285750">
-                <a:buFont typeface="Arial" panose="020B0604020202020204" pitchFamily="34" charset="0"/>
-                <a:buChar char="•"/>
-              </a:pPr>
-              <a:r>
-                <a:rPr lang="en-GB" dirty="0"/>
-                <a:t>Death        -</a:t>
-              </a:r>
-            </a:p>
-            <a:p>
-              <a:pPr marL="285750" indent="-285750">
-                <a:buFont typeface="Arial" panose="020B0604020202020204" pitchFamily="34" charset="0"/>
-                <a:buChar char="•"/>
-              </a:pPr>
-              <a:r>
-                <a:rPr lang="en-GB" dirty="0"/>
-                <a:t>Spread      -</a:t>
-              </a:r>
-            </a:p>
-            <a:p>
-              <a:pPr marL="285750" indent="-285750">
-                <a:buFont typeface="Arial" panose="020B0604020202020204" pitchFamily="34" charset="0"/>
-                <a:buChar char="•"/>
-              </a:pPr>
-              <a:r>
-                <a:rPr lang="en-GB" dirty="0"/>
-                <a:t>Recovery  -</a:t>
-              </a:r>
-            </a:p>
-            <a:p>
-              <a:pPr marL="285750" indent="-285750">
-                <a:buFont typeface="Arial" panose="020B0604020202020204" pitchFamily="34" charset="0"/>
-                <a:buChar char="•"/>
-              </a:pPr>
-              <a:r>
-                <a:rPr lang="en-GB" dirty="0"/>
-                <a:t>Mutation  -</a:t>
-              </a:r>
-            </a:p>
-          </p:txBody>
-        </p:sp>
-        <p:sp>
-          <p:nvSpPr>
-            <p:cNvPr id="79" name="Rectangle 78">
-              <a:extLst>
-                <a:ext uri="{FF2B5EF4-FFF2-40B4-BE49-F238E27FC236}">
-                  <a16:creationId xmlns:a16="http://schemas.microsoft.com/office/drawing/2014/main" id="{64DE77D6-4E8F-463F-931A-F7D14808EEEA}"/>
-                </a:ext>
-              </a:extLst>
-            </p:cNvPr>
-            <p:cNvSpPr/>
-            <p:nvPr/>
-          </p:nvSpPr>
-          <p:spPr>
-            <a:xfrm>
-              <a:off x="8859792" y="554243"/>
-              <a:ext cx="958463" cy="111471"/>
-            </a:xfrm>
-            <a:prstGeom prst="rect">
-              <a:avLst/>
-            </a:prstGeom>
-          </p:spPr>
-          <p:style>
-            <a:lnRef idx="2">
-              <a:schemeClr val="accent2">
-                <a:shade val="50000"/>
-              </a:schemeClr>
-            </a:lnRef>
-            <a:fillRef idx="1">
-              <a:schemeClr val="accent2"/>
-            </a:fillRef>
-            <a:effectRef idx="0">
-              <a:schemeClr val="accent2"/>
-            </a:effectRef>
-            <a:fontRef idx="minor">
-              <a:schemeClr val="lt1"/>
-            </a:fontRef>
-          </p:style>
-          <p:txBody>
             <a:bodyPr rtlCol="0" anchor="ctr"/>
             <a:lstStyle/>
             <a:p>
               <a:pPr algn="ctr"/>
-              <a:endParaRPr lang="en-GB"/>
-            </a:p>
-          </p:txBody>
-        </p:sp>
-        <p:sp>
-          <p:nvSpPr>
-            <p:cNvPr id="80" name="Rectangle 79">
-              <a:extLst>
-                <a:ext uri="{FF2B5EF4-FFF2-40B4-BE49-F238E27FC236}">
-                  <a16:creationId xmlns:a16="http://schemas.microsoft.com/office/drawing/2014/main" id="{1A98B002-80C8-424D-90D5-BD7979977AEF}"/>
-                </a:ext>
-              </a:extLst>
-            </p:cNvPr>
-            <p:cNvSpPr/>
-            <p:nvPr/>
-          </p:nvSpPr>
-          <p:spPr>
-            <a:xfrm>
-              <a:off x="8859791" y="848577"/>
-              <a:ext cx="958463" cy="111471"/>
-            </a:xfrm>
-            <a:prstGeom prst="rect">
-              <a:avLst/>
-            </a:prstGeom>
-          </p:spPr>
-          <p:style>
-            <a:lnRef idx="2">
-              <a:schemeClr val="accent3">
-                <a:shade val="50000"/>
-              </a:schemeClr>
-            </a:lnRef>
-            <a:fillRef idx="1">
-              <a:schemeClr val="accent3"/>
-            </a:fillRef>
-            <a:effectRef idx="0">
-              <a:schemeClr val="accent3"/>
-            </a:effectRef>
-            <a:fontRef idx="minor">
-              <a:schemeClr val="lt1"/>
-            </a:fontRef>
-          </p:style>
-          <p:txBody>
-            <a:bodyPr rtlCol="0" anchor="ctr"/>
-            <a:lstStyle/>
-            <a:p>
-              <a:pPr algn="ctr"/>
-              <a:endParaRPr lang="en-GB"/>
-            </a:p>
-          </p:txBody>
-        </p:sp>
-        <p:sp>
-          <p:nvSpPr>
-            <p:cNvPr id="81" name="Rectangle 80">
-              <a:extLst>
-                <a:ext uri="{FF2B5EF4-FFF2-40B4-BE49-F238E27FC236}">
-                  <a16:creationId xmlns:a16="http://schemas.microsoft.com/office/drawing/2014/main" id="{BC82A7DE-86A2-4F01-9AA8-88BEBD534AEB}"/>
-                </a:ext>
-              </a:extLst>
-            </p:cNvPr>
-            <p:cNvSpPr/>
-            <p:nvPr/>
-          </p:nvSpPr>
-          <p:spPr>
-            <a:xfrm>
-              <a:off x="8859790" y="1134432"/>
-              <a:ext cx="958463" cy="111471"/>
-            </a:xfrm>
-            <a:prstGeom prst="rect">
-              <a:avLst/>
-            </a:prstGeom>
-          </p:spPr>
-          <p:style>
-            <a:lnRef idx="2">
-              <a:schemeClr val="accent6">
-                <a:shade val="50000"/>
-              </a:schemeClr>
-            </a:lnRef>
-            <a:fillRef idx="1">
-              <a:schemeClr val="accent6"/>
-            </a:fillRef>
-            <a:effectRef idx="0">
-              <a:schemeClr val="accent6"/>
-            </a:effectRef>
-            <a:fontRef idx="minor">
-              <a:schemeClr val="lt1"/>
-            </a:fontRef>
-          </p:style>
-          <p:txBody>
-            <a:bodyPr rtlCol="0" anchor="ctr"/>
-            <a:lstStyle/>
-            <a:p>
-              <a:pPr algn="ctr"/>
-              <a:endParaRPr lang="en-GB"/>
-            </a:p>
-          </p:txBody>
-        </p:sp>
-        <p:sp>
-          <p:nvSpPr>
-            <p:cNvPr id="82" name="Rectangle 81">
-              <a:extLst>
-                <a:ext uri="{FF2B5EF4-FFF2-40B4-BE49-F238E27FC236}">
-                  <a16:creationId xmlns:a16="http://schemas.microsoft.com/office/drawing/2014/main" id="{51988EDD-5CBB-48EC-9BC8-60C3D7619AAB}"/>
-                </a:ext>
-              </a:extLst>
-            </p:cNvPr>
-            <p:cNvSpPr/>
-            <p:nvPr/>
-          </p:nvSpPr>
-          <p:spPr>
-            <a:xfrm>
-              <a:off x="8859790" y="1402050"/>
-              <a:ext cx="958463" cy="111471"/>
-            </a:xfrm>
-            <a:prstGeom prst="rect">
-              <a:avLst/>
-            </a:prstGeom>
-          </p:spPr>
-          <p:style>
-            <a:lnRef idx="2">
-              <a:schemeClr val="accent5">
-                <a:shade val="50000"/>
-              </a:schemeClr>
-            </a:lnRef>
-            <a:fillRef idx="1">
-              <a:schemeClr val="accent5"/>
-            </a:fillRef>
-            <a:effectRef idx="0">
-              <a:schemeClr val="accent5"/>
-            </a:effectRef>
-            <a:fontRef idx="minor">
-              <a:schemeClr val="lt1"/>
-            </a:fontRef>
-          </p:style>
-          <p:txBody>
-            <a:bodyPr rtlCol="0" anchor="ctr"/>
-            <a:lstStyle/>
-            <a:p>
-              <a:pPr algn="ctr"/>
-              <a:endParaRPr lang="en-GB"/>
+              <a:endParaRPr lang="en-GB">
+                <a:solidFill>
+                  <a:schemeClr val="tx1"/>
+                </a:solidFill>
+              </a:endParaRPr>
             </a:p>
           </p:txBody>
         </p:sp>
@@ -5928,10 +6013,2160 @@
           <a:chExt cx="0" cy="0"/>
         </a:xfrm>
       </p:grpSpPr>
+      <p:grpSp>
+        <p:nvGrpSpPr>
+          <p:cNvPr id="10" name="Group 9">
+            <a:extLst>
+              <a:ext uri="{FF2B5EF4-FFF2-40B4-BE49-F238E27FC236}">
+                <a16:creationId xmlns:a16="http://schemas.microsoft.com/office/drawing/2014/main" id="{3AB2EA8A-21AF-4BD0-8A7B-FC713B44B089}"/>
+              </a:ext>
+            </a:extLst>
+          </p:cNvPr>
+          <p:cNvGrpSpPr/>
+          <p:nvPr/>
+        </p:nvGrpSpPr>
+        <p:grpSpPr>
+          <a:xfrm>
+            <a:off x="2676786" y="485791"/>
+            <a:ext cx="6838427" cy="5886418"/>
+            <a:chOff x="2676786" y="485791"/>
+            <a:chExt cx="6838427" cy="5886418"/>
+          </a:xfrm>
+        </p:grpSpPr>
+        <p:sp>
+          <p:nvSpPr>
+            <p:cNvPr id="3" name="TextBox 2">
+              <a:extLst>
+                <a:ext uri="{FF2B5EF4-FFF2-40B4-BE49-F238E27FC236}">
+                  <a16:creationId xmlns:a16="http://schemas.microsoft.com/office/drawing/2014/main" id="{C2824354-A904-4273-8F17-04D73BF09ABB}"/>
+                </a:ext>
+              </a:extLst>
+            </p:cNvPr>
+            <p:cNvSpPr txBox="1"/>
+            <p:nvPr/>
+          </p:nvSpPr>
+          <p:spPr>
+            <a:xfrm>
+              <a:off x="4099420" y="2967335"/>
+              <a:ext cx="3993160" cy="923330"/>
+            </a:xfrm>
+            <a:prstGeom prst="rect">
+              <a:avLst/>
+            </a:prstGeom>
+          </p:spPr>
+          <p:style>
+            <a:lnRef idx="2">
+              <a:schemeClr val="dk1"/>
+            </a:lnRef>
+            <a:fillRef idx="1">
+              <a:schemeClr val="lt1"/>
+            </a:fillRef>
+            <a:effectRef idx="0">
+              <a:schemeClr val="dk1"/>
+            </a:effectRef>
+            <a:fontRef idx="minor">
+              <a:schemeClr val="dk1"/>
+            </a:fontRef>
+          </p:style>
+          <p:txBody>
+            <a:bodyPr wrap="square" rtlCol="0">
+              <a:spAutoFit/>
+            </a:bodyPr>
+            <a:lstStyle/>
+            <a:p>
+              <a:r>
+                <a:rPr lang="en-GB" sz="5400" dirty="0"/>
+                <a:t>Resistance #n</a:t>
+              </a:r>
+            </a:p>
+          </p:txBody>
+        </p:sp>
+        <p:sp>
+          <p:nvSpPr>
+            <p:cNvPr id="4" name="TextBox 3">
+              <a:extLst>
+                <a:ext uri="{FF2B5EF4-FFF2-40B4-BE49-F238E27FC236}">
+                  <a16:creationId xmlns:a16="http://schemas.microsoft.com/office/drawing/2014/main" id="{D4A0CFF9-0D45-4C89-853E-0F349F5A539E}"/>
+                </a:ext>
+              </a:extLst>
+            </p:cNvPr>
+            <p:cNvSpPr txBox="1"/>
+            <p:nvPr/>
+          </p:nvSpPr>
+          <p:spPr>
+            <a:xfrm>
+              <a:off x="6669946" y="5787434"/>
+              <a:ext cx="2845267" cy="584775"/>
+            </a:xfrm>
+            <a:prstGeom prst="rect">
+              <a:avLst/>
+            </a:prstGeom>
+          </p:spPr>
+          <p:style>
+            <a:lnRef idx="2">
+              <a:schemeClr val="dk1"/>
+            </a:lnRef>
+            <a:fillRef idx="1">
+              <a:schemeClr val="lt1"/>
+            </a:fillRef>
+            <a:effectRef idx="0">
+              <a:schemeClr val="dk1"/>
+            </a:effectRef>
+            <a:fontRef idx="minor">
+              <a:schemeClr val="dk1"/>
+            </a:fontRef>
+          </p:style>
+          <p:txBody>
+            <a:bodyPr wrap="square" rtlCol="0">
+              <a:spAutoFit/>
+            </a:bodyPr>
+            <a:lstStyle/>
+            <a:p>
+              <a:r>
+                <a:rPr lang="en-GB" sz="3200" dirty="0"/>
+                <a:t>Resistance #n+1</a:t>
+              </a:r>
+            </a:p>
+          </p:txBody>
+        </p:sp>
+        <p:sp>
+          <p:nvSpPr>
+            <p:cNvPr id="5" name="TextBox 4">
+              <a:extLst>
+                <a:ext uri="{FF2B5EF4-FFF2-40B4-BE49-F238E27FC236}">
+                  <a16:creationId xmlns:a16="http://schemas.microsoft.com/office/drawing/2014/main" id="{3704725B-5FEC-4F16-A7CC-AB39B87F8B32}"/>
+                </a:ext>
+              </a:extLst>
+            </p:cNvPr>
+            <p:cNvSpPr txBox="1"/>
+            <p:nvPr/>
+          </p:nvSpPr>
+          <p:spPr>
+            <a:xfrm>
+              <a:off x="2676786" y="485791"/>
+              <a:ext cx="2845267" cy="584775"/>
+            </a:xfrm>
+            <a:prstGeom prst="rect">
+              <a:avLst/>
+            </a:prstGeom>
+          </p:spPr>
+          <p:style>
+            <a:lnRef idx="2">
+              <a:schemeClr val="dk1"/>
+            </a:lnRef>
+            <a:fillRef idx="1">
+              <a:schemeClr val="lt1"/>
+            </a:fillRef>
+            <a:effectRef idx="0">
+              <a:schemeClr val="dk1"/>
+            </a:effectRef>
+            <a:fontRef idx="minor">
+              <a:schemeClr val="dk1"/>
+            </a:fontRef>
+          </p:style>
+          <p:txBody>
+            <a:bodyPr wrap="square" rtlCol="0">
+              <a:spAutoFit/>
+            </a:bodyPr>
+            <a:lstStyle/>
+            <a:p>
+              <a:r>
+                <a:rPr lang="en-GB" sz="3200" dirty="0"/>
+                <a:t>Resistance #n-1</a:t>
+              </a:r>
+            </a:p>
+          </p:txBody>
+        </p:sp>
+      </p:grpSp>
+      <p:grpSp>
+        <p:nvGrpSpPr>
+          <p:cNvPr id="9" name="Group 8">
+            <a:extLst>
+              <a:ext uri="{FF2B5EF4-FFF2-40B4-BE49-F238E27FC236}">
+                <a16:creationId xmlns:a16="http://schemas.microsoft.com/office/drawing/2014/main" id="{2599FE73-81EC-48ED-9E82-E1B2221DDBC0}"/>
+              </a:ext>
+            </a:extLst>
+          </p:cNvPr>
+          <p:cNvGrpSpPr/>
+          <p:nvPr/>
+        </p:nvGrpSpPr>
+        <p:grpSpPr>
+          <a:xfrm>
+            <a:off x="4750584" y="1070566"/>
+            <a:ext cx="2710703" cy="4692099"/>
+            <a:chOff x="4750584" y="1070566"/>
+            <a:chExt cx="2710703" cy="4692099"/>
+          </a:xfrm>
+        </p:grpSpPr>
+        <p:sp>
+          <p:nvSpPr>
+            <p:cNvPr id="7" name="Arrow: Down 6">
+              <a:extLst>
+                <a:ext uri="{FF2B5EF4-FFF2-40B4-BE49-F238E27FC236}">
+                  <a16:creationId xmlns:a16="http://schemas.microsoft.com/office/drawing/2014/main" id="{E2424FB6-DF4B-4790-8A7B-2B79ACD77AC1}"/>
+                </a:ext>
+              </a:extLst>
+            </p:cNvPr>
+            <p:cNvSpPr/>
+            <p:nvPr/>
+          </p:nvSpPr>
+          <p:spPr>
+            <a:xfrm>
+              <a:off x="4750584" y="1070566"/>
+              <a:ext cx="184557" cy="1872000"/>
+            </a:xfrm>
+            <a:prstGeom prst="downArrow">
+              <a:avLst/>
+            </a:prstGeom>
+          </p:spPr>
+          <p:style>
+            <a:lnRef idx="2">
+              <a:schemeClr val="accent1">
+                <a:shade val="50000"/>
+              </a:schemeClr>
+            </a:lnRef>
+            <a:fillRef idx="1">
+              <a:schemeClr val="accent1"/>
+            </a:fillRef>
+            <a:effectRef idx="0">
+              <a:schemeClr val="accent1"/>
+            </a:effectRef>
+            <a:fontRef idx="minor">
+              <a:schemeClr val="lt1"/>
+            </a:fontRef>
+          </p:style>
+          <p:txBody>
+            <a:bodyPr rtlCol="0" anchor="ctr"/>
+            <a:lstStyle/>
+            <a:p>
+              <a:pPr algn="ctr"/>
+              <a:endParaRPr lang="en-GB"/>
+            </a:p>
+          </p:txBody>
+        </p:sp>
+        <p:sp>
+          <p:nvSpPr>
+            <p:cNvPr id="8" name="Arrow: Down 7">
+              <a:extLst>
+                <a:ext uri="{FF2B5EF4-FFF2-40B4-BE49-F238E27FC236}">
+                  <a16:creationId xmlns:a16="http://schemas.microsoft.com/office/drawing/2014/main" id="{9CC7293F-5984-4AD6-93B4-027EE9C0E7DE}"/>
+                </a:ext>
+              </a:extLst>
+            </p:cNvPr>
+            <p:cNvSpPr/>
+            <p:nvPr/>
+          </p:nvSpPr>
+          <p:spPr>
+            <a:xfrm>
+              <a:off x="7276730" y="3890665"/>
+              <a:ext cx="184557" cy="1872000"/>
+            </a:xfrm>
+            <a:prstGeom prst="downArrow">
+              <a:avLst/>
+            </a:prstGeom>
+          </p:spPr>
+          <p:style>
+            <a:lnRef idx="2">
+              <a:schemeClr val="accent1">
+                <a:shade val="50000"/>
+              </a:schemeClr>
+            </a:lnRef>
+            <a:fillRef idx="1">
+              <a:schemeClr val="accent1"/>
+            </a:fillRef>
+            <a:effectRef idx="0">
+              <a:schemeClr val="accent1"/>
+            </a:effectRef>
+            <a:fontRef idx="minor">
+              <a:schemeClr val="lt1"/>
+            </a:fontRef>
+          </p:style>
+          <p:txBody>
+            <a:bodyPr rtlCol="0" anchor="ctr"/>
+            <a:lstStyle/>
+            <a:p>
+              <a:pPr algn="ctr"/>
+              <a:endParaRPr lang="en-GB"/>
+            </a:p>
+          </p:txBody>
+        </p:sp>
+      </p:grpSp>
+      <p:sp>
+        <p:nvSpPr>
+          <p:cNvPr id="11" name="Arrow: Curved Right 10">
+            <a:extLst>
+              <a:ext uri="{FF2B5EF4-FFF2-40B4-BE49-F238E27FC236}">
+                <a16:creationId xmlns:a16="http://schemas.microsoft.com/office/drawing/2014/main" id="{0BDE759F-2992-4752-9EB2-C181EEA88AB6}"/>
+              </a:ext>
+            </a:extLst>
+          </p:cNvPr>
+          <p:cNvSpPr/>
+          <p:nvPr/>
+        </p:nvSpPr>
+        <p:spPr>
+          <a:xfrm rot="5400000">
+            <a:off x="5880000" y="2535335"/>
+            <a:ext cx="432000" cy="432000"/>
+          </a:xfrm>
+          <a:prstGeom prst="curvedRightArrow">
+            <a:avLst/>
+          </a:prstGeom>
+        </p:spPr>
+        <p:style>
+          <a:lnRef idx="2">
+            <a:schemeClr val="dk1"/>
+          </a:lnRef>
+          <a:fillRef idx="1">
+            <a:schemeClr val="lt1"/>
+          </a:fillRef>
+          <a:effectRef idx="0">
+            <a:schemeClr val="dk1"/>
+          </a:effectRef>
+          <a:fontRef idx="minor">
+            <a:schemeClr val="dk1"/>
+          </a:fontRef>
+        </p:style>
+        <p:txBody>
+          <a:bodyPr rtlCol="0" anchor="ctr"/>
+          <a:lstStyle/>
+          <a:p>
+            <a:pPr algn="ctr"/>
+            <a:endParaRPr lang="en-GB">
+              <a:solidFill>
+                <a:schemeClr val="tx1"/>
+              </a:solidFill>
+            </a:endParaRPr>
+          </a:p>
+        </p:txBody>
+      </p:sp>
+      <p:grpSp>
+        <p:nvGrpSpPr>
+          <p:cNvPr id="12" name="Group 11">
+            <a:extLst>
+              <a:ext uri="{FF2B5EF4-FFF2-40B4-BE49-F238E27FC236}">
+                <a16:creationId xmlns:a16="http://schemas.microsoft.com/office/drawing/2014/main" id="{807CA9FF-7A52-4F18-A3A1-9913A88E5156}"/>
+              </a:ext>
+            </a:extLst>
+          </p:cNvPr>
+          <p:cNvGrpSpPr/>
+          <p:nvPr/>
+        </p:nvGrpSpPr>
+        <p:grpSpPr>
+          <a:xfrm>
+            <a:off x="9102207" y="146471"/>
+            <a:ext cx="2852407" cy="1754326"/>
+            <a:chOff x="8818647" y="232059"/>
+            <a:chExt cx="2852407" cy="1754326"/>
+          </a:xfrm>
+        </p:grpSpPr>
+        <p:grpSp>
+          <p:nvGrpSpPr>
+            <p:cNvPr id="13" name="Group 12">
+              <a:extLst>
+                <a:ext uri="{FF2B5EF4-FFF2-40B4-BE49-F238E27FC236}">
+                  <a16:creationId xmlns:a16="http://schemas.microsoft.com/office/drawing/2014/main" id="{A27F1AF8-634B-43EC-BA84-16582D203C51}"/>
+                </a:ext>
+              </a:extLst>
+            </p:cNvPr>
+            <p:cNvGrpSpPr/>
+            <p:nvPr/>
+          </p:nvGrpSpPr>
+          <p:grpSpPr>
+            <a:xfrm>
+              <a:off x="8818647" y="232059"/>
+              <a:ext cx="2852407" cy="1754326"/>
+              <a:chOff x="7353775" y="157018"/>
+              <a:chExt cx="2852407" cy="1754326"/>
+            </a:xfrm>
+          </p:grpSpPr>
+          <p:sp>
+            <p:nvSpPr>
+              <p:cNvPr id="15" name="TextBox 14">
+                <a:extLst>
+                  <a:ext uri="{FF2B5EF4-FFF2-40B4-BE49-F238E27FC236}">
+                    <a16:creationId xmlns:a16="http://schemas.microsoft.com/office/drawing/2014/main" id="{BAC2300F-65BC-4D9B-ABFA-5B1774CB38D8}"/>
+                  </a:ext>
+                </a:extLst>
+              </p:cNvPr>
+              <p:cNvSpPr txBox="1"/>
+              <p:nvPr/>
+            </p:nvSpPr>
+            <p:spPr>
+              <a:xfrm>
+                <a:off x="7353775" y="157018"/>
+                <a:ext cx="2852407" cy="1754326"/>
+              </a:xfrm>
+              <a:prstGeom prst="rect">
+                <a:avLst/>
+              </a:prstGeom>
+            </p:spPr>
+            <p:style>
+              <a:lnRef idx="2">
+                <a:schemeClr val="dk1"/>
+              </a:lnRef>
+              <a:fillRef idx="1">
+                <a:schemeClr val="lt1"/>
+              </a:fillRef>
+              <a:effectRef idx="0">
+                <a:schemeClr val="dk1"/>
+              </a:effectRef>
+              <a:fontRef idx="minor">
+                <a:schemeClr val="dk1"/>
+              </a:fontRef>
+            </p:style>
+            <p:txBody>
+              <a:bodyPr wrap="square" rtlCol="0">
+                <a:spAutoFit/>
+              </a:bodyPr>
+              <a:lstStyle/>
+              <a:p>
+                <a:r>
+                  <a:rPr lang="en-GB" dirty="0"/>
+                  <a:t>Types of transition:</a:t>
+                </a:r>
+              </a:p>
+              <a:p>
+                <a:pPr marL="285750" indent="-285750">
+                  <a:buFont typeface="Arial" panose="020B0604020202020204" pitchFamily="34" charset="0"/>
+                  <a:buChar char="•"/>
+                </a:pPr>
+                <a:r>
+                  <a:rPr lang="en-GB" dirty="0"/>
+                  <a:t>Death         -</a:t>
+                </a:r>
+              </a:p>
+              <a:p>
+                <a:pPr marL="285750" indent="-285750">
+                  <a:buFont typeface="Arial" panose="020B0604020202020204" pitchFamily="34" charset="0"/>
+                  <a:buChar char="•"/>
+                </a:pPr>
+                <a:r>
+                  <a:rPr lang="en-GB" dirty="0"/>
+                  <a:t>Spread       -</a:t>
+                </a:r>
+              </a:p>
+              <a:p>
+                <a:pPr marL="285750" indent="-285750">
+                  <a:buFont typeface="Arial" panose="020B0604020202020204" pitchFamily="34" charset="0"/>
+                  <a:buChar char="•"/>
+                </a:pPr>
+                <a:r>
+                  <a:rPr lang="en-GB" dirty="0"/>
+                  <a:t>Recovery   -</a:t>
+                </a:r>
+              </a:p>
+              <a:p>
+                <a:pPr marL="285750" indent="-285750">
+                  <a:buFont typeface="Arial" panose="020B0604020202020204" pitchFamily="34" charset="0"/>
+                  <a:buChar char="•"/>
+                </a:pPr>
+                <a:r>
+                  <a:rPr lang="en-GB" dirty="0"/>
+                  <a:t>Mutation   -</a:t>
+                </a:r>
+              </a:p>
+              <a:p>
+                <a:pPr marL="285750" indent="-285750">
+                  <a:buFont typeface="Arial" panose="020B0604020202020204" pitchFamily="34" charset="0"/>
+                  <a:buChar char="•"/>
+                </a:pPr>
+                <a:r>
+                  <a:rPr lang="en-GB" dirty="0"/>
+                  <a:t>No change - </a:t>
+                </a:r>
+              </a:p>
+            </p:txBody>
+          </p:sp>
+          <p:sp>
+            <p:nvSpPr>
+              <p:cNvPr id="16" name="Rectangle 15">
+                <a:extLst>
+                  <a:ext uri="{FF2B5EF4-FFF2-40B4-BE49-F238E27FC236}">
+                    <a16:creationId xmlns:a16="http://schemas.microsoft.com/office/drawing/2014/main" id="{4DCC3343-DAB0-49FB-82A5-BFB2E30CB9D7}"/>
+                  </a:ext>
+                </a:extLst>
+              </p:cNvPr>
+              <p:cNvSpPr/>
+              <p:nvPr/>
+            </p:nvSpPr>
+            <p:spPr>
+              <a:xfrm>
+                <a:off x="8859792" y="554243"/>
+                <a:ext cx="958463" cy="111471"/>
+              </a:xfrm>
+              <a:prstGeom prst="rect">
+                <a:avLst/>
+              </a:prstGeom>
+            </p:spPr>
+            <p:style>
+              <a:lnRef idx="2">
+                <a:schemeClr val="accent2">
+                  <a:shade val="50000"/>
+                </a:schemeClr>
+              </a:lnRef>
+              <a:fillRef idx="1">
+                <a:schemeClr val="accent2"/>
+              </a:fillRef>
+              <a:effectRef idx="0">
+                <a:schemeClr val="accent2"/>
+              </a:effectRef>
+              <a:fontRef idx="minor">
+                <a:schemeClr val="lt1"/>
+              </a:fontRef>
+            </p:style>
+            <p:txBody>
+              <a:bodyPr rtlCol="0" anchor="ctr"/>
+              <a:lstStyle/>
+              <a:p>
+                <a:pPr algn="ctr"/>
+                <a:endParaRPr lang="en-GB"/>
+              </a:p>
+            </p:txBody>
+          </p:sp>
+          <p:sp>
+            <p:nvSpPr>
+              <p:cNvPr id="17" name="Rectangle 16">
+                <a:extLst>
+                  <a:ext uri="{FF2B5EF4-FFF2-40B4-BE49-F238E27FC236}">
+                    <a16:creationId xmlns:a16="http://schemas.microsoft.com/office/drawing/2014/main" id="{ED1F446E-5A0F-4B38-88BD-1034971C0F08}"/>
+                  </a:ext>
+                </a:extLst>
+              </p:cNvPr>
+              <p:cNvSpPr/>
+              <p:nvPr/>
+            </p:nvSpPr>
+            <p:spPr>
+              <a:xfrm>
+                <a:off x="8859791" y="848577"/>
+                <a:ext cx="958463" cy="111471"/>
+              </a:xfrm>
+              <a:prstGeom prst="rect">
+                <a:avLst/>
+              </a:prstGeom>
+            </p:spPr>
+            <p:style>
+              <a:lnRef idx="2">
+                <a:schemeClr val="accent3">
+                  <a:shade val="50000"/>
+                </a:schemeClr>
+              </a:lnRef>
+              <a:fillRef idx="1">
+                <a:schemeClr val="accent3"/>
+              </a:fillRef>
+              <a:effectRef idx="0">
+                <a:schemeClr val="accent3"/>
+              </a:effectRef>
+              <a:fontRef idx="minor">
+                <a:schemeClr val="lt1"/>
+              </a:fontRef>
+            </p:style>
+            <p:txBody>
+              <a:bodyPr rtlCol="0" anchor="ctr"/>
+              <a:lstStyle/>
+              <a:p>
+                <a:pPr algn="ctr"/>
+                <a:endParaRPr lang="en-GB"/>
+              </a:p>
+            </p:txBody>
+          </p:sp>
+          <p:sp>
+            <p:nvSpPr>
+              <p:cNvPr id="18" name="Rectangle 17">
+                <a:extLst>
+                  <a:ext uri="{FF2B5EF4-FFF2-40B4-BE49-F238E27FC236}">
+                    <a16:creationId xmlns:a16="http://schemas.microsoft.com/office/drawing/2014/main" id="{0E023737-C5FF-4EED-A65D-0CA54B0174B3}"/>
+                  </a:ext>
+                </a:extLst>
+              </p:cNvPr>
+              <p:cNvSpPr/>
+              <p:nvPr/>
+            </p:nvSpPr>
+            <p:spPr>
+              <a:xfrm>
+                <a:off x="8859790" y="1134432"/>
+                <a:ext cx="958463" cy="111471"/>
+              </a:xfrm>
+              <a:prstGeom prst="rect">
+                <a:avLst/>
+              </a:prstGeom>
+            </p:spPr>
+            <p:style>
+              <a:lnRef idx="2">
+                <a:schemeClr val="accent6">
+                  <a:shade val="50000"/>
+                </a:schemeClr>
+              </a:lnRef>
+              <a:fillRef idx="1">
+                <a:schemeClr val="accent6"/>
+              </a:fillRef>
+              <a:effectRef idx="0">
+                <a:schemeClr val="accent6"/>
+              </a:effectRef>
+              <a:fontRef idx="minor">
+                <a:schemeClr val="lt1"/>
+              </a:fontRef>
+            </p:style>
+            <p:txBody>
+              <a:bodyPr rtlCol="0" anchor="ctr"/>
+              <a:lstStyle/>
+              <a:p>
+                <a:pPr algn="ctr"/>
+                <a:endParaRPr lang="en-GB"/>
+              </a:p>
+            </p:txBody>
+          </p:sp>
+          <p:sp>
+            <p:nvSpPr>
+              <p:cNvPr id="19" name="Rectangle 18">
+                <a:extLst>
+                  <a:ext uri="{FF2B5EF4-FFF2-40B4-BE49-F238E27FC236}">
+                    <a16:creationId xmlns:a16="http://schemas.microsoft.com/office/drawing/2014/main" id="{5CA53959-157D-4A37-8A2C-F4FB00DFA8C2}"/>
+                  </a:ext>
+                </a:extLst>
+              </p:cNvPr>
+              <p:cNvSpPr/>
+              <p:nvPr/>
+            </p:nvSpPr>
+            <p:spPr>
+              <a:xfrm>
+                <a:off x="8859790" y="1402050"/>
+                <a:ext cx="958463" cy="111471"/>
+              </a:xfrm>
+              <a:prstGeom prst="rect">
+                <a:avLst/>
+              </a:prstGeom>
+            </p:spPr>
+            <p:style>
+              <a:lnRef idx="2">
+                <a:schemeClr val="accent5">
+                  <a:shade val="50000"/>
+                </a:schemeClr>
+              </a:lnRef>
+              <a:fillRef idx="1">
+                <a:schemeClr val="accent5"/>
+              </a:fillRef>
+              <a:effectRef idx="0">
+                <a:schemeClr val="accent5"/>
+              </a:effectRef>
+              <a:fontRef idx="minor">
+                <a:schemeClr val="lt1"/>
+              </a:fontRef>
+            </p:style>
+            <p:txBody>
+              <a:bodyPr rtlCol="0" anchor="ctr"/>
+              <a:lstStyle/>
+              <a:p>
+                <a:pPr algn="ctr"/>
+                <a:endParaRPr lang="en-GB"/>
+              </a:p>
+            </p:txBody>
+          </p:sp>
+        </p:grpSp>
+        <p:sp>
+          <p:nvSpPr>
+            <p:cNvPr id="14" name="Arrow: Curved Right 13">
+              <a:extLst>
+                <a:ext uri="{FF2B5EF4-FFF2-40B4-BE49-F238E27FC236}">
+                  <a16:creationId xmlns:a16="http://schemas.microsoft.com/office/drawing/2014/main" id="{A39B0595-2ECD-4224-AFEA-96C0ECDE06C3}"/>
+                </a:ext>
+              </a:extLst>
+            </p:cNvPr>
+            <p:cNvSpPr/>
+            <p:nvPr/>
+          </p:nvSpPr>
+          <p:spPr>
+            <a:xfrm rot="5400000">
+              <a:off x="10681394" y="1669326"/>
+              <a:ext cx="252000" cy="252000"/>
+            </a:xfrm>
+            <a:prstGeom prst="curvedRightArrow">
+              <a:avLst/>
+            </a:prstGeom>
+          </p:spPr>
+          <p:style>
+            <a:lnRef idx="2">
+              <a:schemeClr val="dk1"/>
+            </a:lnRef>
+            <a:fillRef idx="1">
+              <a:schemeClr val="lt1"/>
+            </a:fillRef>
+            <a:effectRef idx="0">
+              <a:schemeClr val="dk1"/>
+            </a:effectRef>
+            <a:fontRef idx="minor">
+              <a:schemeClr val="dk1"/>
+            </a:fontRef>
+          </p:style>
+          <p:txBody>
+            <a:bodyPr rtlCol="0" anchor="ctr"/>
+            <a:lstStyle/>
+            <a:p>
+              <a:pPr algn="ctr"/>
+              <a:endParaRPr lang="en-GB">
+                <a:solidFill>
+                  <a:schemeClr val="tx1"/>
+                </a:solidFill>
+              </a:endParaRPr>
+            </a:p>
+          </p:txBody>
+        </p:sp>
+      </p:grpSp>
+      <p:sp>
+        <p:nvSpPr>
+          <p:cNvPr id="20" name="TextBox 19">
+            <a:extLst>
+              <a:ext uri="{FF2B5EF4-FFF2-40B4-BE49-F238E27FC236}">
+                <a16:creationId xmlns:a16="http://schemas.microsoft.com/office/drawing/2014/main" id="{FA9EF591-F8C1-4078-A0C9-659469D09893}"/>
+              </a:ext>
+            </a:extLst>
+          </p:cNvPr>
+          <p:cNvSpPr txBox="1"/>
+          <p:nvPr/>
+        </p:nvSpPr>
+        <p:spPr>
+          <a:xfrm>
+            <a:off x="10672617" y="3136612"/>
+            <a:ext cx="1189198" cy="584775"/>
+          </a:xfrm>
+          <a:prstGeom prst="rect">
+            <a:avLst/>
+          </a:prstGeom>
+        </p:spPr>
+        <p:style>
+          <a:lnRef idx="2">
+            <a:schemeClr val="dk1"/>
+          </a:lnRef>
+          <a:fillRef idx="1">
+            <a:schemeClr val="lt1"/>
+          </a:fillRef>
+          <a:effectRef idx="0">
+            <a:schemeClr val="dk1"/>
+          </a:effectRef>
+          <a:fontRef idx="minor">
+            <a:schemeClr val="dk1"/>
+          </a:fontRef>
+        </p:style>
+        <p:txBody>
+          <a:bodyPr wrap="square" rtlCol="0">
+            <a:spAutoFit/>
+          </a:bodyPr>
+          <a:lstStyle/>
+          <a:p>
+            <a:r>
+              <a:rPr lang="en-GB" sz="3200" dirty="0"/>
+              <a:t> Dead</a:t>
+            </a:r>
+          </a:p>
+        </p:txBody>
+      </p:sp>
+      <p:sp>
+        <p:nvSpPr>
+          <p:cNvPr id="21" name="TextBox 20">
+            <a:extLst>
+              <a:ext uri="{FF2B5EF4-FFF2-40B4-BE49-F238E27FC236}">
+                <a16:creationId xmlns:a16="http://schemas.microsoft.com/office/drawing/2014/main" id="{AD45E8D0-EECF-4597-9FB7-858C3F2EBE42}"/>
+              </a:ext>
+            </a:extLst>
+          </p:cNvPr>
+          <p:cNvSpPr txBox="1"/>
+          <p:nvPr/>
+        </p:nvSpPr>
+        <p:spPr>
+          <a:xfrm>
+            <a:off x="330185" y="3136612"/>
+            <a:ext cx="1784944" cy="584775"/>
+          </a:xfrm>
+          <a:prstGeom prst="rect">
+            <a:avLst/>
+          </a:prstGeom>
+        </p:spPr>
+        <p:style>
+          <a:lnRef idx="2">
+            <a:schemeClr val="dk1"/>
+          </a:lnRef>
+          <a:fillRef idx="1">
+            <a:schemeClr val="lt1"/>
+          </a:fillRef>
+          <a:effectRef idx="0">
+            <a:schemeClr val="dk1"/>
+          </a:effectRef>
+          <a:fontRef idx="minor">
+            <a:schemeClr val="dk1"/>
+          </a:fontRef>
+        </p:style>
+        <p:txBody>
+          <a:bodyPr wrap="square" rtlCol="0">
+            <a:spAutoFit/>
+          </a:bodyPr>
+          <a:lstStyle/>
+          <a:p>
+            <a:r>
+              <a:rPr lang="en-GB" sz="3200" dirty="0"/>
+              <a:t>Immunity</a:t>
+            </a:r>
+          </a:p>
+        </p:txBody>
+      </p:sp>
+      <p:sp>
+        <p:nvSpPr>
+          <p:cNvPr id="23" name="Arrow: Down 22">
+            <a:extLst>
+              <a:ext uri="{FF2B5EF4-FFF2-40B4-BE49-F238E27FC236}">
+                <a16:creationId xmlns:a16="http://schemas.microsoft.com/office/drawing/2014/main" id="{83860AF1-AB75-4BE2-A1F7-22ABA63A4687}"/>
+              </a:ext>
+            </a:extLst>
+          </p:cNvPr>
+          <p:cNvSpPr/>
+          <p:nvPr/>
+        </p:nvSpPr>
+        <p:spPr>
+          <a:xfrm rot="16200000">
+            <a:off x="9287300" y="2141999"/>
+            <a:ext cx="184557" cy="2574000"/>
+          </a:xfrm>
+          <a:prstGeom prst="downArrow">
+            <a:avLst/>
+          </a:prstGeom>
+        </p:spPr>
+        <p:style>
+          <a:lnRef idx="2">
+            <a:schemeClr val="accent2">
+              <a:shade val="50000"/>
+            </a:schemeClr>
+          </a:lnRef>
+          <a:fillRef idx="1">
+            <a:schemeClr val="accent2"/>
+          </a:fillRef>
+          <a:effectRef idx="0">
+            <a:schemeClr val="accent2"/>
+          </a:effectRef>
+          <a:fontRef idx="minor">
+            <a:schemeClr val="lt1"/>
+          </a:fontRef>
+        </p:style>
+        <p:txBody>
+          <a:bodyPr rtlCol="0" anchor="ctr"/>
+          <a:lstStyle/>
+          <a:p>
+            <a:pPr algn="ctr"/>
+            <a:endParaRPr lang="en-GB"/>
+          </a:p>
+        </p:txBody>
+      </p:sp>
+      <p:grpSp>
+        <p:nvGrpSpPr>
+          <p:cNvPr id="25" name="Group 24">
+            <a:extLst>
+              <a:ext uri="{FF2B5EF4-FFF2-40B4-BE49-F238E27FC236}">
+                <a16:creationId xmlns:a16="http://schemas.microsoft.com/office/drawing/2014/main" id="{6E581C55-D0A5-43C6-9BAB-D34A8F51AF87}"/>
+              </a:ext>
+            </a:extLst>
+          </p:cNvPr>
+          <p:cNvGrpSpPr/>
+          <p:nvPr/>
+        </p:nvGrpSpPr>
+        <p:grpSpPr>
+          <a:xfrm>
+            <a:off x="2116400" y="3179854"/>
+            <a:ext cx="1980001" cy="498292"/>
+            <a:chOff x="2116400" y="3179854"/>
+            <a:chExt cx="1980001" cy="498292"/>
+          </a:xfrm>
+        </p:grpSpPr>
+        <p:sp>
+          <p:nvSpPr>
+            <p:cNvPr id="22" name="Arrow: Down 21">
+              <a:extLst>
+                <a:ext uri="{FF2B5EF4-FFF2-40B4-BE49-F238E27FC236}">
+                  <a16:creationId xmlns:a16="http://schemas.microsoft.com/office/drawing/2014/main" id="{C8EA8BB5-3A5A-4C08-8223-4785BD4CCAEF}"/>
+                </a:ext>
+              </a:extLst>
+            </p:cNvPr>
+            <p:cNvSpPr/>
+            <p:nvPr/>
+          </p:nvSpPr>
+          <p:spPr>
+            <a:xfrm rot="5400000">
+              <a:off x="3014122" y="2282133"/>
+              <a:ext cx="184557" cy="1980000"/>
+            </a:xfrm>
+            <a:prstGeom prst="downArrow">
+              <a:avLst/>
+            </a:prstGeom>
+          </p:spPr>
+          <p:style>
+            <a:lnRef idx="2">
+              <a:schemeClr val="accent6">
+                <a:shade val="50000"/>
+              </a:schemeClr>
+            </a:lnRef>
+            <a:fillRef idx="1">
+              <a:schemeClr val="accent6"/>
+            </a:fillRef>
+            <a:effectRef idx="0">
+              <a:schemeClr val="accent6"/>
+            </a:effectRef>
+            <a:fontRef idx="minor">
+              <a:schemeClr val="lt1"/>
+            </a:fontRef>
+          </p:style>
+          <p:txBody>
+            <a:bodyPr rtlCol="0" anchor="ctr"/>
+            <a:lstStyle/>
+            <a:p>
+              <a:pPr algn="ctr"/>
+              <a:endParaRPr lang="en-GB"/>
+            </a:p>
+          </p:txBody>
+        </p:sp>
+        <p:sp>
+          <p:nvSpPr>
+            <p:cNvPr id="24" name="Arrow: Down 23">
+              <a:extLst>
+                <a:ext uri="{FF2B5EF4-FFF2-40B4-BE49-F238E27FC236}">
+                  <a16:creationId xmlns:a16="http://schemas.microsoft.com/office/drawing/2014/main" id="{DBA5EF45-8246-4288-8FCA-5B101233F25C}"/>
+                </a:ext>
+              </a:extLst>
+            </p:cNvPr>
+            <p:cNvSpPr/>
+            <p:nvPr/>
+          </p:nvSpPr>
+          <p:spPr>
+            <a:xfrm rot="5400000">
+              <a:off x="3014121" y="2595868"/>
+              <a:ext cx="184557" cy="1980000"/>
+            </a:xfrm>
+            <a:prstGeom prst="downArrow">
+              <a:avLst/>
+            </a:prstGeom>
+          </p:spPr>
+          <p:style>
+            <a:lnRef idx="2">
+              <a:schemeClr val="accent6">
+                <a:shade val="50000"/>
+              </a:schemeClr>
+            </a:lnRef>
+            <a:fillRef idx="1">
+              <a:schemeClr val="accent6"/>
+            </a:fillRef>
+            <a:effectRef idx="0">
+              <a:schemeClr val="accent6"/>
+            </a:effectRef>
+            <a:fontRef idx="minor">
+              <a:schemeClr val="lt1"/>
+            </a:fontRef>
+          </p:style>
+          <p:txBody>
+            <a:bodyPr rtlCol="0" anchor="ctr"/>
+            <a:lstStyle/>
+            <a:p>
+              <a:pPr algn="ctr"/>
+              <a:endParaRPr lang="en-GB"/>
+            </a:p>
+          </p:txBody>
+        </p:sp>
+      </p:grpSp>
+      <p:sp>
+        <p:nvSpPr>
+          <p:cNvPr id="26" name="Arrow: Down 25">
+            <a:extLst>
+              <a:ext uri="{FF2B5EF4-FFF2-40B4-BE49-F238E27FC236}">
+                <a16:creationId xmlns:a16="http://schemas.microsoft.com/office/drawing/2014/main" id="{9438C7B5-5486-42DE-8DFF-CE4E9D8CC744}"/>
+              </a:ext>
+            </a:extLst>
+          </p:cNvPr>
+          <p:cNvSpPr/>
+          <p:nvPr/>
+        </p:nvSpPr>
+        <p:spPr>
+          <a:xfrm>
+            <a:off x="7557070" y="1575631"/>
+            <a:ext cx="184557" cy="1368000"/>
+          </a:xfrm>
+          <a:prstGeom prst="downArrow">
+            <a:avLst/>
+          </a:prstGeom>
+        </p:spPr>
+        <p:style>
+          <a:lnRef idx="2">
+            <a:schemeClr val="accent3">
+              <a:shade val="50000"/>
+            </a:schemeClr>
+          </a:lnRef>
+          <a:fillRef idx="1">
+            <a:schemeClr val="accent3"/>
+          </a:fillRef>
+          <a:effectRef idx="0">
+            <a:schemeClr val="accent3"/>
+          </a:effectRef>
+          <a:fontRef idx="minor">
+            <a:schemeClr val="lt1"/>
+          </a:fontRef>
+        </p:style>
+        <p:txBody>
+          <a:bodyPr rtlCol="0" anchor="ctr"/>
+          <a:lstStyle/>
+          <a:p>
+            <a:pPr algn="ctr"/>
+            <a:endParaRPr lang="en-GB"/>
+          </a:p>
+        </p:txBody>
+      </p:sp>
+      <p:sp>
+        <p:nvSpPr>
+          <p:cNvPr id="29" name="TextBox 28">
+            <a:extLst>
+              <a:ext uri="{FF2B5EF4-FFF2-40B4-BE49-F238E27FC236}">
+                <a16:creationId xmlns:a16="http://schemas.microsoft.com/office/drawing/2014/main" id="{D9EAAE17-7900-4362-B8D1-9521389479CA}"/>
+              </a:ext>
+            </a:extLst>
+          </p:cNvPr>
+          <p:cNvSpPr txBox="1"/>
+          <p:nvPr/>
+        </p:nvSpPr>
+        <p:spPr>
+          <a:xfrm>
+            <a:off x="2446090" y="2912177"/>
+            <a:ext cx="1330036" cy="276999"/>
+          </a:xfrm>
+          <a:prstGeom prst="rect">
+            <a:avLst/>
+          </a:prstGeom>
+          <a:noFill/>
+        </p:spPr>
+        <p:txBody>
+          <a:bodyPr wrap="square" rtlCol="0">
+            <a:spAutoFit/>
+          </a:bodyPr>
+          <a:lstStyle/>
+          <a:p>
+            <a:r>
+              <a:rPr lang="en-GB" sz="1200" dirty="0"/>
+              <a:t>General recovery</a:t>
+            </a:r>
+          </a:p>
+        </p:txBody>
+      </p:sp>
+      <p:sp>
+        <p:nvSpPr>
+          <p:cNvPr id="30" name="TextBox 29">
+            <a:extLst>
+              <a:ext uri="{FF2B5EF4-FFF2-40B4-BE49-F238E27FC236}">
+                <a16:creationId xmlns:a16="http://schemas.microsoft.com/office/drawing/2014/main" id="{97E19624-929E-4A89-9E0B-26B16E360B06}"/>
+              </a:ext>
+            </a:extLst>
+          </p:cNvPr>
+          <p:cNvSpPr txBox="1"/>
+          <p:nvPr/>
+        </p:nvSpPr>
+        <p:spPr>
+          <a:xfrm>
+            <a:off x="2446090" y="3678147"/>
+            <a:ext cx="1330036" cy="461665"/>
+          </a:xfrm>
+          <a:prstGeom prst="rect">
+            <a:avLst/>
+          </a:prstGeom>
+          <a:noFill/>
+        </p:spPr>
+        <p:txBody>
+          <a:bodyPr wrap="square" rtlCol="0">
+            <a:spAutoFit/>
+          </a:bodyPr>
+          <a:lstStyle/>
+          <a:p>
+            <a:r>
+              <a:rPr lang="en-GB" sz="1200" dirty="0"/>
+              <a:t>Recovery due to treatment</a:t>
+            </a:r>
+          </a:p>
+        </p:txBody>
+      </p:sp>
+      <p:sp>
+        <p:nvSpPr>
+          <p:cNvPr id="31" name="TextBox 30">
+            <a:extLst>
+              <a:ext uri="{FF2B5EF4-FFF2-40B4-BE49-F238E27FC236}">
+                <a16:creationId xmlns:a16="http://schemas.microsoft.com/office/drawing/2014/main" id="{C20D2958-1744-4B48-98D9-08EC5942ADE1}"/>
+              </a:ext>
+            </a:extLst>
+          </p:cNvPr>
+          <p:cNvSpPr txBox="1"/>
+          <p:nvPr/>
+        </p:nvSpPr>
+        <p:spPr>
+          <a:xfrm>
+            <a:off x="4009402" y="3989762"/>
+            <a:ext cx="3357346" cy="1754326"/>
+          </a:xfrm>
+          <a:prstGeom prst="rect">
+            <a:avLst/>
+          </a:prstGeom>
+          <a:noFill/>
+        </p:spPr>
+        <p:txBody>
+          <a:bodyPr wrap="square" rtlCol="0">
+            <a:spAutoFit/>
+          </a:bodyPr>
+          <a:lstStyle/>
+          <a:p>
+            <a:r>
+              <a:rPr lang="en-GB" sz="1200" dirty="0"/>
+              <a:t>Mutations in the infection lead to a more resistant strain, which when treated with antibiotic #n+1 becomes the dominant strain, making the patient resistant to antibiotic #n+1</a:t>
+            </a:r>
+          </a:p>
+          <a:p>
+            <a:endParaRPr lang="en-GB" sz="1200" dirty="0"/>
+          </a:p>
+          <a:p>
+            <a:r>
+              <a:rPr lang="en-GB" sz="1200" dirty="0">
+                <a:solidFill>
+                  <a:srgbClr val="FF0000"/>
+                </a:solidFill>
+              </a:rPr>
+              <a:t>Conditional on patient being treated with antibiotic #n+1 whilst they have an infection (because of tiered approach, this will always be resistant to antibiotic #n)</a:t>
+            </a:r>
+          </a:p>
+        </p:txBody>
+      </p:sp>
+      <p:sp>
+        <p:nvSpPr>
+          <p:cNvPr id="32" name="TextBox 31">
+            <a:extLst>
+              <a:ext uri="{FF2B5EF4-FFF2-40B4-BE49-F238E27FC236}">
+                <a16:creationId xmlns:a16="http://schemas.microsoft.com/office/drawing/2014/main" id="{27688E74-4F83-4712-8984-606AD1819845}"/>
+              </a:ext>
+            </a:extLst>
+          </p:cNvPr>
+          <p:cNvSpPr txBox="1"/>
+          <p:nvPr/>
+        </p:nvSpPr>
+        <p:spPr>
+          <a:xfrm>
+            <a:off x="9226602" y="3041354"/>
+            <a:ext cx="577221" cy="276999"/>
+          </a:xfrm>
+          <a:prstGeom prst="rect">
+            <a:avLst/>
+          </a:prstGeom>
+          <a:noFill/>
+        </p:spPr>
+        <p:txBody>
+          <a:bodyPr wrap="square" rtlCol="0">
+            <a:spAutoFit/>
+          </a:bodyPr>
+          <a:lstStyle/>
+          <a:p>
+            <a:r>
+              <a:rPr lang="en-GB" sz="1200" dirty="0"/>
+              <a:t>Death</a:t>
+            </a:r>
+          </a:p>
+        </p:txBody>
+      </p:sp>
+      <p:sp>
+        <p:nvSpPr>
+          <p:cNvPr id="33" name="TextBox 32">
+            <a:extLst>
+              <a:ext uri="{FF2B5EF4-FFF2-40B4-BE49-F238E27FC236}">
+                <a16:creationId xmlns:a16="http://schemas.microsoft.com/office/drawing/2014/main" id="{2774D669-2C72-4B92-B7FC-0C6571FF7A1A}"/>
+              </a:ext>
+            </a:extLst>
+          </p:cNvPr>
+          <p:cNvSpPr txBox="1"/>
+          <p:nvPr/>
+        </p:nvSpPr>
+        <p:spPr>
+          <a:xfrm>
+            <a:off x="6319775" y="2589698"/>
+            <a:ext cx="844336" cy="276999"/>
+          </a:xfrm>
+          <a:prstGeom prst="rect">
+            <a:avLst/>
+          </a:prstGeom>
+          <a:noFill/>
+        </p:spPr>
+        <p:txBody>
+          <a:bodyPr wrap="square" rtlCol="0">
+            <a:spAutoFit/>
+          </a:bodyPr>
+          <a:lstStyle/>
+          <a:p>
+            <a:r>
+              <a:rPr lang="en-GB" sz="1200" dirty="0"/>
+              <a:t>No change</a:t>
+            </a:r>
+          </a:p>
+        </p:txBody>
+      </p:sp>
+      <p:sp>
+        <p:nvSpPr>
+          <p:cNvPr id="35" name="TextBox 34">
+            <a:extLst>
+              <a:ext uri="{FF2B5EF4-FFF2-40B4-BE49-F238E27FC236}">
+                <a16:creationId xmlns:a16="http://schemas.microsoft.com/office/drawing/2014/main" id="{F64E08EC-A559-41D9-8253-145FEAB18A8E}"/>
+              </a:ext>
+            </a:extLst>
+          </p:cNvPr>
+          <p:cNvSpPr txBox="1"/>
+          <p:nvPr/>
+        </p:nvSpPr>
+        <p:spPr>
+          <a:xfrm>
+            <a:off x="5831718" y="490053"/>
+            <a:ext cx="2959923" cy="1077218"/>
+          </a:xfrm>
+          <a:prstGeom prst="rect">
+            <a:avLst/>
+          </a:prstGeom>
+        </p:spPr>
+        <p:style>
+          <a:lnRef idx="2">
+            <a:schemeClr val="dk1"/>
+          </a:lnRef>
+          <a:fillRef idx="1">
+            <a:schemeClr val="lt1"/>
+          </a:fillRef>
+          <a:effectRef idx="0">
+            <a:schemeClr val="dk1"/>
+          </a:effectRef>
+          <a:fontRef idx="minor">
+            <a:schemeClr val="dk1"/>
+          </a:fontRef>
+        </p:style>
+        <p:txBody>
+          <a:bodyPr wrap="square" rtlCol="0">
+            <a:spAutoFit/>
+          </a:bodyPr>
+          <a:lstStyle/>
+          <a:p>
+            <a:r>
+              <a:rPr lang="en-GB" sz="3200" dirty="0"/>
+              <a:t>Uninfected, or lower resistance</a:t>
+            </a:r>
+          </a:p>
+        </p:txBody>
+      </p:sp>
+      <p:sp>
+        <p:nvSpPr>
+          <p:cNvPr id="36" name="TextBox 35">
+            <a:extLst>
+              <a:ext uri="{FF2B5EF4-FFF2-40B4-BE49-F238E27FC236}">
+                <a16:creationId xmlns:a16="http://schemas.microsoft.com/office/drawing/2014/main" id="{C277580A-A6BC-41F5-BBC5-9AE0F4ACB0D2}"/>
+              </a:ext>
+            </a:extLst>
+          </p:cNvPr>
+          <p:cNvSpPr txBox="1"/>
+          <p:nvPr/>
+        </p:nvSpPr>
+        <p:spPr>
+          <a:xfrm>
+            <a:off x="4017850" y="1177726"/>
+            <a:ext cx="844336" cy="276999"/>
+          </a:xfrm>
+          <a:prstGeom prst="rect">
+            <a:avLst/>
+          </a:prstGeom>
+          <a:noFill/>
+        </p:spPr>
+        <p:txBody>
+          <a:bodyPr wrap="square" rtlCol="0">
+            <a:spAutoFit/>
+          </a:bodyPr>
+          <a:lstStyle/>
+          <a:p>
+            <a:r>
+              <a:rPr lang="en-GB" sz="1200" dirty="0"/>
+              <a:t>Mutation</a:t>
+            </a:r>
+          </a:p>
+        </p:txBody>
+      </p:sp>
+      <p:sp>
+        <p:nvSpPr>
+          <p:cNvPr id="37" name="TextBox 36">
+            <a:extLst>
+              <a:ext uri="{FF2B5EF4-FFF2-40B4-BE49-F238E27FC236}">
+                <a16:creationId xmlns:a16="http://schemas.microsoft.com/office/drawing/2014/main" id="{3FD58809-8566-4DC9-8D40-54B2BD7FC9E2}"/>
+              </a:ext>
+            </a:extLst>
+          </p:cNvPr>
+          <p:cNvSpPr txBox="1"/>
+          <p:nvPr/>
+        </p:nvSpPr>
+        <p:spPr>
+          <a:xfrm>
+            <a:off x="6889511" y="1725627"/>
+            <a:ext cx="844336" cy="276999"/>
+          </a:xfrm>
+          <a:prstGeom prst="rect">
+            <a:avLst/>
+          </a:prstGeom>
+          <a:noFill/>
+        </p:spPr>
+        <p:txBody>
+          <a:bodyPr wrap="square" rtlCol="0">
+            <a:spAutoFit/>
+          </a:bodyPr>
+          <a:lstStyle/>
+          <a:p>
+            <a:r>
+              <a:rPr lang="en-GB" sz="1200" dirty="0"/>
+              <a:t>Spread</a:t>
+            </a:r>
+          </a:p>
+        </p:txBody>
+      </p:sp>
     </p:spTree>
     <p:extLst>
       <p:ext uri="{BB962C8B-B14F-4D97-AF65-F5344CB8AC3E}">
         <p14:creationId xmlns:p14="http://schemas.microsoft.com/office/powerpoint/2010/main" val="2804164490"/>
+      </p:ext>
+    </p:extLst>
+  </p:cSld>
+  <p:clrMapOvr>
+    <a:masterClrMapping/>
+  </p:clrMapOvr>
+</p:sld>
+</file>
+
+<file path=ppt/slides/slide3.xml><?xml version="1.0" encoding="utf-8"?>
+<p:sld xmlns:a="http://schemas.openxmlformats.org/drawingml/2006/main" xmlns:r="http://schemas.openxmlformats.org/officeDocument/2006/relationships" xmlns:p="http://schemas.openxmlformats.org/presentationml/2006/main">
+  <p:cSld>
+    <p:spTree>
+      <p:nvGrpSpPr>
+        <p:cNvPr id="1" name=""/>
+        <p:cNvGrpSpPr/>
+        <p:nvPr/>
+      </p:nvGrpSpPr>
+      <p:grpSpPr>
+        <a:xfrm>
+          <a:off x="0" y="0"/>
+          <a:ext cx="0" cy="0"/>
+          <a:chOff x="0" y="0"/>
+          <a:chExt cx="0" cy="0"/>
+        </a:xfrm>
+      </p:grpSpPr>
+      <p:sp>
+        <p:nvSpPr>
+          <p:cNvPr id="2" name="TextBox 1">
+            <a:extLst>
+              <a:ext uri="{FF2B5EF4-FFF2-40B4-BE49-F238E27FC236}">
+                <a16:creationId xmlns:a16="http://schemas.microsoft.com/office/drawing/2014/main" id="{3FEA28E3-FE67-4ED9-8C09-74055CB3C2B9}"/>
+              </a:ext>
+            </a:extLst>
+          </p:cNvPr>
+          <p:cNvSpPr txBox="1"/>
+          <p:nvPr/>
+        </p:nvSpPr>
+        <p:spPr>
+          <a:xfrm>
+            <a:off x="286626" y="209725"/>
+            <a:ext cx="1476462" cy="369332"/>
+          </a:xfrm>
+          <a:prstGeom prst="rect">
+            <a:avLst/>
+          </a:prstGeom>
+          <a:noFill/>
+        </p:spPr>
+        <p:txBody>
+          <a:bodyPr wrap="square" rtlCol="0">
+            <a:spAutoFit/>
+          </a:bodyPr>
+          <a:lstStyle/>
+          <a:p>
+            <a:r>
+              <a:rPr lang="en-GB" dirty="0"/>
+              <a:t>No treatment</a:t>
+            </a:r>
+          </a:p>
+        </p:txBody>
+      </p:sp>
+      <p:sp>
+        <p:nvSpPr>
+          <p:cNvPr id="3" name="TextBox 2">
+            <a:extLst>
+              <a:ext uri="{FF2B5EF4-FFF2-40B4-BE49-F238E27FC236}">
+                <a16:creationId xmlns:a16="http://schemas.microsoft.com/office/drawing/2014/main" id="{5A4DDDD9-1040-47F1-8557-B1270481944F}"/>
+              </a:ext>
+            </a:extLst>
+          </p:cNvPr>
+          <p:cNvSpPr txBox="1"/>
+          <p:nvPr/>
+        </p:nvSpPr>
+        <p:spPr>
+          <a:xfrm>
+            <a:off x="286626" y="1770076"/>
+            <a:ext cx="1476462" cy="369332"/>
+          </a:xfrm>
+          <a:prstGeom prst="rect">
+            <a:avLst/>
+          </a:prstGeom>
+          <a:noFill/>
+        </p:spPr>
+        <p:txBody>
+          <a:bodyPr wrap="square" rtlCol="0">
+            <a:spAutoFit/>
+          </a:bodyPr>
+          <a:lstStyle/>
+          <a:p>
+            <a:r>
+              <a:rPr lang="en-GB" dirty="0"/>
+              <a:t>Treatment #1</a:t>
+            </a:r>
+          </a:p>
+        </p:txBody>
+      </p:sp>
+      <p:sp>
+        <p:nvSpPr>
+          <p:cNvPr id="4" name="TextBox 3">
+            <a:extLst>
+              <a:ext uri="{FF2B5EF4-FFF2-40B4-BE49-F238E27FC236}">
+                <a16:creationId xmlns:a16="http://schemas.microsoft.com/office/drawing/2014/main" id="{50D67546-AD62-486C-815A-D7476CDB37F2}"/>
+              </a:ext>
+            </a:extLst>
+          </p:cNvPr>
+          <p:cNvSpPr txBox="1"/>
+          <p:nvPr/>
+        </p:nvSpPr>
+        <p:spPr>
+          <a:xfrm>
+            <a:off x="286626" y="3523376"/>
+            <a:ext cx="1476462" cy="369332"/>
+          </a:xfrm>
+          <a:prstGeom prst="rect">
+            <a:avLst/>
+          </a:prstGeom>
+          <a:noFill/>
+        </p:spPr>
+        <p:txBody>
+          <a:bodyPr wrap="square" rtlCol="0">
+            <a:spAutoFit/>
+          </a:bodyPr>
+          <a:lstStyle/>
+          <a:p>
+            <a:r>
+              <a:rPr lang="en-GB" dirty="0"/>
+              <a:t>Treatment #2</a:t>
+            </a:r>
+          </a:p>
+        </p:txBody>
+      </p:sp>
+      <p:sp>
+        <p:nvSpPr>
+          <p:cNvPr id="5" name="TextBox 4">
+            <a:extLst>
+              <a:ext uri="{FF2B5EF4-FFF2-40B4-BE49-F238E27FC236}">
+                <a16:creationId xmlns:a16="http://schemas.microsoft.com/office/drawing/2014/main" id="{19D7719A-B1D8-480E-8667-D0780DC5160D}"/>
+              </a:ext>
+            </a:extLst>
+          </p:cNvPr>
+          <p:cNvSpPr txBox="1"/>
+          <p:nvPr/>
+        </p:nvSpPr>
+        <p:spPr>
+          <a:xfrm>
+            <a:off x="286626" y="5271082"/>
+            <a:ext cx="1476462" cy="369332"/>
+          </a:xfrm>
+          <a:prstGeom prst="rect">
+            <a:avLst/>
+          </a:prstGeom>
+          <a:noFill/>
+        </p:spPr>
+        <p:txBody>
+          <a:bodyPr wrap="square" rtlCol="0">
+            <a:spAutoFit/>
+          </a:bodyPr>
+          <a:lstStyle/>
+          <a:p>
+            <a:r>
+              <a:rPr lang="en-GB" dirty="0"/>
+              <a:t>Treatment #3</a:t>
+            </a:r>
+          </a:p>
+        </p:txBody>
+      </p:sp>
+      <p:cxnSp>
+        <p:nvCxnSpPr>
+          <p:cNvPr id="7" name="Straight Connector 6">
+            <a:extLst>
+              <a:ext uri="{FF2B5EF4-FFF2-40B4-BE49-F238E27FC236}">
+                <a16:creationId xmlns:a16="http://schemas.microsoft.com/office/drawing/2014/main" id="{7E341164-FF5B-4B31-A20D-17B90789557E}"/>
+              </a:ext>
+            </a:extLst>
+          </p:cNvPr>
+          <p:cNvCxnSpPr>
+            <a:cxnSpLocks/>
+          </p:cNvCxnSpPr>
+          <p:nvPr/>
+        </p:nvCxnSpPr>
+        <p:spPr>
+          <a:xfrm>
+            <a:off x="176169" y="209725"/>
+            <a:ext cx="11660697" cy="0"/>
+          </a:xfrm>
+          <a:prstGeom prst="line">
+            <a:avLst/>
+          </a:prstGeom>
+          <a:ln w="38100"/>
+        </p:spPr>
+        <p:style>
+          <a:lnRef idx="1">
+            <a:schemeClr val="dk1"/>
+          </a:lnRef>
+          <a:fillRef idx="0">
+            <a:schemeClr val="dk1"/>
+          </a:fillRef>
+          <a:effectRef idx="0">
+            <a:schemeClr val="dk1"/>
+          </a:effectRef>
+          <a:fontRef idx="minor">
+            <a:schemeClr val="tx1"/>
+          </a:fontRef>
+        </p:style>
+      </p:cxnSp>
+      <p:cxnSp>
+        <p:nvCxnSpPr>
+          <p:cNvPr id="9" name="Straight Connector 8">
+            <a:extLst>
+              <a:ext uri="{FF2B5EF4-FFF2-40B4-BE49-F238E27FC236}">
+                <a16:creationId xmlns:a16="http://schemas.microsoft.com/office/drawing/2014/main" id="{DC919279-1F33-4661-B482-EDBBFA33CDFB}"/>
+              </a:ext>
+            </a:extLst>
+          </p:cNvPr>
+          <p:cNvCxnSpPr>
+            <a:cxnSpLocks/>
+          </p:cNvCxnSpPr>
+          <p:nvPr/>
+        </p:nvCxnSpPr>
+        <p:spPr>
+          <a:xfrm>
+            <a:off x="176169" y="1770076"/>
+            <a:ext cx="11660697" cy="0"/>
+          </a:xfrm>
+          <a:prstGeom prst="line">
+            <a:avLst/>
+          </a:prstGeom>
+          <a:ln w="38100"/>
+        </p:spPr>
+        <p:style>
+          <a:lnRef idx="1">
+            <a:schemeClr val="dk1"/>
+          </a:lnRef>
+          <a:fillRef idx="0">
+            <a:schemeClr val="dk1"/>
+          </a:fillRef>
+          <a:effectRef idx="0">
+            <a:schemeClr val="dk1"/>
+          </a:effectRef>
+          <a:fontRef idx="minor">
+            <a:schemeClr val="tx1"/>
+          </a:fontRef>
+        </p:style>
+      </p:cxnSp>
+      <p:cxnSp>
+        <p:nvCxnSpPr>
+          <p:cNvPr id="10" name="Straight Connector 9">
+            <a:extLst>
+              <a:ext uri="{FF2B5EF4-FFF2-40B4-BE49-F238E27FC236}">
+                <a16:creationId xmlns:a16="http://schemas.microsoft.com/office/drawing/2014/main" id="{5EFEE9D4-27E2-4DCD-8F2A-2939E4FD33BA}"/>
+              </a:ext>
+            </a:extLst>
+          </p:cNvPr>
+          <p:cNvCxnSpPr>
+            <a:cxnSpLocks/>
+          </p:cNvCxnSpPr>
+          <p:nvPr/>
+        </p:nvCxnSpPr>
+        <p:spPr>
+          <a:xfrm>
+            <a:off x="265651" y="3491217"/>
+            <a:ext cx="11660697" cy="0"/>
+          </a:xfrm>
+          <a:prstGeom prst="line">
+            <a:avLst/>
+          </a:prstGeom>
+          <a:ln w="38100"/>
+        </p:spPr>
+        <p:style>
+          <a:lnRef idx="1">
+            <a:schemeClr val="dk1"/>
+          </a:lnRef>
+          <a:fillRef idx="0">
+            <a:schemeClr val="dk1"/>
+          </a:fillRef>
+          <a:effectRef idx="0">
+            <a:schemeClr val="dk1"/>
+          </a:effectRef>
+          <a:fontRef idx="minor">
+            <a:schemeClr val="tx1"/>
+          </a:fontRef>
+        </p:style>
+      </p:cxnSp>
+      <p:cxnSp>
+        <p:nvCxnSpPr>
+          <p:cNvPr id="11" name="Straight Connector 10">
+            <a:extLst>
+              <a:ext uri="{FF2B5EF4-FFF2-40B4-BE49-F238E27FC236}">
+                <a16:creationId xmlns:a16="http://schemas.microsoft.com/office/drawing/2014/main" id="{5D8DCF07-0E6E-4E84-AC81-6BEA33E217F7}"/>
+              </a:ext>
+            </a:extLst>
+          </p:cNvPr>
+          <p:cNvCxnSpPr>
+            <a:cxnSpLocks/>
+          </p:cNvCxnSpPr>
+          <p:nvPr/>
+        </p:nvCxnSpPr>
+        <p:spPr>
+          <a:xfrm>
+            <a:off x="265650" y="5271082"/>
+            <a:ext cx="11660697" cy="0"/>
+          </a:xfrm>
+          <a:prstGeom prst="line">
+            <a:avLst/>
+          </a:prstGeom>
+          <a:ln w="38100"/>
+        </p:spPr>
+        <p:style>
+          <a:lnRef idx="1">
+            <a:schemeClr val="dk1"/>
+          </a:lnRef>
+          <a:fillRef idx="0">
+            <a:schemeClr val="dk1"/>
+          </a:fillRef>
+          <a:effectRef idx="0">
+            <a:schemeClr val="dk1"/>
+          </a:effectRef>
+          <a:fontRef idx="minor">
+            <a:schemeClr val="tx1"/>
+          </a:fontRef>
+        </p:style>
+      </p:cxnSp>
+      <p:cxnSp>
+        <p:nvCxnSpPr>
+          <p:cNvPr id="12" name="Straight Connector 11">
+            <a:extLst>
+              <a:ext uri="{FF2B5EF4-FFF2-40B4-BE49-F238E27FC236}">
+                <a16:creationId xmlns:a16="http://schemas.microsoft.com/office/drawing/2014/main" id="{E6541F2A-C13C-46C2-8D7E-FC0235D60111}"/>
+              </a:ext>
+            </a:extLst>
+          </p:cNvPr>
+          <p:cNvCxnSpPr>
+            <a:cxnSpLocks/>
+          </p:cNvCxnSpPr>
+          <p:nvPr/>
+        </p:nvCxnSpPr>
+        <p:spPr>
+          <a:xfrm flipH="1">
+            <a:off x="1763088" y="77598"/>
+            <a:ext cx="32165" cy="6709096"/>
+          </a:xfrm>
+          <a:prstGeom prst="line">
+            <a:avLst/>
+          </a:prstGeom>
+          <a:ln w="38100"/>
+        </p:spPr>
+        <p:style>
+          <a:lnRef idx="1">
+            <a:schemeClr val="dk1"/>
+          </a:lnRef>
+          <a:fillRef idx="0">
+            <a:schemeClr val="dk1"/>
+          </a:fillRef>
+          <a:effectRef idx="0">
+            <a:schemeClr val="dk1"/>
+          </a:effectRef>
+          <a:fontRef idx="minor">
+            <a:schemeClr val="tx1"/>
+          </a:fontRef>
+        </p:style>
+      </p:cxnSp>
+      <p:sp>
+        <p:nvSpPr>
+          <p:cNvPr id="18" name="TextBox 17">
+            <a:extLst>
+              <a:ext uri="{FF2B5EF4-FFF2-40B4-BE49-F238E27FC236}">
+                <a16:creationId xmlns:a16="http://schemas.microsoft.com/office/drawing/2014/main" id="{8B929D5B-1B68-49FB-8E25-7B1B64B786E7}"/>
+              </a:ext>
+            </a:extLst>
+          </p:cNvPr>
+          <p:cNvSpPr txBox="1"/>
+          <p:nvPr/>
+        </p:nvSpPr>
+        <p:spPr>
+          <a:xfrm>
+            <a:off x="2409434" y="805127"/>
+            <a:ext cx="1346390" cy="369332"/>
+          </a:xfrm>
+          <a:prstGeom prst="rect">
+            <a:avLst/>
+          </a:prstGeom>
+        </p:spPr>
+        <p:style>
+          <a:lnRef idx="2">
+            <a:schemeClr val="dk1"/>
+          </a:lnRef>
+          <a:fillRef idx="1">
+            <a:schemeClr val="lt1"/>
+          </a:fillRef>
+          <a:effectRef idx="0">
+            <a:schemeClr val="dk1"/>
+          </a:effectRef>
+          <a:fontRef idx="minor">
+            <a:schemeClr val="dk1"/>
+          </a:fontRef>
+        </p:style>
+        <p:txBody>
+          <a:bodyPr wrap="square" rtlCol="0">
+            <a:spAutoFit/>
+          </a:bodyPr>
+          <a:lstStyle/>
+          <a:p>
+            <a:r>
+              <a:rPr lang="en-GB" dirty="0"/>
+              <a:t>Not infected</a:t>
+            </a:r>
+          </a:p>
+        </p:txBody>
+      </p:sp>
+      <p:sp>
+        <p:nvSpPr>
+          <p:cNvPr id="19" name="TextBox 18">
+            <a:extLst>
+              <a:ext uri="{FF2B5EF4-FFF2-40B4-BE49-F238E27FC236}">
+                <a16:creationId xmlns:a16="http://schemas.microsoft.com/office/drawing/2014/main" id="{00A5EB57-E76A-4BE1-A280-00C15006FB71}"/>
+              </a:ext>
+            </a:extLst>
+          </p:cNvPr>
+          <p:cNvSpPr txBox="1"/>
+          <p:nvPr/>
+        </p:nvSpPr>
+        <p:spPr>
+          <a:xfrm>
+            <a:off x="4874001" y="632507"/>
+            <a:ext cx="1521868" cy="646331"/>
+          </a:xfrm>
+          <a:prstGeom prst="rect">
+            <a:avLst/>
+          </a:prstGeom>
+        </p:spPr>
+        <p:style>
+          <a:lnRef idx="2">
+            <a:schemeClr val="dk1"/>
+          </a:lnRef>
+          <a:fillRef idx="1">
+            <a:schemeClr val="lt1"/>
+          </a:fillRef>
+          <a:effectRef idx="0">
+            <a:schemeClr val="dk1"/>
+          </a:effectRef>
+          <a:fontRef idx="minor">
+            <a:schemeClr val="dk1"/>
+          </a:fontRef>
+        </p:style>
+        <p:txBody>
+          <a:bodyPr wrap="square" rtlCol="0">
+            <a:spAutoFit/>
+          </a:bodyPr>
+          <a:lstStyle/>
+          <a:p>
+            <a:r>
+              <a:rPr lang="en-GB" dirty="0"/>
+              <a:t>Infected with any resistance</a:t>
+            </a:r>
+          </a:p>
+        </p:txBody>
+      </p:sp>
+      <p:sp>
+        <p:nvSpPr>
+          <p:cNvPr id="20" name="TextBox 19">
+            <a:extLst>
+              <a:ext uri="{FF2B5EF4-FFF2-40B4-BE49-F238E27FC236}">
+                <a16:creationId xmlns:a16="http://schemas.microsoft.com/office/drawing/2014/main" id="{4F7C8E68-BD17-440D-A3D3-CF2B3379AFBB}"/>
+              </a:ext>
+            </a:extLst>
+          </p:cNvPr>
+          <p:cNvSpPr txBox="1"/>
+          <p:nvPr/>
+        </p:nvSpPr>
+        <p:spPr>
+          <a:xfrm>
+            <a:off x="7514046" y="757615"/>
+            <a:ext cx="961257" cy="369332"/>
+          </a:xfrm>
+          <a:prstGeom prst="rect">
+            <a:avLst/>
+          </a:prstGeom>
+        </p:spPr>
+        <p:style>
+          <a:lnRef idx="2">
+            <a:schemeClr val="dk1"/>
+          </a:lnRef>
+          <a:fillRef idx="1">
+            <a:schemeClr val="lt1"/>
+          </a:fillRef>
+          <a:effectRef idx="0">
+            <a:schemeClr val="dk1"/>
+          </a:effectRef>
+          <a:fontRef idx="minor">
+            <a:schemeClr val="dk1"/>
+          </a:fontRef>
+        </p:style>
+        <p:txBody>
+          <a:bodyPr wrap="square" rtlCol="0">
+            <a:spAutoFit/>
+          </a:bodyPr>
+          <a:lstStyle/>
+          <a:p>
+            <a:r>
+              <a:rPr lang="en-GB" dirty="0"/>
+              <a:t>Immune</a:t>
+            </a:r>
+          </a:p>
+        </p:txBody>
+      </p:sp>
+      <p:sp>
+        <p:nvSpPr>
+          <p:cNvPr id="21" name="TextBox 20">
+            <a:extLst>
+              <a:ext uri="{FF2B5EF4-FFF2-40B4-BE49-F238E27FC236}">
+                <a16:creationId xmlns:a16="http://schemas.microsoft.com/office/drawing/2014/main" id="{79B23F9E-017F-4709-9F42-A3F07F86C300}"/>
+              </a:ext>
+            </a:extLst>
+          </p:cNvPr>
+          <p:cNvSpPr txBox="1"/>
+          <p:nvPr/>
+        </p:nvSpPr>
+        <p:spPr>
+          <a:xfrm>
+            <a:off x="9593480" y="771006"/>
+            <a:ext cx="683023" cy="369332"/>
+          </a:xfrm>
+          <a:prstGeom prst="rect">
+            <a:avLst/>
+          </a:prstGeom>
+        </p:spPr>
+        <p:style>
+          <a:lnRef idx="2">
+            <a:schemeClr val="dk1"/>
+          </a:lnRef>
+          <a:fillRef idx="1">
+            <a:schemeClr val="lt1"/>
+          </a:fillRef>
+          <a:effectRef idx="0">
+            <a:schemeClr val="dk1"/>
+          </a:effectRef>
+          <a:fontRef idx="minor">
+            <a:schemeClr val="dk1"/>
+          </a:fontRef>
+        </p:style>
+        <p:txBody>
+          <a:bodyPr wrap="square" rtlCol="0">
+            <a:spAutoFit/>
+          </a:bodyPr>
+          <a:lstStyle/>
+          <a:p>
+            <a:r>
+              <a:rPr lang="en-GB" dirty="0"/>
+              <a:t>Dead</a:t>
+            </a:r>
+          </a:p>
+        </p:txBody>
+      </p:sp>
+      <p:sp>
+        <p:nvSpPr>
+          <p:cNvPr id="24" name="TextBox 23">
+            <a:extLst>
+              <a:ext uri="{FF2B5EF4-FFF2-40B4-BE49-F238E27FC236}">
+                <a16:creationId xmlns:a16="http://schemas.microsoft.com/office/drawing/2014/main" id="{302302FB-423B-4D47-B132-5ED0725804BA}"/>
+              </a:ext>
+            </a:extLst>
+          </p:cNvPr>
+          <p:cNvSpPr txBox="1"/>
+          <p:nvPr/>
+        </p:nvSpPr>
+        <p:spPr>
+          <a:xfrm>
+            <a:off x="4925000" y="2457083"/>
+            <a:ext cx="1445703" cy="369332"/>
+          </a:xfrm>
+          <a:prstGeom prst="rect">
+            <a:avLst/>
+          </a:prstGeom>
+        </p:spPr>
+        <p:style>
+          <a:lnRef idx="2">
+            <a:schemeClr val="dk1"/>
+          </a:lnRef>
+          <a:fillRef idx="1">
+            <a:schemeClr val="lt1"/>
+          </a:fillRef>
+          <a:effectRef idx="0">
+            <a:schemeClr val="dk1"/>
+          </a:effectRef>
+          <a:fontRef idx="minor">
+            <a:schemeClr val="dk1"/>
+          </a:fontRef>
+        </p:style>
+        <p:txBody>
+          <a:bodyPr wrap="square" rtlCol="0">
+            <a:spAutoFit/>
+          </a:bodyPr>
+          <a:lstStyle/>
+          <a:p>
+            <a:r>
+              <a:rPr lang="en-GB" dirty="0"/>
+              <a:t>Resistance #2</a:t>
+            </a:r>
+          </a:p>
+        </p:txBody>
+      </p:sp>
+      <p:sp>
+        <p:nvSpPr>
+          <p:cNvPr id="25" name="TextBox 24">
+            <a:extLst>
+              <a:ext uri="{FF2B5EF4-FFF2-40B4-BE49-F238E27FC236}">
+                <a16:creationId xmlns:a16="http://schemas.microsoft.com/office/drawing/2014/main" id="{2AE8ACEB-3D62-47E3-A31E-94BC622FC486}"/>
+              </a:ext>
+            </a:extLst>
+          </p:cNvPr>
+          <p:cNvSpPr txBox="1"/>
+          <p:nvPr/>
+        </p:nvSpPr>
+        <p:spPr>
+          <a:xfrm>
+            <a:off x="6839842" y="2457083"/>
+            <a:ext cx="1445703" cy="369332"/>
+          </a:xfrm>
+          <a:prstGeom prst="rect">
+            <a:avLst/>
+          </a:prstGeom>
+        </p:spPr>
+        <p:style>
+          <a:lnRef idx="2">
+            <a:schemeClr val="dk1"/>
+          </a:lnRef>
+          <a:fillRef idx="1">
+            <a:schemeClr val="lt1"/>
+          </a:fillRef>
+          <a:effectRef idx="0">
+            <a:schemeClr val="dk1"/>
+          </a:effectRef>
+          <a:fontRef idx="minor">
+            <a:schemeClr val="dk1"/>
+          </a:fontRef>
+        </p:style>
+        <p:txBody>
+          <a:bodyPr wrap="square" rtlCol="0">
+            <a:spAutoFit/>
+          </a:bodyPr>
+          <a:lstStyle/>
+          <a:p>
+            <a:r>
+              <a:rPr lang="en-GB" dirty="0"/>
+              <a:t>Resistance #3</a:t>
+            </a:r>
+          </a:p>
+        </p:txBody>
+      </p:sp>
+      <p:sp>
+        <p:nvSpPr>
+          <p:cNvPr id="26" name="TextBox 25">
+            <a:extLst>
+              <a:ext uri="{FF2B5EF4-FFF2-40B4-BE49-F238E27FC236}">
+                <a16:creationId xmlns:a16="http://schemas.microsoft.com/office/drawing/2014/main" id="{D63088A7-7F9C-4C57-BD3B-EA5EAF452BCD}"/>
+              </a:ext>
+            </a:extLst>
+          </p:cNvPr>
+          <p:cNvSpPr txBox="1"/>
+          <p:nvPr/>
+        </p:nvSpPr>
+        <p:spPr>
+          <a:xfrm>
+            <a:off x="4925000" y="4139858"/>
+            <a:ext cx="1467310" cy="369332"/>
+          </a:xfrm>
+          <a:prstGeom prst="rect">
+            <a:avLst/>
+          </a:prstGeom>
+        </p:spPr>
+        <p:style>
+          <a:lnRef idx="2">
+            <a:schemeClr val="dk1"/>
+          </a:lnRef>
+          <a:fillRef idx="1">
+            <a:schemeClr val="lt1"/>
+          </a:fillRef>
+          <a:effectRef idx="0">
+            <a:schemeClr val="dk1"/>
+          </a:effectRef>
+          <a:fontRef idx="minor">
+            <a:schemeClr val="dk1"/>
+          </a:fontRef>
+        </p:style>
+        <p:txBody>
+          <a:bodyPr wrap="square" rtlCol="0">
+            <a:spAutoFit/>
+          </a:bodyPr>
+          <a:lstStyle/>
+          <a:p>
+            <a:r>
+              <a:rPr lang="en-GB" dirty="0"/>
+              <a:t>Resistance #2</a:t>
+            </a:r>
+          </a:p>
+        </p:txBody>
+      </p:sp>
+      <p:sp>
+        <p:nvSpPr>
+          <p:cNvPr id="28" name="TextBox 27">
+            <a:extLst>
+              <a:ext uri="{FF2B5EF4-FFF2-40B4-BE49-F238E27FC236}">
+                <a16:creationId xmlns:a16="http://schemas.microsoft.com/office/drawing/2014/main" id="{A2C4D285-5419-4842-81DF-66CBE47CB2A5}"/>
+              </a:ext>
+            </a:extLst>
+          </p:cNvPr>
+          <p:cNvSpPr txBox="1"/>
+          <p:nvPr/>
+        </p:nvSpPr>
+        <p:spPr>
+          <a:xfrm>
+            <a:off x="6839842" y="4139858"/>
+            <a:ext cx="1445703" cy="369332"/>
+          </a:xfrm>
+          <a:prstGeom prst="rect">
+            <a:avLst/>
+          </a:prstGeom>
+        </p:spPr>
+        <p:style>
+          <a:lnRef idx="2">
+            <a:schemeClr val="dk1"/>
+          </a:lnRef>
+          <a:fillRef idx="1">
+            <a:schemeClr val="lt1"/>
+          </a:fillRef>
+          <a:effectRef idx="0">
+            <a:schemeClr val="dk1"/>
+          </a:effectRef>
+          <a:fontRef idx="minor">
+            <a:schemeClr val="dk1"/>
+          </a:fontRef>
+        </p:style>
+        <p:txBody>
+          <a:bodyPr wrap="square" rtlCol="0">
+            <a:spAutoFit/>
+          </a:bodyPr>
+          <a:lstStyle/>
+          <a:p>
+            <a:r>
+              <a:rPr lang="en-GB" dirty="0"/>
+              <a:t>Resistance #3</a:t>
+            </a:r>
+          </a:p>
+        </p:txBody>
+      </p:sp>
+      <p:sp>
+        <p:nvSpPr>
+          <p:cNvPr id="33" name="TextBox 32">
+            <a:extLst>
+              <a:ext uri="{FF2B5EF4-FFF2-40B4-BE49-F238E27FC236}">
+                <a16:creationId xmlns:a16="http://schemas.microsoft.com/office/drawing/2014/main" id="{33F67601-F182-4CB3-BE5C-20807FC41A71}"/>
+              </a:ext>
+            </a:extLst>
+          </p:cNvPr>
+          <p:cNvSpPr txBox="1"/>
+          <p:nvPr/>
+        </p:nvSpPr>
+        <p:spPr>
+          <a:xfrm>
+            <a:off x="6839842" y="5844222"/>
+            <a:ext cx="1445703" cy="369332"/>
+          </a:xfrm>
+          <a:prstGeom prst="rect">
+            <a:avLst/>
+          </a:prstGeom>
+        </p:spPr>
+        <p:style>
+          <a:lnRef idx="2">
+            <a:schemeClr val="dk1"/>
+          </a:lnRef>
+          <a:fillRef idx="1">
+            <a:schemeClr val="lt1"/>
+          </a:fillRef>
+          <a:effectRef idx="0">
+            <a:schemeClr val="dk1"/>
+          </a:effectRef>
+          <a:fontRef idx="minor">
+            <a:schemeClr val="dk1"/>
+          </a:fontRef>
+        </p:style>
+        <p:txBody>
+          <a:bodyPr wrap="square" rtlCol="0">
+            <a:spAutoFit/>
+          </a:bodyPr>
+          <a:lstStyle/>
+          <a:p>
+            <a:r>
+              <a:rPr lang="en-GB" dirty="0"/>
+              <a:t>Resistance #3</a:t>
+            </a:r>
+          </a:p>
+        </p:txBody>
+      </p:sp>
+      <p:sp>
+        <p:nvSpPr>
+          <p:cNvPr id="34" name="TextBox 33">
+            <a:extLst>
+              <a:ext uri="{FF2B5EF4-FFF2-40B4-BE49-F238E27FC236}">
+                <a16:creationId xmlns:a16="http://schemas.microsoft.com/office/drawing/2014/main" id="{EB378E91-F421-4D06-8D4E-67A9A04EDDEB}"/>
+              </a:ext>
+            </a:extLst>
+          </p:cNvPr>
+          <p:cNvSpPr txBox="1"/>
+          <p:nvPr/>
+        </p:nvSpPr>
+        <p:spPr>
+          <a:xfrm>
+            <a:off x="3010158" y="2457083"/>
+            <a:ext cx="1445703" cy="369332"/>
+          </a:xfrm>
+          <a:prstGeom prst="rect">
+            <a:avLst/>
+          </a:prstGeom>
+        </p:spPr>
+        <p:style>
+          <a:lnRef idx="2">
+            <a:schemeClr val="dk1"/>
+          </a:lnRef>
+          <a:fillRef idx="1">
+            <a:schemeClr val="lt1"/>
+          </a:fillRef>
+          <a:effectRef idx="0">
+            <a:schemeClr val="dk1"/>
+          </a:effectRef>
+          <a:fontRef idx="minor">
+            <a:schemeClr val="dk1"/>
+          </a:fontRef>
+        </p:style>
+        <p:txBody>
+          <a:bodyPr wrap="square" rtlCol="0">
+            <a:spAutoFit/>
+          </a:bodyPr>
+          <a:lstStyle/>
+          <a:p>
+            <a:r>
+              <a:rPr lang="en-GB" dirty="0"/>
+              <a:t>Resistance #1</a:t>
+            </a:r>
+          </a:p>
+        </p:txBody>
+      </p:sp>
+    </p:spTree>
+    <p:extLst>
+      <p:ext uri="{BB962C8B-B14F-4D97-AF65-F5344CB8AC3E}">
+        <p14:creationId xmlns:p14="http://schemas.microsoft.com/office/powerpoint/2010/main" val="370177812"/>
       </p:ext>
     </p:extLst>
   </p:cSld>

</xml_diff>

<commit_message>
Added powerpoint now including isolation on diagrams, and code sections split up for explanation
</commit_message>
<xml_diff>
--- a/Resistance_Model_Diagram.pptx
+++ b/Resistance_Model_Diagram.pptx
@@ -5,9 +5,15 @@
     <p:sldMasterId id="2147483648" r:id="rId1"/>
   </p:sldMasterIdLst>
   <p:sldIdLst>
-    <p:sldId id="256" r:id="rId2"/>
-    <p:sldId id="257" r:id="rId3"/>
-    <p:sldId id="258" r:id="rId4"/>
+    <p:sldId id="259" r:id="rId2"/>
+    <p:sldId id="260" r:id="rId3"/>
+    <p:sldId id="261" r:id="rId4"/>
+    <p:sldId id="262" r:id="rId5"/>
+    <p:sldId id="263" r:id="rId6"/>
+    <p:sldId id="264" r:id="rId7"/>
+    <p:sldId id="256" r:id="rId8"/>
+    <p:sldId id="257" r:id="rId9"/>
+    <p:sldId id="258" r:id="rId10"/>
   </p:sldIdLst>
   <p:sldSz cx="12192000" cy="6858000"/>
   <p:notesSz cx="6858000" cy="9144000"/>
@@ -263,7 +269,7 @@
           <a:p>
             <a:fld id="{40BAFBEF-7E3E-4FB3-826B-F29C51A86206}" type="datetimeFigureOut">
               <a:rPr lang="en-GB" smtClean="0"/>
-              <a:t>27/08/2021</a:t>
+              <a:t>16/09/2021</a:t>
             </a:fld>
             <a:endParaRPr lang="en-GB"/>
           </a:p>
@@ -463,7 +469,7 @@
           <a:p>
             <a:fld id="{40BAFBEF-7E3E-4FB3-826B-F29C51A86206}" type="datetimeFigureOut">
               <a:rPr lang="en-GB" smtClean="0"/>
-              <a:t>27/08/2021</a:t>
+              <a:t>16/09/2021</a:t>
             </a:fld>
             <a:endParaRPr lang="en-GB"/>
           </a:p>
@@ -673,7 +679,7 @@
           <a:p>
             <a:fld id="{40BAFBEF-7E3E-4FB3-826B-F29C51A86206}" type="datetimeFigureOut">
               <a:rPr lang="en-GB" smtClean="0"/>
-              <a:t>27/08/2021</a:t>
+              <a:t>16/09/2021</a:t>
             </a:fld>
             <a:endParaRPr lang="en-GB"/>
           </a:p>
@@ -873,7 +879,7 @@
           <a:p>
             <a:fld id="{40BAFBEF-7E3E-4FB3-826B-F29C51A86206}" type="datetimeFigureOut">
               <a:rPr lang="en-GB" smtClean="0"/>
-              <a:t>27/08/2021</a:t>
+              <a:t>16/09/2021</a:t>
             </a:fld>
             <a:endParaRPr lang="en-GB"/>
           </a:p>
@@ -1149,7 +1155,7 @@
           <a:p>
             <a:fld id="{40BAFBEF-7E3E-4FB3-826B-F29C51A86206}" type="datetimeFigureOut">
               <a:rPr lang="en-GB" smtClean="0"/>
-              <a:t>27/08/2021</a:t>
+              <a:t>16/09/2021</a:t>
             </a:fld>
             <a:endParaRPr lang="en-GB"/>
           </a:p>
@@ -1417,7 +1423,7 @@
           <a:p>
             <a:fld id="{40BAFBEF-7E3E-4FB3-826B-F29C51A86206}" type="datetimeFigureOut">
               <a:rPr lang="en-GB" smtClean="0"/>
-              <a:t>27/08/2021</a:t>
+              <a:t>16/09/2021</a:t>
             </a:fld>
             <a:endParaRPr lang="en-GB"/>
           </a:p>
@@ -1832,7 +1838,7 @@
           <a:p>
             <a:fld id="{40BAFBEF-7E3E-4FB3-826B-F29C51A86206}" type="datetimeFigureOut">
               <a:rPr lang="en-GB" smtClean="0"/>
-              <a:t>27/08/2021</a:t>
+              <a:t>16/09/2021</a:t>
             </a:fld>
             <a:endParaRPr lang="en-GB"/>
           </a:p>
@@ -1974,7 +1980,7 @@
           <a:p>
             <a:fld id="{40BAFBEF-7E3E-4FB3-826B-F29C51A86206}" type="datetimeFigureOut">
               <a:rPr lang="en-GB" smtClean="0"/>
-              <a:t>27/08/2021</a:t>
+              <a:t>16/09/2021</a:t>
             </a:fld>
             <a:endParaRPr lang="en-GB"/>
           </a:p>
@@ -2087,7 +2093,7 @@
           <a:p>
             <a:fld id="{40BAFBEF-7E3E-4FB3-826B-F29C51A86206}" type="datetimeFigureOut">
               <a:rPr lang="en-GB" smtClean="0"/>
-              <a:t>27/08/2021</a:t>
+              <a:t>16/09/2021</a:t>
             </a:fld>
             <a:endParaRPr lang="en-GB"/>
           </a:p>
@@ -2400,7 +2406,7 @@
           <a:p>
             <a:fld id="{40BAFBEF-7E3E-4FB3-826B-F29C51A86206}" type="datetimeFigureOut">
               <a:rPr lang="en-GB" smtClean="0"/>
-              <a:t>27/08/2021</a:t>
+              <a:t>16/09/2021</a:t>
             </a:fld>
             <a:endParaRPr lang="en-GB"/>
           </a:p>
@@ -2689,7 +2695,7 @@
           <a:p>
             <a:fld id="{40BAFBEF-7E3E-4FB3-826B-F29C51A86206}" type="datetimeFigureOut">
               <a:rPr lang="en-GB" smtClean="0"/>
-              <a:t>27/08/2021</a:t>
+              <a:t>16/09/2021</a:t>
             </a:fld>
             <a:endParaRPr lang="en-GB"/>
           </a:p>
@@ -2932,7 +2938,7 @@
           <a:p>
             <a:fld id="{40BAFBEF-7E3E-4FB3-826B-F29C51A86206}" type="datetimeFigureOut">
               <a:rPr lang="en-GB" smtClean="0"/>
-              <a:t>27/08/2021</a:t>
+              <a:t>16/09/2021</a:t>
             </a:fld>
             <a:endParaRPr lang="en-GB"/>
           </a:p>
@@ -3333,6 +3339,606 @@
 </file>
 
 <file path=ppt/slides/slide1.xml><?xml version="1.0" encoding="utf-8"?>
+<p:sld xmlns:a="http://schemas.openxmlformats.org/drawingml/2006/main" xmlns:r="http://schemas.openxmlformats.org/officeDocument/2006/relationships" xmlns:p="http://schemas.openxmlformats.org/presentationml/2006/main">
+  <p:cSld>
+    <p:spTree>
+      <p:nvGrpSpPr>
+        <p:cNvPr id="1" name=""/>
+        <p:cNvGrpSpPr/>
+        <p:nvPr/>
+      </p:nvGrpSpPr>
+      <p:grpSpPr>
+        <a:xfrm>
+          <a:off x="0" y="0"/>
+          <a:ext cx="0" cy="0"/>
+          <a:chOff x="0" y="0"/>
+          <a:chExt cx="0" cy="0"/>
+        </a:xfrm>
+      </p:grpSpPr>
+      <p:sp>
+        <p:nvSpPr>
+          <p:cNvPr id="2" name="Title 1">
+            <a:extLst>
+              <a:ext uri="{FF2B5EF4-FFF2-40B4-BE49-F238E27FC236}">
+                <a16:creationId xmlns:a16="http://schemas.microsoft.com/office/drawing/2014/main" id="{0D0394D6-00DF-43A2-AC41-D472AB53D452}"/>
+              </a:ext>
+            </a:extLst>
+          </p:cNvPr>
+          <p:cNvSpPr>
+            <a:spLocks noGrp="1"/>
+          </p:cNvSpPr>
+          <p:nvPr>
+            <p:ph type="title"/>
+          </p:nvPr>
+        </p:nvSpPr>
+        <p:spPr>
+          <a:xfrm>
+            <a:off x="838199" y="-125123"/>
+            <a:ext cx="10515600" cy="1325563"/>
+          </a:xfrm>
+        </p:spPr>
+        <p:txBody>
+          <a:bodyPr/>
+          <a:lstStyle/>
+          <a:p>
+            <a:pPr algn="ctr"/>
+            <a:r>
+              <a:rPr lang="en-GB" dirty="0"/>
+              <a:t>Parameters</a:t>
+            </a:r>
+          </a:p>
+        </p:txBody>
+      </p:sp>
+      <p:pic>
+        <p:nvPicPr>
+          <p:cNvPr id="4" name="Picture 3" descr="Text&#10;&#10;Description automatically generated">
+            <a:extLst>
+              <a:ext uri="{FF2B5EF4-FFF2-40B4-BE49-F238E27FC236}">
+                <a16:creationId xmlns:a16="http://schemas.microsoft.com/office/drawing/2014/main" id="{42FC3E67-9186-495E-BB70-0622EC509FEE}"/>
+              </a:ext>
+            </a:extLst>
+          </p:cNvPr>
+          <p:cNvPicPr>
+            <a:picLocks noChangeAspect="1"/>
+          </p:cNvPicPr>
+          <p:nvPr/>
+        </p:nvPicPr>
+        <p:blipFill>
+          <a:blip r:embed="rId2">
+            <a:extLst>
+              <a:ext uri="{28A0092B-C50C-407E-A947-70E740481C1C}">
+                <a14:useLocalDpi xmlns:a14="http://schemas.microsoft.com/office/drawing/2010/main" val="0"/>
+              </a:ext>
+            </a:extLst>
+          </a:blip>
+          <a:stretch>
+            <a:fillRect/>
+          </a:stretch>
+        </p:blipFill>
+        <p:spPr>
+          <a:xfrm>
+            <a:off x="2378197" y="1071130"/>
+            <a:ext cx="7435606" cy="5322329"/>
+          </a:xfrm>
+          <a:prstGeom prst="rect">
+            <a:avLst/>
+          </a:prstGeom>
+        </p:spPr>
+      </p:pic>
+    </p:spTree>
+    <p:extLst>
+      <p:ext uri="{BB962C8B-B14F-4D97-AF65-F5344CB8AC3E}">
+        <p14:creationId xmlns:p14="http://schemas.microsoft.com/office/powerpoint/2010/main" val="3673651231"/>
+      </p:ext>
+    </p:extLst>
+  </p:cSld>
+  <p:clrMapOvr>
+    <a:masterClrMapping/>
+  </p:clrMapOvr>
+</p:sld>
+</file>
+
+<file path=ppt/slides/slide2.xml><?xml version="1.0" encoding="utf-8"?>
+<p:sld xmlns:a="http://schemas.openxmlformats.org/drawingml/2006/main" xmlns:r="http://schemas.openxmlformats.org/officeDocument/2006/relationships" xmlns:p="http://schemas.openxmlformats.org/presentationml/2006/main">
+  <p:cSld>
+    <p:spTree>
+      <p:nvGrpSpPr>
+        <p:cNvPr id="1" name=""/>
+        <p:cNvGrpSpPr/>
+        <p:nvPr/>
+      </p:nvGrpSpPr>
+      <p:grpSpPr>
+        <a:xfrm>
+          <a:off x="0" y="0"/>
+          <a:ext cx="0" cy="0"/>
+          <a:chOff x="0" y="0"/>
+          <a:chExt cx="0" cy="0"/>
+        </a:xfrm>
+      </p:grpSpPr>
+      <p:sp>
+        <p:nvSpPr>
+          <p:cNvPr id="2" name="Title 1">
+            <a:extLst>
+              <a:ext uri="{FF2B5EF4-FFF2-40B4-BE49-F238E27FC236}">
+                <a16:creationId xmlns:a16="http://schemas.microsoft.com/office/drawing/2014/main" id="{0D0394D6-00DF-43A2-AC41-D472AB53D452}"/>
+              </a:ext>
+            </a:extLst>
+          </p:cNvPr>
+          <p:cNvSpPr>
+            <a:spLocks noGrp="1"/>
+          </p:cNvSpPr>
+          <p:nvPr>
+            <p:ph type="title"/>
+          </p:nvPr>
+        </p:nvSpPr>
+        <p:spPr>
+          <a:xfrm>
+            <a:off x="838199" y="-125123"/>
+            <a:ext cx="10515600" cy="1325563"/>
+          </a:xfrm>
+        </p:spPr>
+        <p:txBody>
+          <a:bodyPr/>
+          <a:lstStyle/>
+          <a:p>
+            <a:pPr algn="ctr"/>
+            <a:r>
+              <a:rPr lang="en-GB" dirty="0"/>
+              <a:t>Simulation wrapper</a:t>
+            </a:r>
+          </a:p>
+        </p:txBody>
+      </p:sp>
+      <p:pic>
+        <p:nvPicPr>
+          <p:cNvPr id="5" name="Picture 4" descr="Text&#10;&#10;Description automatically generated">
+            <a:extLst>
+              <a:ext uri="{FF2B5EF4-FFF2-40B4-BE49-F238E27FC236}">
+                <a16:creationId xmlns:a16="http://schemas.microsoft.com/office/drawing/2014/main" id="{F50C7314-BE4B-475B-B754-2FE9B97AB139}"/>
+              </a:ext>
+            </a:extLst>
+          </p:cNvPr>
+          <p:cNvPicPr>
+            <a:picLocks noChangeAspect="1"/>
+          </p:cNvPicPr>
+          <p:nvPr/>
+        </p:nvPicPr>
+        <p:blipFill>
+          <a:blip r:embed="rId2">
+            <a:extLst>
+              <a:ext uri="{28A0092B-C50C-407E-A947-70E740481C1C}">
+                <a14:useLocalDpi xmlns:a14="http://schemas.microsoft.com/office/drawing/2010/main" val="0"/>
+              </a:ext>
+            </a:extLst>
+          </a:blip>
+          <a:stretch>
+            <a:fillRect/>
+          </a:stretch>
+        </p:blipFill>
+        <p:spPr>
+          <a:xfrm>
+            <a:off x="1581150" y="2040329"/>
+            <a:ext cx="9029700" cy="2931721"/>
+          </a:xfrm>
+          <a:prstGeom prst="rect">
+            <a:avLst/>
+          </a:prstGeom>
+        </p:spPr>
+      </p:pic>
+    </p:spTree>
+    <p:extLst>
+      <p:ext uri="{BB962C8B-B14F-4D97-AF65-F5344CB8AC3E}">
+        <p14:creationId xmlns:p14="http://schemas.microsoft.com/office/powerpoint/2010/main" val="2988418754"/>
+      </p:ext>
+    </p:extLst>
+  </p:cSld>
+  <p:clrMapOvr>
+    <a:masterClrMapping/>
+  </p:clrMapOvr>
+</p:sld>
+</file>
+
+<file path=ppt/slides/slide3.xml><?xml version="1.0" encoding="utf-8"?>
+<p:sld xmlns:a="http://schemas.openxmlformats.org/drawingml/2006/main" xmlns:r="http://schemas.openxmlformats.org/officeDocument/2006/relationships" xmlns:p="http://schemas.openxmlformats.org/presentationml/2006/main">
+  <p:cSld>
+    <p:spTree>
+      <p:nvGrpSpPr>
+        <p:cNvPr id="1" name=""/>
+        <p:cNvGrpSpPr/>
+        <p:nvPr/>
+      </p:nvGrpSpPr>
+      <p:grpSpPr>
+        <a:xfrm>
+          <a:off x="0" y="0"/>
+          <a:ext cx="0" cy="0"/>
+          <a:chOff x="0" y="0"/>
+          <a:chExt cx="0" cy="0"/>
+        </a:xfrm>
+      </p:grpSpPr>
+      <p:sp>
+        <p:nvSpPr>
+          <p:cNvPr id="2" name="Title 1">
+            <a:extLst>
+              <a:ext uri="{FF2B5EF4-FFF2-40B4-BE49-F238E27FC236}">
+                <a16:creationId xmlns:a16="http://schemas.microsoft.com/office/drawing/2014/main" id="{0D0394D6-00DF-43A2-AC41-D472AB53D452}"/>
+              </a:ext>
+            </a:extLst>
+          </p:cNvPr>
+          <p:cNvSpPr>
+            <a:spLocks noGrp="1"/>
+          </p:cNvSpPr>
+          <p:nvPr>
+            <p:ph type="title"/>
+          </p:nvPr>
+        </p:nvSpPr>
+        <p:spPr>
+          <a:xfrm>
+            <a:off x="838199" y="-125123"/>
+            <a:ext cx="10515600" cy="1325563"/>
+          </a:xfrm>
+        </p:spPr>
+        <p:txBody>
+          <a:bodyPr/>
+          <a:lstStyle/>
+          <a:p>
+            <a:pPr algn="ctr"/>
+            <a:r>
+              <a:rPr lang="en-GB" dirty="0"/>
+              <a:t>Treatment</a:t>
+            </a:r>
+          </a:p>
+        </p:txBody>
+      </p:sp>
+      <p:pic>
+        <p:nvPicPr>
+          <p:cNvPr id="5" name="Picture 4" descr="Text&#10;&#10;Description automatically generated">
+            <a:extLst>
+              <a:ext uri="{FF2B5EF4-FFF2-40B4-BE49-F238E27FC236}">
+                <a16:creationId xmlns:a16="http://schemas.microsoft.com/office/drawing/2014/main" id="{2B8BD6B7-CBEB-4BC4-A86F-B217B5540A11}"/>
+              </a:ext>
+            </a:extLst>
+          </p:cNvPr>
+          <p:cNvPicPr>
+            <a:picLocks noChangeAspect="1"/>
+          </p:cNvPicPr>
+          <p:nvPr/>
+        </p:nvPicPr>
+        <p:blipFill>
+          <a:blip r:embed="rId2">
+            <a:extLst>
+              <a:ext uri="{28A0092B-C50C-407E-A947-70E740481C1C}">
+                <a14:useLocalDpi xmlns:a14="http://schemas.microsoft.com/office/drawing/2010/main" val="0"/>
+              </a:ext>
+            </a:extLst>
+          </a:blip>
+          <a:stretch>
+            <a:fillRect/>
+          </a:stretch>
+        </p:blipFill>
+        <p:spPr>
+          <a:xfrm>
+            <a:off x="1824036" y="1736859"/>
+            <a:ext cx="8543925" cy="3384282"/>
+          </a:xfrm>
+          <a:prstGeom prst="rect">
+            <a:avLst/>
+          </a:prstGeom>
+        </p:spPr>
+      </p:pic>
+    </p:spTree>
+    <p:extLst>
+      <p:ext uri="{BB962C8B-B14F-4D97-AF65-F5344CB8AC3E}">
+        <p14:creationId xmlns:p14="http://schemas.microsoft.com/office/powerpoint/2010/main" val="1621922302"/>
+      </p:ext>
+    </p:extLst>
+  </p:cSld>
+  <p:clrMapOvr>
+    <a:masterClrMapping/>
+  </p:clrMapOvr>
+</p:sld>
+</file>
+
+<file path=ppt/slides/slide4.xml><?xml version="1.0" encoding="utf-8"?>
+<p:sld xmlns:a="http://schemas.openxmlformats.org/drawingml/2006/main" xmlns:r="http://schemas.openxmlformats.org/officeDocument/2006/relationships" xmlns:p="http://schemas.openxmlformats.org/presentationml/2006/main">
+  <p:cSld>
+    <p:spTree>
+      <p:nvGrpSpPr>
+        <p:cNvPr id="1" name=""/>
+        <p:cNvGrpSpPr/>
+        <p:nvPr/>
+      </p:nvGrpSpPr>
+      <p:grpSpPr>
+        <a:xfrm>
+          <a:off x="0" y="0"/>
+          <a:ext cx="0" cy="0"/>
+          <a:chOff x="0" y="0"/>
+          <a:chExt cx="0" cy="0"/>
+        </a:xfrm>
+      </p:grpSpPr>
+      <p:sp>
+        <p:nvSpPr>
+          <p:cNvPr id="2" name="Title 1">
+            <a:extLst>
+              <a:ext uri="{FF2B5EF4-FFF2-40B4-BE49-F238E27FC236}">
+                <a16:creationId xmlns:a16="http://schemas.microsoft.com/office/drawing/2014/main" id="{0D0394D6-00DF-43A2-AC41-D472AB53D452}"/>
+              </a:ext>
+            </a:extLst>
+          </p:cNvPr>
+          <p:cNvSpPr>
+            <a:spLocks noGrp="1"/>
+          </p:cNvSpPr>
+          <p:nvPr>
+            <p:ph type="title"/>
+          </p:nvPr>
+        </p:nvSpPr>
+        <p:spPr>
+          <a:xfrm>
+            <a:off x="838199" y="-125123"/>
+            <a:ext cx="10515600" cy="1325563"/>
+          </a:xfrm>
+        </p:spPr>
+        <p:txBody>
+          <a:bodyPr/>
+          <a:lstStyle/>
+          <a:p>
+            <a:pPr algn="ctr"/>
+            <a:r>
+              <a:rPr lang="en-GB" dirty="0"/>
+              <a:t>Isolation</a:t>
+            </a:r>
+          </a:p>
+        </p:txBody>
+      </p:sp>
+      <p:pic>
+        <p:nvPicPr>
+          <p:cNvPr id="5" name="Picture 4" descr="Text&#10;&#10;Description automatically generated">
+            <a:extLst>
+              <a:ext uri="{FF2B5EF4-FFF2-40B4-BE49-F238E27FC236}">
+                <a16:creationId xmlns:a16="http://schemas.microsoft.com/office/drawing/2014/main" id="{8C9FF83B-F735-4799-AE61-6209F632CD7D}"/>
+              </a:ext>
+            </a:extLst>
+          </p:cNvPr>
+          <p:cNvPicPr>
+            <a:picLocks noChangeAspect="1"/>
+          </p:cNvPicPr>
+          <p:nvPr/>
+        </p:nvPicPr>
+        <p:blipFill>
+          <a:blip r:embed="rId2">
+            <a:extLst>
+              <a:ext uri="{28A0092B-C50C-407E-A947-70E740481C1C}">
+                <a14:useLocalDpi xmlns:a14="http://schemas.microsoft.com/office/drawing/2010/main" val="0"/>
+              </a:ext>
+            </a:extLst>
+          </a:blip>
+          <a:stretch>
+            <a:fillRect/>
+          </a:stretch>
+        </p:blipFill>
+        <p:spPr>
+          <a:xfrm>
+            <a:off x="2675630" y="971550"/>
+            <a:ext cx="6840737" cy="5562600"/>
+          </a:xfrm>
+          <a:prstGeom prst="rect">
+            <a:avLst/>
+          </a:prstGeom>
+        </p:spPr>
+      </p:pic>
+    </p:spTree>
+    <p:extLst>
+      <p:ext uri="{BB962C8B-B14F-4D97-AF65-F5344CB8AC3E}">
+        <p14:creationId xmlns:p14="http://schemas.microsoft.com/office/powerpoint/2010/main" val="206903471"/>
+      </p:ext>
+    </p:extLst>
+  </p:cSld>
+  <p:clrMapOvr>
+    <a:masterClrMapping/>
+  </p:clrMapOvr>
+</p:sld>
+</file>
+
+<file path=ppt/slides/slide5.xml><?xml version="1.0" encoding="utf-8"?>
+<p:sld xmlns:a="http://schemas.openxmlformats.org/drawingml/2006/main" xmlns:r="http://schemas.openxmlformats.org/officeDocument/2006/relationships" xmlns:p="http://schemas.openxmlformats.org/presentationml/2006/main">
+  <p:cSld>
+    <p:spTree>
+      <p:nvGrpSpPr>
+        <p:cNvPr id="1" name=""/>
+        <p:cNvGrpSpPr/>
+        <p:nvPr/>
+      </p:nvGrpSpPr>
+      <p:grpSpPr>
+        <a:xfrm>
+          <a:off x="0" y="0"/>
+          <a:ext cx="0" cy="0"/>
+          <a:chOff x="0" y="0"/>
+          <a:chExt cx="0" cy="0"/>
+        </a:xfrm>
+      </p:grpSpPr>
+      <p:sp>
+        <p:nvSpPr>
+          <p:cNvPr id="2" name="Title 1">
+            <a:extLst>
+              <a:ext uri="{FF2B5EF4-FFF2-40B4-BE49-F238E27FC236}">
+                <a16:creationId xmlns:a16="http://schemas.microsoft.com/office/drawing/2014/main" id="{0D0394D6-00DF-43A2-AC41-D472AB53D452}"/>
+              </a:ext>
+            </a:extLst>
+          </p:cNvPr>
+          <p:cNvSpPr>
+            <a:spLocks noGrp="1"/>
+          </p:cNvSpPr>
+          <p:nvPr>
+            <p:ph type="title"/>
+          </p:nvPr>
+        </p:nvSpPr>
+        <p:spPr>
+          <a:xfrm>
+            <a:off x="838199" y="-125123"/>
+            <a:ext cx="10515600" cy="1325563"/>
+          </a:xfrm>
+        </p:spPr>
+        <p:txBody>
+          <a:bodyPr/>
+          <a:lstStyle/>
+          <a:p>
+            <a:pPr algn="ctr"/>
+            <a:r>
+              <a:rPr lang="en-GB" dirty="0"/>
+              <a:t>Recovery, mutation, and death</a:t>
+            </a:r>
+          </a:p>
+        </p:txBody>
+      </p:sp>
+      <p:pic>
+        <p:nvPicPr>
+          <p:cNvPr id="5" name="Picture 4" descr="Text&#10;&#10;Description automatically generated">
+            <a:extLst>
+              <a:ext uri="{FF2B5EF4-FFF2-40B4-BE49-F238E27FC236}">
+                <a16:creationId xmlns:a16="http://schemas.microsoft.com/office/drawing/2014/main" id="{151D83A0-75D3-49FB-AE29-9932A172B467}"/>
+              </a:ext>
+            </a:extLst>
+          </p:cNvPr>
+          <p:cNvPicPr>
+            <a:picLocks noChangeAspect="1"/>
+          </p:cNvPicPr>
+          <p:nvPr/>
+        </p:nvPicPr>
+        <p:blipFill>
+          <a:blip r:embed="rId2">
+            <a:extLst>
+              <a:ext uri="{28A0092B-C50C-407E-A947-70E740481C1C}">
+                <a14:useLocalDpi xmlns:a14="http://schemas.microsoft.com/office/drawing/2010/main" val="0"/>
+              </a:ext>
+            </a:extLst>
+          </a:blip>
+          <a:stretch>
+            <a:fillRect/>
+          </a:stretch>
+        </p:blipFill>
+        <p:spPr>
+          <a:xfrm>
+            <a:off x="1351096" y="1200440"/>
+            <a:ext cx="9489805" cy="5114635"/>
+          </a:xfrm>
+          <a:prstGeom prst="rect">
+            <a:avLst/>
+          </a:prstGeom>
+        </p:spPr>
+      </p:pic>
+    </p:spTree>
+    <p:extLst>
+      <p:ext uri="{BB962C8B-B14F-4D97-AF65-F5344CB8AC3E}">
+        <p14:creationId xmlns:p14="http://schemas.microsoft.com/office/powerpoint/2010/main" val="3404637071"/>
+      </p:ext>
+    </p:extLst>
+  </p:cSld>
+  <p:clrMapOvr>
+    <a:masterClrMapping/>
+  </p:clrMapOvr>
+</p:sld>
+</file>
+
+<file path=ppt/slides/slide6.xml><?xml version="1.0" encoding="utf-8"?>
+<p:sld xmlns:a="http://schemas.openxmlformats.org/drawingml/2006/main" xmlns:r="http://schemas.openxmlformats.org/officeDocument/2006/relationships" xmlns:p="http://schemas.openxmlformats.org/presentationml/2006/main">
+  <p:cSld>
+    <p:spTree>
+      <p:nvGrpSpPr>
+        <p:cNvPr id="1" name=""/>
+        <p:cNvGrpSpPr/>
+        <p:nvPr/>
+      </p:nvGrpSpPr>
+      <p:grpSpPr>
+        <a:xfrm>
+          <a:off x="0" y="0"/>
+          <a:ext cx="0" cy="0"/>
+          <a:chOff x="0" y="0"/>
+          <a:chExt cx="0" cy="0"/>
+        </a:xfrm>
+      </p:grpSpPr>
+      <p:sp>
+        <p:nvSpPr>
+          <p:cNvPr id="2" name="Title 1">
+            <a:extLst>
+              <a:ext uri="{FF2B5EF4-FFF2-40B4-BE49-F238E27FC236}">
+                <a16:creationId xmlns:a16="http://schemas.microsoft.com/office/drawing/2014/main" id="{0D0394D6-00DF-43A2-AC41-D472AB53D452}"/>
+              </a:ext>
+            </a:extLst>
+          </p:cNvPr>
+          <p:cNvSpPr>
+            <a:spLocks noGrp="1"/>
+          </p:cNvSpPr>
+          <p:nvPr>
+            <p:ph type="title"/>
+          </p:nvPr>
+        </p:nvSpPr>
+        <p:spPr>
+          <a:xfrm>
+            <a:off x="838199" y="-125123"/>
+            <a:ext cx="10515600" cy="1325563"/>
+          </a:xfrm>
+        </p:spPr>
+        <p:txBody>
+          <a:bodyPr/>
+          <a:lstStyle/>
+          <a:p>
+            <a:pPr algn="ctr"/>
+            <a:r>
+              <a:rPr lang="en-GB" dirty="0"/>
+              <a:t>Spread</a:t>
+            </a:r>
+          </a:p>
+        </p:txBody>
+      </p:sp>
+      <p:pic>
+        <p:nvPicPr>
+          <p:cNvPr id="5" name="Picture 4" descr="Text&#10;&#10;Description automatically generated">
+            <a:extLst>
+              <a:ext uri="{FF2B5EF4-FFF2-40B4-BE49-F238E27FC236}">
+                <a16:creationId xmlns:a16="http://schemas.microsoft.com/office/drawing/2014/main" id="{10B5128A-F24E-477E-A5F6-AE0173B4C421}"/>
+              </a:ext>
+            </a:extLst>
+          </p:cNvPr>
+          <p:cNvPicPr>
+            <a:picLocks noChangeAspect="1"/>
+          </p:cNvPicPr>
+          <p:nvPr/>
+        </p:nvPicPr>
+        <p:blipFill>
+          <a:blip r:embed="rId2">
+            <a:extLst>
+              <a:ext uri="{28A0092B-C50C-407E-A947-70E740481C1C}">
+                <a14:useLocalDpi xmlns:a14="http://schemas.microsoft.com/office/drawing/2010/main" val="0"/>
+              </a:ext>
+            </a:extLst>
+          </a:blip>
+          <a:stretch>
+            <a:fillRect/>
+          </a:stretch>
+        </p:blipFill>
+        <p:spPr>
+          <a:xfrm>
+            <a:off x="895349" y="1566801"/>
+            <a:ext cx="10401300" cy="4119996"/>
+          </a:xfrm>
+          <a:prstGeom prst="rect">
+            <a:avLst/>
+          </a:prstGeom>
+        </p:spPr>
+      </p:pic>
+    </p:spTree>
+    <p:extLst>
+      <p:ext uri="{BB962C8B-B14F-4D97-AF65-F5344CB8AC3E}">
+        <p14:creationId xmlns:p14="http://schemas.microsoft.com/office/powerpoint/2010/main" val="1511649719"/>
+      </p:ext>
+    </p:extLst>
+  </p:cSld>
+  <p:clrMapOvr>
+    <a:masterClrMapping/>
+  </p:clrMapOvr>
+</p:sld>
+</file>
+
+<file path=ppt/slides/slide7.xml><?xml version="1.0" encoding="utf-8"?>
 <p:sld xmlns:a="http://schemas.openxmlformats.org/drawingml/2006/main" xmlns:r="http://schemas.openxmlformats.org/officeDocument/2006/relationships" xmlns:p="http://schemas.openxmlformats.org/presentationml/2006/main">
   <p:cSld>
     <p:spTree>
@@ -5613,10 +6219,10 @@
       </p:grpSp>
       <p:grpSp>
         <p:nvGrpSpPr>
-          <p:cNvPr id="2" name="Group 1">
-            <a:extLst>
-              <a:ext uri="{FF2B5EF4-FFF2-40B4-BE49-F238E27FC236}">
-                <a16:creationId xmlns:a16="http://schemas.microsoft.com/office/drawing/2014/main" id="{AC148486-A8BE-48DE-A487-69851E88ADE8}"/>
+          <p:cNvPr id="3" name="Group 2">
+            <a:extLst>
+              <a:ext uri="{FF2B5EF4-FFF2-40B4-BE49-F238E27FC236}">
+                <a16:creationId xmlns:a16="http://schemas.microsoft.com/office/drawing/2014/main" id="{CD919222-78C2-4A67-A3C2-71CE67F95C03}"/>
               </a:ext>
             </a:extLst>
           </p:cNvPr>
@@ -5625,18 +6231,18 @@
         </p:nvGrpSpPr>
         <p:grpSpPr>
           <a:xfrm>
-            <a:off x="9102207" y="146471"/>
-            <a:ext cx="2852407" cy="1754326"/>
-            <a:chOff x="8818647" y="232059"/>
-            <a:chExt cx="2852407" cy="1754326"/>
+            <a:off x="9115593" y="40859"/>
+            <a:ext cx="2852407" cy="2031325"/>
+            <a:chOff x="9115593" y="40859"/>
+            <a:chExt cx="2852407" cy="2031325"/>
           </a:xfrm>
         </p:grpSpPr>
         <p:grpSp>
           <p:nvGrpSpPr>
-            <p:cNvPr id="83" name="Group 82">
+            <p:cNvPr id="2" name="Group 1">
               <a:extLst>
                 <a:ext uri="{FF2B5EF4-FFF2-40B4-BE49-F238E27FC236}">
-                  <a16:creationId xmlns:a16="http://schemas.microsoft.com/office/drawing/2014/main" id="{A3FAA0ED-FB08-4495-ADBA-EFF812E7F11E}"/>
+                  <a16:creationId xmlns:a16="http://schemas.microsoft.com/office/drawing/2014/main" id="{AC148486-A8BE-48DE-A487-69851E88ADE8}"/>
                 </a:ext>
               </a:extLst>
             </p:cNvPr>
@@ -5645,30 +6251,343 @@
           </p:nvGrpSpPr>
           <p:grpSpPr>
             <a:xfrm>
-              <a:off x="8818647" y="232059"/>
-              <a:ext cx="2852407" cy="1754326"/>
-              <a:chOff x="7353775" y="157018"/>
-              <a:chExt cx="2852407" cy="1754326"/>
+              <a:off x="9115593" y="40859"/>
+              <a:ext cx="2852407" cy="2031325"/>
+              <a:chOff x="8818647" y="232059"/>
+              <a:chExt cx="2852407" cy="2031325"/>
             </a:xfrm>
           </p:grpSpPr>
-          <p:sp>
-            <p:nvSpPr>
-              <p:cNvPr id="78" name="TextBox 77">
+          <p:grpSp>
+            <p:nvGrpSpPr>
+              <p:cNvPr id="83" name="Group 82">
                 <a:extLst>
                   <a:ext uri="{FF2B5EF4-FFF2-40B4-BE49-F238E27FC236}">
-                    <a16:creationId xmlns:a16="http://schemas.microsoft.com/office/drawing/2014/main" id="{D8EC32A6-70C8-4E57-AD4F-BFFAFFADD17D}"/>
+                    <a16:creationId xmlns:a16="http://schemas.microsoft.com/office/drawing/2014/main" id="{A3FAA0ED-FB08-4495-ADBA-EFF812E7F11E}"/>
                   </a:ext>
                 </a:extLst>
               </p:cNvPr>
-              <p:cNvSpPr txBox="1"/>
+              <p:cNvGrpSpPr/>
+              <p:nvPr/>
+            </p:nvGrpSpPr>
+            <p:grpSpPr>
+              <a:xfrm>
+                <a:off x="8818647" y="232059"/>
+                <a:ext cx="2852407" cy="2031325"/>
+                <a:chOff x="7353775" y="157018"/>
+                <a:chExt cx="2852407" cy="2031325"/>
+              </a:xfrm>
+            </p:grpSpPr>
+            <p:sp>
+              <p:nvSpPr>
+                <p:cNvPr id="78" name="TextBox 77">
+                  <a:extLst>
+                    <a:ext uri="{FF2B5EF4-FFF2-40B4-BE49-F238E27FC236}">
+                      <a16:creationId xmlns:a16="http://schemas.microsoft.com/office/drawing/2014/main" id="{D8EC32A6-70C8-4E57-AD4F-BFFAFFADD17D}"/>
+                    </a:ext>
+                  </a:extLst>
+                </p:cNvPr>
+                <p:cNvSpPr txBox="1"/>
+                <p:nvPr/>
+              </p:nvSpPr>
+              <p:spPr>
+                <a:xfrm>
+                  <a:off x="7353775" y="157018"/>
+                  <a:ext cx="2852407" cy="2031325"/>
+                </a:xfrm>
+                <a:prstGeom prst="rect">
+                  <a:avLst/>
+                </a:prstGeom>
+              </p:spPr>
+              <p:style>
+                <a:lnRef idx="2">
+                  <a:schemeClr val="dk1"/>
+                </a:lnRef>
+                <a:fillRef idx="1">
+                  <a:schemeClr val="lt1"/>
+                </a:fillRef>
+                <a:effectRef idx="0">
+                  <a:schemeClr val="dk1"/>
+                </a:effectRef>
+                <a:fontRef idx="minor">
+                  <a:schemeClr val="dk1"/>
+                </a:fontRef>
+              </p:style>
+              <p:txBody>
+                <a:bodyPr wrap="square" rtlCol="0">
+                  <a:spAutoFit/>
+                </a:bodyPr>
+                <a:lstStyle/>
+                <a:p>
+                  <a:r>
+                    <a:rPr lang="en-GB" dirty="0"/>
+                    <a:t>Types of transition:</a:t>
+                  </a:r>
+                </a:p>
+                <a:p>
+                  <a:pPr marL="285750" indent="-285750">
+                    <a:buFont typeface="Arial" panose="020B0604020202020204" pitchFamily="34" charset="0"/>
+                    <a:buChar char="•"/>
+                  </a:pPr>
+                  <a:r>
+                    <a:rPr lang="en-GB" dirty="0"/>
+                    <a:t>Death         -</a:t>
+                  </a:r>
+                </a:p>
+                <a:p>
+                  <a:pPr marL="285750" indent="-285750">
+                    <a:buFont typeface="Arial" panose="020B0604020202020204" pitchFamily="34" charset="0"/>
+                    <a:buChar char="•"/>
+                  </a:pPr>
+                  <a:r>
+                    <a:rPr lang="en-GB" dirty="0"/>
+                    <a:t>Spread       -</a:t>
+                  </a:r>
+                </a:p>
+                <a:p>
+                  <a:pPr marL="285750" indent="-285750">
+                    <a:buFont typeface="Arial" panose="020B0604020202020204" pitchFamily="34" charset="0"/>
+                    <a:buChar char="•"/>
+                  </a:pPr>
+                  <a:r>
+                    <a:rPr lang="en-GB" dirty="0"/>
+                    <a:t>Recovery   -</a:t>
+                  </a:r>
+                </a:p>
+                <a:p>
+                  <a:pPr marL="285750" indent="-285750">
+                    <a:buFont typeface="Arial" panose="020B0604020202020204" pitchFamily="34" charset="0"/>
+                    <a:buChar char="•"/>
+                  </a:pPr>
+                  <a:r>
+                    <a:rPr lang="en-GB" dirty="0"/>
+                    <a:t>Mutation   -</a:t>
+                  </a:r>
+                </a:p>
+                <a:p>
+                  <a:pPr marL="285750" indent="-285750">
+                    <a:buFont typeface="Arial" panose="020B0604020202020204" pitchFamily="34" charset="0"/>
+                    <a:buChar char="•"/>
+                  </a:pPr>
+                  <a:r>
+                    <a:rPr lang="en-GB" dirty="0"/>
+                    <a:t>No change -</a:t>
+                  </a:r>
+                </a:p>
+                <a:p>
+                  <a:pPr marL="285750" indent="-285750">
+                    <a:buFont typeface="Arial" panose="020B0604020202020204" pitchFamily="34" charset="0"/>
+                    <a:buChar char="•"/>
+                  </a:pPr>
+                  <a:r>
+                    <a:rPr lang="en-GB" dirty="0"/>
+                    <a:t>Isolation     -</a:t>
+                  </a:r>
+                </a:p>
+              </p:txBody>
+            </p:sp>
+            <p:sp>
+              <p:nvSpPr>
+                <p:cNvPr id="79" name="Rectangle 78">
+                  <a:extLst>
+                    <a:ext uri="{FF2B5EF4-FFF2-40B4-BE49-F238E27FC236}">
+                      <a16:creationId xmlns:a16="http://schemas.microsoft.com/office/drawing/2014/main" id="{64DE77D6-4E8F-463F-931A-F7D14808EEEA}"/>
+                    </a:ext>
+                  </a:extLst>
+                </p:cNvPr>
+                <p:cNvSpPr/>
+                <p:nvPr/>
+              </p:nvSpPr>
+              <p:spPr>
+                <a:xfrm>
+                  <a:off x="8859792" y="554243"/>
+                  <a:ext cx="958463" cy="111471"/>
+                </a:xfrm>
+                <a:prstGeom prst="rect">
+                  <a:avLst/>
+                </a:prstGeom>
+              </p:spPr>
+              <p:style>
+                <a:lnRef idx="2">
+                  <a:schemeClr val="accent2">
+                    <a:shade val="50000"/>
+                  </a:schemeClr>
+                </a:lnRef>
+                <a:fillRef idx="1">
+                  <a:schemeClr val="accent2"/>
+                </a:fillRef>
+                <a:effectRef idx="0">
+                  <a:schemeClr val="accent2"/>
+                </a:effectRef>
+                <a:fontRef idx="minor">
+                  <a:schemeClr val="lt1"/>
+                </a:fontRef>
+              </p:style>
+              <p:txBody>
+                <a:bodyPr rtlCol="0" anchor="ctr"/>
+                <a:lstStyle/>
+                <a:p>
+                  <a:pPr algn="ctr"/>
+                  <a:endParaRPr lang="en-GB"/>
+                </a:p>
+              </p:txBody>
+            </p:sp>
+            <p:sp>
+              <p:nvSpPr>
+                <p:cNvPr id="80" name="Rectangle 79">
+                  <a:extLst>
+                    <a:ext uri="{FF2B5EF4-FFF2-40B4-BE49-F238E27FC236}">
+                      <a16:creationId xmlns:a16="http://schemas.microsoft.com/office/drawing/2014/main" id="{1A98B002-80C8-424D-90D5-BD7979977AEF}"/>
+                    </a:ext>
+                  </a:extLst>
+                </p:cNvPr>
+                <p:cNvSpPr/>
+                <p:nvPr/>
+              </p:nvSpPr>
+              <p:spPr>
+                <a:xfrm>
+                  <a:off x="8859791" y="848577"/>
+                  <a:ext cx="958463" cy="111471"/>
+                </a:xfrm>
+                <a:prstGeom prst="rect">
+                  <a:avLst/>
+                </a:prstGeom>
+              </p:spPr>
+              <p:style>
+                <a:lnRef idx="2">
+                  <a:schemeClr val="accent3">
+                    <a:shade val="50000"/>
+                  </a:schemeClr>
+                </a:lnRef>
+                <a:fillRef idx="1">
+                  <a:schemeClr val="accent3"/>
+                </a:fillRef>
+                <a:effectRef idx="0">
+                  <a:schemeClr val="accent3"/>
+                </a:effectRef>
+                <a:fontRef idx="minor">
+                  <a:schemeClr val="lt1"/>
+                </a:fontRef>
+              </p:style>
+              <p:txBody>
+                <a:bodyPr rtlCol="0" anchor="ctr"/>
+                <a:lstStyle/>
+                <a:p>
+                  <a:pPr algn="ctr"/>
+                  <a:endParaRPr lang="en-GB"/>
+                </a:p>
+              </p:txBody>
+            </p:sp>
+            <p:sp>
+              <p:nvSpPr>
+                <p:cNvPr id="81" name="Rectangle 80">
+                  <a:extLst>
+                    <a:ext uri="{FF2B5EF4-FFF2-40B4-BE49-F238E27FC236}">
+                      <a16:creationId xmlns:a16="http://schemas.microsoft.com/office/drawing/2014/main" id="{BC82A7DE-86A2-4F01-9AA8-88BEBD534AEB}"/>
+                    </a:ext>
+                  </a:extLst>
+                </p:cNvPr>
+                <p:cNvSpPr/>
+                <p:nvPr/>
+              </p:nvSpPr>
+              <p:spPr>
+                <a:xfrm>
+                  <a:off x="8859790" y="1134432"/>
+                  <a:ext cx="958463" cy="111471"/>
+                </a:xfrm>
+                <a:prstGeom prst="rect">
+                  <a:avLst/>
+                </a:prstGeom>
+              </p:spPr>
+              <p:style>
+                <a:lnRef idx="2">
+                  <a:schemeClr val="accent6">
+                    <a:shade val="50000"/>
+                  </a:schemeClr>
+                </a:lnRef>
+                <a:fillRef idx="1">
+                  <a:schemeClr val="accent6"/>
+                </a:fillRef>
+                <a:effectRef idx="0">
+                  <a:schemeClr val="accent6"/>
+                </a:effectRef>
+                <a:fontRef idx="minor">
+                  <a:schemeClr val="lt1"/>
+                </a:fontRef>
+              </p:style>
+              <p:txBody>
+                <a:bodyPr rtlCol="0" anchor="ctr"/>
+                <a:lstStyle/>
+                <a:p>
+                  <a:pPr algn="ctr"/>
+                  <a:endParaRPr lang="en-GB"/>
+                </a:p>
+              </p:txBody>
+            </p:sp>
+            <p:sp>
+              <p:nvSpPr>
+                <p:cNvPr id="82" name="Rectangle 81">
+                  <a:extLst>
+                    <a:ext uri="{FF2B5EF4-FFF2-40B4-BE49-F238E27FC236}">
+                      <a16:creationId xmlns:a16="http://schemas.microsoft.com/office/drawing/2014/main" id="{51988EDD-5CBB-48EC-9BC8-60C3D7619AAB}"/>
+                    </a:ext>
+                  </a:extLst>
+                </p:cNvPr>
+                <p:cNvSpPr/>
+                <p:nvPr/>
+              </p:nvSpPr>
+              <p:spPr>
+                <a:xfrm>
+                  <a:off x="8859790" y="1402050"/>
+                  <a:ext cx="958463" cy="111471"/>
+                </a:xfrm>
+                <a:prstGeom prst="rect">
+                  <a:avLst/>
+                </a:prstGeom>
+              </p:spPr>
+              <p:style>
+                <a:lnRef idx="2">
+                  <a:schemeClr val="accent5">
+                    <a:shade val="50000"/>
+                  </a:schemeClr>
+                </a:lnRef>
+                <a:fillRef idx="1">
+                  <a:schemeClr val="accent5"/>
+                </a:fillRef>
+                <a:effectRef idx="0">
+                  <a:schemeClr val="accent5"/>
+                </a:effectRef>
+                <a:fontRef idx="minor">
+                  <a:schemeClr val="lt1"/>
+                </a:fontRef>
+              </p:style>
+              <p:txBody>
+                <a:bodyPr rtlCol="0" anchor="ctr"/>
+                <a:lstStyle/>
+                <a:p>
+                  <a:pPr algn="ctr"/>
+                  <a:endParaRPr lang="en-GB"/>
+                </a:p>
+              </p:txBody>
+            </p:sp>
+          </p:grpSp>
+          <p:sp>
+            <p:nvSpPr>
+              <p:cNvPr id="84" name="Arrow: Curved Right 83">
+                <a:extLst>
+                  <a:ext uri="{FF2B5EF4-FFF2-40B4-BE49-F238E27FC236}">
+                    <a16:creationId xmlns:a16="http://schemas.microsoft.com/office/drawing/2014/main" id="{8A6DCBDE-5063-4B1C-AFDB-ABEEB51C72CB}"/>
+                  </a:ext>
+                </a:extLst>
+              </p:cNvPr>
+              <p:cNvSpPr/>
               <p:nvPr/>
             </p:nvSpPr>
             <p:spPr>
-              <a:xfrm>
-                <a:off x="7353775" y="157018"/>
-                <a:ext cx="2852407" cy="1754326"/>
+              <a:xfrm rot="5400000">
+                <a:off x="10486890" y="1677057"/>
+                <a:ext cx="252000" cy="252000"/>
               </a:xfrm>
-              <a:prstGeom prst="rect">
+              <a:prstGeom prst="curvedRightArrow">
                 <a:avLst/>
               </a:prstGeom>
             </p:spPr>
@@ -5687,259 +6606,25 @@
               </a:fontRef>
             </p:style>
             <p:txBody>
-              <a:bodyPr wrap="square" rtlCol="0">
-                <a:spAutoFit/>
-              </a:bodyPr>
-              <a:lstStyle/>
-              <a:p>
-                <a:r>
-                  <a:rPr lang="en-GB" dirty="0"/>
-                  <a:t>Types of transition:</a:t>
-                </a:r>
-              </a:p>
-              <a:p>
-                <a:pPr marL="285750" indent="-285750">
-                  <a:buFont typeface="Arial" panose="020B0604020202020204" pitchFamily="34" charset="0"/>
-                  <a:buChar char="•"/>
-                </a:pPr>
-                <a:r>
-                  <a:rPr lang="en-GB" dirty="0"/>
-                  <a:t>Death         -</a:t>
-                </a:r>
-              </a:p>
-              <a:p>
-                <a:pPr marL="285750" indent="-285750">
-                  <a:buFont typeface="Arial" panose="020B0604020202020204" pitchFamily="34" charset="0"/>
-                  <a:buChar char="•"/>
-                </a:pPr>
-                <a:r>
-                  <a:rPr lang="en-GB" dirty="0"/>
-                  <a:t>Spread       -</a:t>
-                </a:r>
-              </a:p>
-              <a:p>
-                <a:pPr marL="285750" indent="-285750">
-                  <a:buFont typeface="Arial" panose="020B0604020202020204" pitchFamily="34" charset="0"/>
-                  <a:buChar char="•"/>
-                </a:pPr>
-                <a:r>
-                  <a:rPr lang="en-GB" dirty="0"/>
-                  <a:t>Recovery   -</a:t>
-                </a:r>
-              </a:p>
-              <a:p>
-                <a:pPr marL="285750" indent="-285750">
-                  <a:buFont typeface="Arial" panose="020B0604020202020204" pitchFamily="34" charset="0"/>
-                  <a:buChar char="•"/>
-                </a:pPr>
-                <a:r>
-                  <a:rPr lang="en-GB" dirty="0"/>
-                  <a:t>Mutation   -</a:t>
-                </a:r>
-              </a:p>
-              <a:p>
-                <a:pPr marL="285750" indent="-285750">
-                  <a:buFont typeface="Arial" panose="020B0604020202020204" pitchFamily="34" charset="0"/>
-                  <a:buChar char="•"/>
-                </a:pPr>
-                <a:r>
-                  <a:rPr lang="en-GB" dirty="0"/>
-                  <a:t>No change - </a:t>
-                </a:r>
-              </a:p>
-            </p:txBody>
-          </p:sp>
-          <p:sp>
-            <p:nvSpPr>
-              <p:cNvPr id="79" name="Rectangle 78">
-                <a:extLst>
-                  <a:ext uri="{FF2B5EF4-FFF2-40B4-BE49-F238E27FC236}">
-                    <a16:creationId xmlns:a16="http://schemas.microsoft.com/office/drawing/2014/main" id="{64DE77D6-4E8F-463F-931A-F7D14808EEEA}"/>
-                  </a:ext>
-                </a:extLst>
-              </p:cNvPr>
-              <p:cNvSpPr/>
-              <p:nvPr/>
-            </p:nvSpPr>
-            <p:spPr>
-              <a:xfrm>
-                <a:off x="8859792" y="554243"/>
-                <a:ext cx="958463" cy="111471"/>
-              </a:xfrm>
-              <a:prstGeom prst="rect">
-                <a:avLst/>
-              </a:prstGeom>
-            </p:spPr>
-            <p:style>
-              <a:lnRef idx="2">
-                <a:schemeClr val="accent2">
-                  <a:shade val="50000"/>
-                </a:schemeClr>
-              </a:lnRef>
-              <a:fillRef idx="1">
-                <a:schemeClr val="accent2"/>
-              </a:fillRef>
-              <a:effectRef idx="0">
-                <a:schemeClr val="accent2"/>
-              </a:effectRef>
-              <a:fontRef idx="minor">
-                <a:schemeClr val="lt1"/>
-              </a:fontRef>
-            </p:style>
-            <p:txBody>
               <a:bodyPr rtlCol="0" anchor="ctr"/>
               <a:lstStyle/>
               <a:p>
                 <a:pPr algn="ctr"/>
-                <a:endParaRPr lang="en-GB"/>
-              </a:p>
-            </p:txBody>
-          </p:sp>
-          <p:sp>
-            <p:nvSpPr>
-              <p:cNvPr id="80" name="Rectangle 79">
-                <a:extLst>
-                  <a:ext uri="{FF2B5EF4-FFF2-40B4-BE49-F238E27FC236}">
-                    <a16:creationId xmlns:a16="http://schemas.microsoft.com/office/drawing/2014/main" id="{1A98B002-80C8-424D-90D5-BD7979977AEF}"/>
-                  </a:ext>
-                </a:extLst>
-              </p:cNvPr>
-              <p:cNvSpPr/>
-              <p:nvPr/>
-            </p:nvSpPr>
-            <p:spPr>
-              <a:xfrm>
-                <a:off x="8859791" y="848577"/>
-                <a:ext cx="958463" cy="111471"/>
-              </a:xfrm>
-              <a:prstGeom prst="rect">
-                <a:avLst/>
-              </a:prstGeom>
-            </p:spPr>
-            <p:style>
-              <a:lnRef idx="2">
-                <a:schemeClr val="accent3">
-                  <a:shade val="50000"/>
-                </a:schemeClr>
-              </a:lnRef>
-              <a:fillRef idx="1">
-                <a:schemeClr val="accent3"/>
-              </a:fillRef>
-              <a:effectRef idx="0">
-                <a:schemeClr val="accent3"/>
-              </a:effectRef>
-              <a:fontRef idx="minor">
-                <a:schemeClr val="lt1"/>
-              </a:fontRef>
-            </p:style>
-            <p:txBody>
-              <a:bodyPr rtlCol="0" anchor="ctr"/>
-              <a:lstStyle/>
-              <a:p>
-                <a:pPr algn="ctr"/>
-                <a:endParaRPr lang="en-GB"/>
-              </a:p>
-            </p:txBody>
-          </p:sp>
-          <p:sp>
-            <p:nvSpPr>
-              <p:cNvPr id="81" name="Rectangle 80">
-                <a:extLst>
-                  <a:ext uri="{FF2B5EF4-FFF2-40B4-BE49-F238E27FC236}">
-                    <a16:creationId xmlns:a16="http://schemas.microsoft.com/office/drawing/2014/main" id="{BC82A7DE-86A2-4F01-9AA8-88BEBD534AEB}"/>
-                  </a:ext>
-                </a:extLst>
-              </p:cNvPr>
-              <p:cNvSpPr/>
-              <p:nvPr/>
-            </p:nvSpPr>
-            <p:spPr>
-              <a:xfrm>
-                <a:off x="8859790" y="1134432"/>
-                <a:ext cx="958463" cy="111471"/>
-              </a:xfrm>
-              <a:prstGeom prst="rect">
-                <a:avLst/>
-              </a:prstGeom>
-            </p:spPr>
-            <p:style>
-              <a:lnRef idx="2">
-                <a:schemeClr val="accent6">
-                  <a:shade val="50000"/>
-                </a:schemeClr>
-              </a:lnRef>
-              <a:fillRef idx="1">
-                <a:schemeClr val="accent6"/>
-              </a:fillRef>
-              <a:effectRef idx="0">
-                <a:schemeClr val="accent6"/>
-              </a:effectRef>
-              <a:fontRef idx="minor">
-                <a:schemeClr val="lt1"/>
-              </a:fontRef>
-            </p:style>
-            <p:txBody>
-              <a:bodyPr rtlCol="0" anchor="ctr"/>
-              <a:lstStyle/>
-              <a:p>
-                <a:pPr algn="ctr"/>
-                <a:endParaRPr lang="en-GB"/>
-              </a:p>
-            </p:txBody>
-          </p:sp>
-          <p:sp>
-            <p:nvSpPr>
-              <p:cNvPr id="82" name="Rectangle 81">
-                <a:extLst>
-                  <a:ext uri="{FF2B5EF4-FFF2-40B4-BE49-F238E27FC236}">
-                    <a16:creationId xmlns:a16="http://schemas.microsoft.com/office/drawing/2014/main" id="{51988EDD-5CBB-48EC-9BC8-60C3D7619AAB}"/>
-                  </a:ext>
-                </a:extLst>
-              </p:cNvPr>
-              <p:cNvSpPr/>
-              <p:nvPr/>
-            </p:nvSpPr>
-            <p:spPr>
-              <a:xfrm>
-                <a:off x="8859790" y="1402050"/>
-                <a:ext cx="958463" cy="111471"/>
-              </a:xfrm>
-              <a:prstGeom prst="rect">
-                <a:avLst/>
-              </a:prstGeom>
-            </p:spPr>
-            <p:style>
-              <a:lnRef idx="2">
-                <a:schemeClr val="accent5">
-                  <a:shade val="50000"/>
-                </a:schemeClr>
-              </a:lnRef>
-              <a:fillRef idx="1">
-                <a:schemeClr val="accent5"/>
-              </a:fillRef>
-              <a:effectRef idx="0">
-                <a:schemeClr val="accent5"/>
-              </a:effectRef>
-              <a:fontRef idx="minor">
-                <a:schemeClr val="lt1"/>
-              </a:fontRef>
-            </p:style>
-            <p:txBody>
-              <a:bodyPr rtlCol="0" anchor="ctr"/>
-              <a:lstStyle/>
-              <a:p>
-                <a:pPr algn="ctr"/>
-                <a:endParaRPr lang="en-GB"/>
+                <a:endParaRPr lang="en-GB">
+                  <a:solidFill>
+                    <a:schemeClr val="tx1"/>
+                  </a:solidFill>
+                </a:endParaRPr>
               </a:p>
             </p:txBody>
           </p:sp>
         </p:grpSp>
         <p:sp>
           <p:nvSpPr>
-            <p:cNvPr id="84" name="Arrow: Curved Right 83">
+            <p:cNvPr id="85" name="Arrow: Curved Right 84">
               <a:extLst>
                 <a:ext uri="{FF2B5EF4-FFF2-40B4-BE49-F238E27FC236}">
-                  <a16:creationId xmlns:a16="http://schemas.microsoft.com/office/drawing/2014/main" id="{8A6DCBDE-5063-4B1C-AFDB-ABEEB51C72CB}"/>
+                  <a16:creationId xmlns:a16="http://schemas.microsoft.com/office/drawing/2014/main" id="{44B7C320-33A6-465F-B69E-FC6B99645B19}"/>
                 </a:ext>
               </a:extLst>
             </p:cNvPr>
@@ -5948,7 +6633,7 @@
           </p:nvSpPr>
           <p:spPr>
             <a:xfrm rot="5400000">
-              <a:off x="10681394" y="1669326"/>
+              <a:off x="11127870" y="1683307"/>
               <a:ext cx="252000" cy="252000"/>
             </a:xfrm>
             <a:prstGeom prst="curvedRightArrow">
@@ -5957,13 +6642,13 @@
           </p:spPr>
           <p:style>
             <a:lnRef idx="2">
-              <a:schemeClr val="dk1"/>
+              <a:schemeClr val="accent4"/>
             </a:lnRef>
             <a:fillRef idx="1">
               <a:schemeClr val="lt1"/>
             </a:fillRef>
             <a:effectRef idx="0">
-              <a:schemeClr val="dk1"/>
+              <a:schemeClr val="accent4"/>
             </a:effectRef>
             <a:fontRef idx="minor">
               <a:schemeClr val="dk1"/>
@@ -5983,6 +6668,102 @@
           </p:txBody>
         </p:sp>
       </p:grpSp>
+      <p:sp>
+        <p:nvSpPr>
+          <p:cNvPr id="86" name="Arrow: Curved Right 85">
+            <a:extLst>
+              <a:ext uri="{FF2B5EF4-FFF2-40B4-BE49-F238E27FC236}">
+                <a16:creationId xmlns:a16="http://schemas.microsoft.com/office/drawing/2014/main" id="{4D45007D-9A2C-452B-A150-9B66658044BE}"/>
+              </a:ext>
+            </a:extLst>
+          </p:cNvPr>
+          <p:cNvSpPr/>
+          <p:nvPr/>
+        </p:nvSpPr>
+        <p:spPr>
+          <a:xfrm rot="5400000">
+            <a:off x="6994689" y="3373517"/>
+            <a:ext cx="252000" cy="252000"/>
+          </a:xfrm>
+          <a:prstGeom prst="curvedRightArrow">
+            <a:avLst/>
+          </a:prstGeom>
+        </p:spPr>
+        <p:style>
+          <a:lnRef idx="2">
+            <a:schemeClr val="accent4"/>
+          </a:lnRef>
+          <a:fillRef idx="1">
+            <a:schemeClr val="lt1"/>
+          </a:fillRef>
+          <a:effectRef idx="0">
+            <a:schemeClr val="accent4"/>
+          </a:effectRef>
+          <a:fontRef idx="minor">
+            <a:schemeClr val="dk1"/>
+          </a:fontRef>
+        </p:style>
+        <p:txBody>
+          <a:bodyPr rtlCol="0" anchor="ctr"/>
+          <a:lstStyle/>
+          <a:p>
+            <a:pPr algn="ctr"/>
+            <a:endParaRPr lang="en-GB">
+              <a:solidFill>
+                <a:schemeClr val="tx1"/>
+              </a:solidFill>
+            </a:endParaRPr>
+          </a:p>
+        </p:txBody>
+      </p:sp>
+      <p:sp>
+        <p:nvSpPr>
+          <p:cNvPr id="87" name="Arrow: Curved Right 86">
+            <a:extLst>
+              <a:ext uri="{FF2B5EF4-FFF2-40B4-BE49-F238E27FC236}">
+                <a16:creationId xmlns:a16="http://schemas.microsoft.com/office/drawing/2014/main" id="{B2CA2BFA-27CC-4715-9114-06B868C21A3C}"/>
+              </a:ext>
+            </a:extLst>
+          </p:cNvPr>
+          <p:cNvSpPr/>
+          <p:nvPr/>
+        </p:nvSpPr>
+        <p:spPr>
+          <a:xfrm rot="5400000">
+            <a:off x="8080752" y="4152313"/>
+            <a:ext cx="252000" cy="252000"/>
+          </a:xfrm>
+          <a:prstGeom prst="curvedRightArrow">
+            <a:avLst/>
+          </a:prstGeom>
+        </p:spPr>
+        <p:style>
+          <a:lnRef idx="2">
+            <a:schemeClr val="accent4"/>
+          </a:lnRef>
+          <a:fillRef idx="1">
+            <a:schemeClr val="lt1"/>
+          </a:fillRef>
+          <a:effectRef idx="0">
+            <a:schemeClr val="accent4"/>
+          </a:effectRef>
+          <a:fontRef idx="minor">
+            <a:schemeClr val="dk1"/>
+          </a:fontRef>
+        </p:style>
+        <p:txBody>
+          <a:bodyPr rtlCol="0" anchor="ctr"/>
+          <a:lstStyle/>
+          <a:p>
+            <a:pPr algn="ctr"/>
+            <a:endParaRPr lang="en-GB">
+              <a:solidFill>
+                <a:schemeClr val="tx1"/>
+              </a:solidFill>
+            </a:endParaRPr>
+          </a:p>
+        </p:txBody>
+      </p:sp>
     </p:spTree>
     <p:extLst>
       <p:ext uri="{BB962C8B-B14F-4D97-AF65-F5344CB8AC3E}">
@@ -5996,7 +6777,7 @@
 </p:sld>
 </file>
 
-<file path=ppt/slides/slide2.xml><?xml version="1.0" encoding="utf-8"?>
+<file path=ppt/slides/slide8.xml><?xml version="1.0" encoding="utf-8"?>
 <p:sld xmlns:a="http://schemas.openxmlformats.org/drawingml/2006/main" xmlns:r="http://schemas.openxmlformats.org/officeDocument/2006/relationships" xmlns:p="http://schemas.openxmlformats.org/presentationml/2006/main">
   <p:cSld>
     <p:spTree>
@@ -6028,9 +6809,9 @@
         <p:grpSpPr>
           <a:xfrm>
             <a:off x="2676786" y="485791"/>
-            <a:ext cx="6838427" cy="5886418"/>
+            <a:ext cx="5415794" cy="5868170"/>
             <a:chOff x="2676786" y="485791"/>
-            <a:chExt cx="6838427" cy="5886418"/>
+            <a:chExt cx="5415794" cy="5868170"/>
           </a:xfrm>
         </p:grpSpPr>
         <p:sp>
@@ -6095,7 +6876,7 @@
           </p:nvSpPr>
           <p:spPr>
             <a:xfrm>
-              <a:off x="6669946" y="5787434"/>
+              <a:off x="5015047" y="5769186"/>
               <a:ext cx="2845267" cy="584775"/>
             </a:xfrm>
             <a:prstGeom prst="rect">
@@ -6305,7 +7086,7 @@
         </p:nvSpPr>
         <p:spPr>
           <a:xfrm rot="5400000">
-            <a:off x="5880000" y="2535335"/>
+            <a:off x="5240551" y="2528813"/>
             <a:ext cx="432000" cy="432000"/>
           </a:xfrm>
           <a:prstGeom prst="curvedRightArrow">
@@ -6339,378 +7120,6 @@
           </a:p>
         </p:txBody>
       </p:sp>
-      <p:grpSp>
-        <p:nvGrpSpPr>
-          <p:cNvPr id="12" name="Group 11">
-            <a:extLst>
-              <a:ext uri="{FF2B5EF4-FFF2-40B4-BE49-F238E27FC236}">
-                <a16:creationId xmlns:a16="http://schemas.microsoft.com/office/drawing/2014/main" id="{807CA9FF-7A52-4F18-A3A1-9913A88E5156}"/>
-              </a:ext>
-            </a:extLst>
-          </p:cNvPr>
-          <p:cNvGrpSpPr/>
-          <p:nvPr/>
-        </p:nvGrpSpPr>
-        <p:grpSpPr>
-          <a:xfrm>
-            <a:off x="9102207" y="146471"/>
-            <a:ext cx="2852407" cy="1754326"/>
-            <a:chOff x="8818647" y="232059"/>
-            <a:chExt cx="2852407" cy="1754326"/>
-          </a:xfrm>
-        </p:grpSpPr>
-        <p:grpSp>
-          <p:nvGrpSpPr>
-            <p:cNvPr id="13" name="Group 12">
-              <a:extLst>
-                <a:ext uri="{FF2B5EF4-FFF2-40B4-BE49-F238E27FC236}">
-                  <a16:creationId xmlns:a16="http://schemas.microsoft.com/office/drawing/2014/main" id="{A27F1AF8-634B-43EC-BA84-16582D203C51}"/>
-                </a:ext>
-              </a:extLst>
-            </p:cNvPr>
-            <p:cNvGrpSpPr/>
-            <p:nvPr/>
-          </p:nvGrpSpPr>
-          <p:grpSpPr>
-            <a:xfrm>
-              <a:off x="8818647" y="232059"/>
-              <a:ext cx="2852407" cy="1754326"/>
-              <a:chOff x="7353775" y="157018"/>
-              <a:chExt cx="2852407" cy="1754326"/>
-            </a:xfrm>
-          </p:grpSpPr>
-          <p:sp>
-            <p:nvSpPr>
-              <p:cNvPr id="15" name="TextBox 14">
-                <a:extLst>
-                  <a:ext uri="{FF2B5EF4-FFF2-40B4-BE49-F238E27FC236}">
-                    <a16:creationId xmlns:a16="http://schemas.microsoft.com/office/drawing/2014/main" id="{BAC2300F-65BC-4D9B-ABFA-5B1774CB38D8}"/>
-                  </a:ext>
-                </a:extLst>
-              </p:cNvPr>
-              <p:cNvSpPr txBox="1"/>
-              <p:nvPr/>
-            </p:nvSpPr>
-            <p:spPr>
-              <a:xfrm>
-                <a:off x="7353775" y="157018"/>
-                <a:ext cx="2852407" cy="1754326"/>
-              </a:xfrm>
-              <a:prstGeom prst="rect">
-                <a:avLst/>
-              </a:prstGeom>
-            </p:spPr>
-            <p:style>
-              <a:lnRef idx="2">
-                <a:schemeClr val="dk1"/>
-              </a:lnRef>
-              <a:fillRef idx="1">
-                <a:schemeClr val="lt1"/>
-              </a:fillRef>
-              <a:effectRef idx="0">
-                <a:schemeClr val="dk1"/>
-              </a:effectRef>
-              <a:fontRef idx="minor">
-                <a:schemeClr val="dk1"/>
-              </a:fontRef>
-            </p:style>
-            <p:txBody>
-              <a:bodyPr wrap="square" rtlCol="0">
-                <a:spAutoFit/>
-              </a:bodyPr>
-              <a:lstStyle/>
-              <a:p>
-                <a:r>
-                  <a:rPr lang="en-GB" dirty="0"/>
-                  <a:t>Types of transition:</a:t>
-                </a:r>
-              </a:p>
-              <a:p>
-                <a:pPr marL="285750" indent="-285750">
-                  <a:buFont typeface="Arial" panose="020B0604020202020204" pitchFamily="34" charset="0"/>
-                  <a:buChar char="•"/>
-                </a:pPr>
-                <a:r>
-                  <a:rPr lang="en-GB" dirty="0"/>
-                  <a:t>Death         -</a:t>
-                </a:r>
-              </a:p>
-              <a:p>
-                <a:pPr marL="285750" indent="-285750">
-                  <a:buFont typeface="Arial" panose="020B0604020202020204" pitchFamily="34" charset="0"/>
-                  <a:buChar char="•"/>
-                </a:pPr>
-                <a:r>
-                  <a:rPr lang="en-GB" dirty="0"/>
-                  <a:t>Spread       -</a:t>
-                </a:r>
-              </a:p>
-              <a:p>
-                <a:pPr marL="285750" indent="-285750">
-                  <a:buFont typeface="Arial" panose="020B0604020202020204" pitchFamily="34" charset="0"/>
-                  <a:buChar char="•"/>
-                </a:pPr>
-                <a:r>
-                  <a:rPr lang="en-GB" dirty="0"/>
-                  <a:t>Recovery   -</a:t>
-                </a:r>
-              </a:p>
-              <a:p>
-                <a:pPr marL="285750" indent="-285750">
-                  <a:buFont typeface="Arial" panose="020B0604020202020204" pitchFamily="34" charset="0"/>
-                  <a:buChar char="•"/>
-                </a:pPr>
-                <a:r>
-                  <a:rPr lang="en-GB" dirty="0"/>
-                  <a:t>Mutation   -</a:t>
-                </a:r>
-              </a:p>
-              <a:p>
-                <a:pPr marL="285750" indent="-285750">
-                  <a:buFont typeface="Arial" panose="020B0604020202020204" pitchFamily="34" charset="0"/>
-                  <a:buChar char="•"/>
-                </a:pPr>
-                <a:r>
-                  <a:rPr lang="en-GB" dirty="0"/>
-                  <a:t>No change - </a:t>
-                </a:r>
-              </a:p>
-            </p:txBody>
-          </p:sp>
-          <p:sp>
-            <p:nvSpPr>
-              <p:cNvPr id="16" name="Rectangle 15">
-                <a:extLst>
-                  <a:ext uri="{FF2B5EF4-FFF2-40B4-BE49-F238E27FC236}">
-                    <a16:creationId xmlns:a16="http://schemas.microsoft.com/office/drawing/2014/main" id="{4DCC3343-DAB0-49FB-82A5-BFB2E30CB9D7}"/>
-                  </a:ext>
-                </a:extLst>
-              </p:cNvPr>
-              <p:cNvSpPr/>
-              <p:nvPr/>
-            </p:nvSpPr>
-            <p:spPr>
-              <a:xfrm>
-                <a:off x="8859792" y="554243"/>
-                <a:ext cx="958463" cy="111471"/>
-              </a:xfrm>
-              <a:prstGeom prst="rect">
-                <a:avLst/>
-              </a:prstGeom>
-            </p:spPr>
-            <p:style>
-              <a:lnRef idx="2">
-                <a:schemeClr val="accent2">
-                  <a:shade val="50000"/>
-                </a:schemeClr>
-              </a:lnRef>
-              <a:fillRef idx="1">
-                <a:schemeClr val="accent2"/>
-              </a:fillRef>
-              <a:effectRef idx="0">
-                <a:schemeClr val="accent2"/>
-              </a:effectRef>
-              <a:fontRef idx="minor">
-                <a:schemeClr val="lt1"/>
-              </a:fontRef>
-            </p:style>
-            <p:txBody>
-              <a:bodyPr rtlCol="0" anchor="ctr"/>
-              <a:lstStyle/>
-              <a:p>
-                <a:pPr algn="ctr"/>
-                <a:endParaRPr lang="en-GB"/>
-              </a:p>
-            </p:txBody>
-          </p:sp>
-          <p:sp>
-            <p:nvSpPr>
-              <p:cNvPr id="17" name="Rectangle 16">
-                <a:extLst>
-                  <a:ext uri="{FF2B5EF4-FFF2-40B4-BE49-F238E27FC236}">
-                    <a16:creationId xmlns:a16="http://schemas.microsoft.com/office/drawing/2014/main" id="{ED1F446E-5A0F-4B38-88BD-1034971C0F08}"/>
-                  </a:ext>
-                </a:extLst>
-              </p:cNvPr>
-              <p:cNvSpPr/>
-              <p:nvPr/>
-            </p:nvSpPr>
-            <p:spPr>
-              <a:xfrm>
-                <a:off x="8859791" y="848577"/>
-                <a:ext cx="958463" cy="111471"/>
-              </a:xfrm>
-              <a:prstGeom prst="rect">
-                <a:avLst/>
-              </a:prstGeom>
-            </p:spPr>
-            <p:style>
-              <a:lnRef idx="2">
-                <a:schemeClr val="accent3">
-                  <a:shade val="50000"/>
-                </a:schemeClr>
-              </a:lnRef>
-              <a:fillRef idx="1">
-                <a:schemeClr val="accent3"/>
-              </a:fillRef>
-              <a:effectRef idx="0">
-                <a:schemeClr val="accent3"/>
-              </a:effectRef>
-              <a:fontRef idx="minor">
-                <a:schemeClr val="lt1"/>
-              </a:fontRef>
-            </p:style>
-            <p:txBody>
-              <a:bodyPr rtlCol="0" anchor="ctr"/>
-              <a:lstStyle/>
-              <a:p>
-                <a:pPr algn="ctr"/>
-                <a:endParaRPr lang="en-GB"/>
-              </a:p>
-            </p:txBody>
-          </p:sp>
-          <p:sp>
-            <p:nvSpPr>
-              <p:cNvPr id="18" name="Rectangle 17">
-                <a:extLst>
-                  <a:ext uri="{FF2B5EF4-FFF2-40B4-BE49-F238E27FC236}">
-                    <a16:creationId xmlns:a16="http://schemas.microsoft.com/office/drawing/2014/main" id="{0E023737-C5FF-4EED-A65D-0CA54B0174B3}"/>
-                  </a:ext>
-                </a:extLst>
-              </p:cNvPr>
-              <p:cNvSpPr/>
-              <p:nvPr/>
-            </p:nvSpPr>
-            <p:spPr>
-              <a:xfrm>
-                <a:off x="8859790" y="1134432"/>
-                <a:ext cx="958463" cy="111471"/>
-              </a:xfrm>
-              <a:prstGeom prst="rect">
-                <a:avLst/>
-              </a:prstGeom>
-            </p:spPr>
-            <p:style>
-              <a:lnRef idx="2">
-                <a:schemeClr val="accent6">
-                  <a:shade val="50000"/>
-                </a:schemeClr>
-              </a:lnRef>
-              <a:fillRef idx="1">
-                <a:schemeClr val="accent6"/>
-              </a:fillRef>
-              <a:effectRef idx="0">
-                <a:schemeClr val="accent6"/>
-              </a:effectRef>
-              <a:fontRef idx="minor">
-                <a:schemeClr val="lt1"/>
-              </a:fontRef>
-            </p:style>
-            <p:txBody>
-              <a:bodyPr rtlCol="0" anchor="ctr"/>
-              <a:lstStyle/>
-              <a:p>
-                <a:pPr algn="ctr"/>
-                <a:endParaRPr lang="en-GB"/>
-              </a:p>
-            </p:txBody>
-          </p:sp>
-          <p:sp>
-            <p:nvSpPr>
-              <p:cNvPr id="19" name="Rectangle 18">
-                <a:extLst>
-                  <a:ext uri="{FF2B5EF4-FFF2-40B4-BE49-F238E27FC236}">
-                    <a16:creationId xmlns:a16="http://schemas.microsoft.com/office/drawing/2014/main" id="{5CA53959-157D-4A37-8A2C-F4FB00DFA8C2}"/>
-                  </a:ext>
-                </a:extLst>
-              </p:cNvPr>
-              <p:cNvSpPr/>
-              <p:nvPr/>
-            </p:nvSpPr>
-            <p:spPr>
-              <a:xfrm>
-                <a:off x="8859790" y="1402050"/>
-                <a:ext cx="958463" cy="111471"/>
-              </a:xfrm>
-              <a:prstGeom prst="rect">
-                <a:avLst/>
-              </a:prstGeom>
-            </p:spPr>
-            <p:style>
-              <a:lnRef idx="2">
-                <a:schemeClr val="accent5">
-                  <a:shade val="50000"/>
-                </a:schemeClr>
-              </a:lnRef>
-              <a:fillRef idx="1">
-                <a:schemeClr val="accent5"/>
-              </a:fillRef>
-              <a:effectRef idx="0">
-                <a:schemeClr val="accent5"/>
-              </a:effectRef>
-              <a:fontRef idx="minor">
-                <a:schemeClr val="lt1"/>
-              </a:fontRef>
-            </p:style>
-            <p:txBody>
-              <a:bodyPr rtlCol="0" anchor="ctr"/>
-              <a:lstStyle/>
-              <a:p>
-                <a:pPr algn="ctr"/>
-                <a:endParaRPr lang="en-GB"/>
-              </a:p>
-            </p:txBody>
-          </p:sp>
-        </p:grpSp>
-        <p:sp>
-          <p:nvSpPr>
-            <p:cNvPr id="14" name="Arrow: Curved Right 13">
-              <a:extLst>
-                <a:ext uri="{FF2B5EF4-FFF2-40B4-BE49-F238E27FC236}">
-                  <a16:creationId xmlns:a16="http://schemas.microsoft.com/office/drawing/2014/main" id="{A39B0595-2ECD-4224-AFEA-96C0ECDE06C3}"/>
-                </a:ext>
-              </a:extLst>
-            </p:cNvPr>
-            <p:cNvSpPr/>
-            <p:nvPr/>
-          </p:nvSpPr>
-          <p:spPr>
-            <a:xfrm rot="5400000">
-              <a:off x="10681394" y="1669326"/>
-              <a:ext cx="252000" cy="252000"/>
-            </a:xfrm>
-            <a:prstGeom prst="curvedRightArrow">
-              <a:avLst/>
-            </a:prstGeom>
-          </p:spPr>
-          <p:style>
-            <a:lnRef idx="2">
-              <a:schemeClr val="dk1"/>
-            </a:lnRef>
-            <a:fillRef idx="1">
-              <a:schemeClr val="lt1"/>
-            </a:fillRef>
-            <a:effectRef idx="0">
-              <a:schemeClr val="dk1"/>
-            </a:effectRef>
-            <a:fontRef idx="minor">
-              <a:schemeClr val="dk1"/>
-            </a:fontRef>
-          </p:style>
-          <p:txBody>
-            <a:bodyPr rtlCol="0" anchor="ctr"/>
-            <a:lstStyle/>
-            <a:p>
-              <a:pPr algn="ctr"/>
-              <a:endParaRPr lang="en-GB">
-                <a:solidFill>
-                  <a:schemeClr val="tx1"/>
-                </a:solidFill>
-              </a:endParaRPr>
-            </a:p>
-          </p:txBody>
-        </p:sp>
-      </p:grpSp>
       <p:sp>
         <p:nvSpPr>
           <p:cNvPr id="20" name="TextBox 19">
@@ -7179,7 +7588,7 @@
         </p:nvSpPr>
         <p:spPr>
           <a:xfrm>
-            <a:off x="6319775" y="2589698"/>
+            <a:off x="5065263" y="2193631"/>
             <a:ext cx="844336" cy="276999"/>
           </a:xfrm>
           <a:prstGeom prst="rect">
@@ -7318,6 +7727,574 @@
           </a:p>
         </p:txBody>
       </p:sp>
+      <p:sp>
+        <p:nvSpPr>
+          <p:cNvPr id="34" name="Arrow: Curved Right 33">
+            <a:extLst>
+              <a:ext uri="{FF2B5EF4-FFF2-40B4-BE49-F238E27FC236}">
+                <a16:creationId xmlns:a16="http://schemas.microsoft.com/office/drawing/2014/main" id="{0721D7EA-A3B1-4FDC-8C16-3A96E67C4182}"/>
+              </a:ext>
+            </a:extLst>
+          </p:cNvPr>
+          <p:cNvSpPr/>
+          <p:nvPr/>
+        </p:nvSpPr>
+        <p:spPr>
+          <a:xfrm rot="16200000">
+            <a:off x="7649348" y="3897187"/>
+            <a:ext cx="432000" cy="432000"/>
+          </a:xfrm>
+          <a:prstGeom prst="curvedRightArrow">
+            <a:avLst/>
+          </a:prstGeom>
+        </p:spPr>
+        <p:style>
+          <a:lnRef idx="2">
+            <a:schemeClr val="accent4"/>
+          </a:lnRef>
+          <a:fillRef idx="1">
+            <a:schemeClr val="lt1"/>
+          </a:fillRef>
+          <a:effectRef idx="0">
+            <a:schemeClr val="accent4"/>
+          </a:effectRef>
+          <a:fontRef idx="minor">
+            <a:schemeClr val="dk1"/>
+          </a:fontRef>
+        </p:style>
+        <p:txBody>
+          <a:bodyPr rtlCol="0" anchor="ctr"/>
+          <a:lstStyle/>
+          <a:p>
+            <a:pPr algn="ctr"/>
+            <a:endParaRPr lang="en-GB" dirty="0">
+              <a:solidFill>
+                <a:schemeClr val="tx1"/>
+              </a:solidFill>
+            </a:endParaRPr>
+          </a:p>
+        </p:txBody>
+      </p:sp>
+      <p:sp>
+        <p:nvSpPr>
+          <p:cNvPr id="39" name="TextBox 38">
+            <a:extLst>
+              <a:ext uri="{FF2B5EF4-FFF2-40B4-BE49-F238E27FC236}">
+                <a16:creationId xmlns:a16="http://schemas.microsoft.com/office/drawing/2014/main" id="{1CE4F8A4-3193-47B9-88E2-DCD81F6E434F}"/>
+              </a:ext>
+            </a:extLst>
+          </p:cNvPr>
+          <p:cNvSpPr txBox="1"/>
+          <p:nvPr/>
+        </p:nvSpPr>
+        <p:spPr>
+          <a:xfrm>
+            <a:off x="8280641" y="3745597"/>
+            <a:ext cx="3357346" cy="2862322"/>
+          </a:xfrm>
+          <a:prstGeom prst="rect">
+            <a:avLst/>
+          </a:prstGeom>
+          <a:noFill/>
+        </p:spPr>
+        <p:txBody>
+          <a:bodyPr wrap="square" rtlCol="0">
+            <a:spAutoFit/>
+          </a:bodyPr>
+          <a:lstStyle/>
+          <a:p>
+            <a:r>
+              <a:rPr lang="en-GB" sz="1200" dirty="0"/>
+              <a:t>A patient can be put into isolation, which doesn’t change their state, but stops them spreading/receiving any infections they have.</a:t>
+            </a:r>
+          </a:p>
+          <a:p>
+            <a:endParaRPr lang="en-GB" sz="1200" dirty="0">
+              <a:solidFill>
+                <a:srgbClr val="FF0000"/>
+              </a:solidFill>
+            </a:endParaRPr>
+          </a:p>
+          <a:p>
+            <a:r>
+              <a:rPr lang="en-GB" sz="1200" dirty="0">
+                <a:solidFill>
+                  <a:schemeClr val="accent5"/>
+                </a:solidFill>
+              </a:rPr>
+              <a:t>Without the product, it takes a set lag period, then a random chance each time on top of that, and for the current drug to be insufficient (this models tests with long lag times) to increase the treatment, then when the treatment exceeds a threshold, they will be isolated</a:t>
+            </a:r>
+          </a:p>
+          <a:p>
+            <a:endParaRPr lang="en-GB" sz="1200" dirty="0">
+              <a:solidFill>
+                <a:schemeClr val="accent5"/>
+              </a:solidFill>
+            </a:endParaRPr>
+          </a:p>
+          <a:p>
+            <a:r>
+              <a:rPr lang="en-GB" sz="1200" dirty="0">
+                <a:solidFill>
+                  <a:schemeClr val="accent6"/>
+                </a:solidFill>
+              </a:rPr>
+              <a:t>With the product, patients are instantly isolated when their infection exceeds the threshold, since our product allows very fast testing – modelled as shorter than one timestep</a:t>
+            </a:r>
+          </a:p>
+        </p:txBody>
+      </p:sp>
+      <p:grpSp>
+        <p:nvGrpSpPr>
+          <p:cNvPr id="50" name="Group 49">
+            <a:extLst>
+              <a:ext uri="{FF2B5EF4-FFF2-40B4-BE49-F238E27FC236}">
+                <a16:creationId xmlns:a16="http://schemas.microsoft.com/office/drawing/2014/main" id="{E18FF31E-8087-4C7C-AAC9-BE3D7506F584}"/>
+              </a:ext>
+            </a:extLst>
+          </p:cNvPr>
+          <p:cNvGrpSpPr/>
+          <p:nvPr/>
+        </p:nvGrpSpPr>
+        <p:grpSpPr>
+          <a:xfrm>
+            <a:off x="9115593" y="40859"/>
+            <a:ext cx="2852407" cy="2031325"/>
+            <a:chOff x="9115593" y="40859"/>
+            <a:chExt cx="2852407" cy="2031325"/>
+          </a:xfrm>
+        </p:grpSpPr>
+        <p:grpSp>
+          <p:nvGrpSpPr>
+            <p:cNvPr id="51" name="Group 50">
+              <a:extLst>
+                <a:ext uri="{FF2B5EF4-FFF2-40B4-BE49-F238E27FC236}">
+                  <a16:creationId xmlns:a16="http://schemas.microsoft.com/office/drawing/2014/main" id="{D26AC0D4-D1A6-464B-92BD-AC1744B160F1}"/>
+                </a:ext>
+              </a:extLst>
+            </p:cNvPr>
+            <p:cNvGrpSpPr/>
+            <p:nvPr/>
+          </p:nvGrpSpPr>
+          <p:grpSpPr>
+            <a:xfrm>
+              <a:off x="9115593" y="40859"/>
+              <a:ext cx="2852407" cy="2031325"/>
+              <a:chOff x="8818647" y="232059"/>
+              <a:chExt cx="2852407" cy="2031325"/>
+            </a:xfrm>
+          </p:grpSpPr>
+          <p:grpSp>
+            <p:nvGrpSpPr>
+              <p:cNvPr id="53" name="Group 52">
+                <a:extLst>
+                  <a:ext uri="{FF2B5EF4-FFF2-40B4-BE49-F238E27FC236}">
+                    <a16:creationId xmlns:a16="http://schemas.microsoft.com/office/drawing/2014/main" id="{5FC71757-0F2E-476F-ADA0-3D2CC585689F}"/>
+                  </a:ext>
+                </a:extLst>
+              </p:cNvPr>
+              <p:cNvGrpSpPr/>
+              <p:nvPr/>
+            </p:nvGrpSpPr>
+            <p:grpSpPr>
+              <a:xfrm>
+                <a:off x="8818647" y="232059"/>
+                <a:ext cx="2852407" cy="2031325"/>
+                <a:chOff x="7353775" y="157018"/>
+                <a:chExt cx="2852407" cy="2031325"/>
+              </a:xfrm>
+            </p:grpSpPr>
+            <p:sp>
+              <p:nvSpPr>
+                <p:cNvPr id="55" name="TextBox 54">
+                  <a:extLst>
+                    <a:ext uri="{FF2B5EF4-FFF2-40B4-BE49-F238E27FC236}">
+                      <a16:creationId xmlns:a16="http://schemas.microsoft.com/office/drawing/2014/main" id="{E976E799-41FB-4789-AA2B-877EE11DEBBF}"/>
+                    </a:ext>
+                  </a:extLst>
+                </p:cNvPr>
+                <p:cNvSpPr txBox="1"/>
+                <p:nvPr/>
+              </p:nvSpPr>
+              <p:spPr>
+                <a:xfrm>
+                  <a:off x="7353775" y="157018"/>
+                  <a:ext cx="2852407" cy="2031325"/>
+                </a:xfrm>
+                <a:prstGeom prst="rect">
+                  <a:avLst/>
+                </a:prstGeom>
+              </p:spPr>
+              <p:style>
+                <a:lnRef idx="2">
+                  <a:schemeClr val="dk1"/>
+                </a:lnRef>
+                <a:fillRef idx="1">
+                  <a:schemeClr val="lt1"/>
+                </a:fillRef>
+                <a:effectRef idx="0">
+                  <a:schemeClr val="dk1"/>
+                </a:effectRef>
+                <a:fontRef idx="minor">
+                  <a:schemeClr val="dk1"/>
+                </a:fontRef>
+              </p:style>
+              <p:txBody>
+                <a:bodyPr wrap="square" rtlCol="0">
+                  <a:spAutoFit/>
+                </a:bodyPr>
+                <a:lstStyle/>
+                <a:p>
+                  <a:r>
+                    <a:rPr lang="en-GB" dirty="0"/>
+                    <a:t>Types of transition:</a:t>
+                  </a:r>
+                </a:p>
+                <a:p>
+                  <a:pPr marL="285750" indent="-285750">
+                    <a:buFont typeface="Arial" panose="020B0604020202020204" pitchFamily="34" charset="0"/>
+                    <a:buChar char="•"/>
+                  </a:pPr>
+                  <a:r>
+                    <a:rPr lang="en-GB" dirty="0"/>
+                    <a:t>Death         -</a:t>
+                  </a:r>
+                </a:p>
+                <a:p>
+                  <a:pPr marL="285750" indent="-285750">
+                    <a:buFont typeface="Arial" panose="020B0604020202020204" pitchFamily="34" charset="0"/>
+                    <a:buChar char="•"/>
+                  </a:pPr>
+                  <a:r>
+                    <a:rPr lang="en-GB" dirty="0"/>
+                    <a:t>Spread       -</a:t>
+                  </a:r>
+                </a:p>
+                <a:p>
+                  <a:pPr marL="285750" indent="-285750">
+                    <a:buFont typeface="Arial" panose="020B0604020202020204" pitchFamily="34" charset="0"/>
+                    <a:buChar char="•"/>
+                  </a:pPr>
+                  <a:r>
+                    <a:rPr lang="en-GB" dirty="0"/>
+                    <a:t>Recovery   -</a:t>
+                  </a:r>
+                </a:p>
+                <a:p>
+                  <a:pPr marL="285750" indent="-285750">
+                    <a:buFont typeface="Arial" panose="020B0604020202020204" pitchFamily="34" charset="0"/>
+                    <a:buChar char="•"/>
+                  </a:pPr>
+                  <a:r>
+                    <a:rPr lang="en-GB" dirty="0"/>
+                    <a:t>Mutation   -</a:t>
+                  </a:r>
+                </a:p>
+                <a:p>
+                  <a:pPr marL="285750" indent="-285750">
+                    <a:buFont typeface="Arial" panose="020B0604020202020204" pitchFamily="34" charset="0"/>
+                    <a:buChar char="•"/>
+                  </a:pPr>
+                  <a:r>
+                    <a:rPr lang="en-GB" dirty="0"/>
+                    <a:t>No change -</a:t>
+                  </a:r>
+                </a:p>
+                <a:p>
+                  <a:pPr marL="285750" indent="-285750">
+                    <a:buFont typeface="Arial" panose="020B0604020202020204" pitchFamily="34" charset="0"/>
+                    <a:buChar char="•"/>
+                  </a:pPr>
+                  <a:r>
+                    <a:rPr lang="en-GB" dirty="0"/>
+                    <a:t>Isolation     -</a:t>
+                  </a:r>
+                </a:p>
+              </p:txBody>
+            </p:sp>
+            <p:sp>
+              <p:nvSpPr>
+                <p:cNvPr id="56" name="Rectangle 55">
+                  <a:extLst>
+                    <a:ext uri="{FF2B5EF4-FFF2-40B4-BE49-F238E27FC236}">
+                      <a16:creationId xmlns:a16="http://schemas.microsoft.com/office/drawing/2014/main" id="{E5F2B194-4C55-4045-9587-AFABC8F06AA1}"/>
+                    </a:ext>
+                  </a:extLst>
+                </p:cNvPr>
+                <p:cNvSpPr/>
+                <p:nvPr/>
+              </p:nvSpPr>
+              <p:spPr>
+                <a:xfrm>
+                  <a:off x="8859792" y="554243"/>
+                  <a:ext cx="958463" cy="111471"/>
+                </a:xfrm>
+                <a:prstGeom prst="rect">
+                  <a:avLst/>
+                </a:prstGeom>
+              </p:spPr>
+              <p:style>
+                <a:lnRef idx="2">
+                  <a:schemeClr val="accent2">
+                    <a:shade val="50000"/>
+                  </a:schemeClr>
+                </a:lnRef>
+                <a:fillRef idx="1">
+                  <a:schemeClr val="accent2"/>
+                </a:fillRef>
+                <a:effectRef idx="0">
+                  <a:schemeClr val="accent2"/>
+                </a:effectRef>
+                <a:fontRef idx="minor">
+                  <a:schemeClr val="lt1"/>
+                </a:fontRef>
+              </p:style>
+              <p:txBody>
+                <a:bodyPr rtlCol="0" anchor="ctr"/>
+                <a:lstStyle/>
+                <a:p>
+                  <a:pPr algn="ctr"/>
+                  <a:endParaRPr lang="en-GB"/>
+                </a:p>
+              </p:txBody>
+            </p:sp>
+            <p:sp>
+              <p:nvSpPr>
+                <p:cNvPr id="57" name="Rectangle 56">
+                  <a:extLst>
+                    <a:ext uri="{FF2B5EF4-FFF2-40B4-BE49-F238E27FC236}">
+                      <a16:creationId xmlns:a16="http://schemas.microsoft.com/office/drawing/2014/main" id="{936B4521-E37D-4E3E-868B-985E811C67FD}"/>
+                    </a:ext>
+                  </a:extLst>
+                </p:cNvPr>
+                <p:cNvSpPr/>
+                <p:nvPr/>
+              </p:nvSpPr>
+              <p:spPr>
+                <a:xfrm>
+                  <a:off x="8859791" y="848577"/>
+                  <a:ext cx="958463" cy="111471"/>
+                </a:xfrm>
+                <a:prstGeom prst="rect">
+                  <a:avLst/>
+                </a:prstGeom>
+              </p:spPr>
+              <p:style>
+                <a:lnRef idx="2">
+                  <a:schemeClr val="accent3">
+                    <a:shade val="50000"/>
+                  </a:schemeClr>
+                </a:lnRef>
+                <a:fillRef idx="1">
+                  <a:schemeClr val="accent3"/>
+                </a:fillRef>
+                <a:effectRef idx="0">
+                  <a:schemeClr val="accent3"/>
+                </a:effectRef>
+                <a:fontRef idx="minor">
+                  <a:schemeClr val="lt1"/>
+                </a:fontRef>
+              </p:style>
+              <p:txBody>
+                <a:bodyPr rtlCol="0" anchor="ctr"/>
+                <a:lstStyle/>
+                <a:p>
+                  <a:pPr algn="ctr"/>
+                  <a:endParaRPr lang="en-GB"/>
+                </a:p>
+              </p:txBody>
+            </p:sp>
+            <p:sp>
+              <p:nvSpPr>
+                <p:cNvPr id="58" name="Rectangle 57">
+                  <a:extLst>
+                    <a:ext uri="{FF2B5EF4-FFF2-40B4-BE49-F238E27FC236}">
+                      <a16:creationId xmlns:a16="http://schemas.microsoft.com/office/drawing/2014/main" id="{77645A9C-FBBF-4063-AE5F-EBEF94973E50}"/>
+                    </a:ext>
+                  </a:extLst>
+                </p:cNvPr>
+                <p:cNvSpPr/>
+                <p:nvPr/>
+              </p:nvSpPr>
+              <p:spPr>
+                <a:xfrm>
+                  <a:off x="8859790" y="1134432"/>
+                  <a:ext cx="958463" cy="111471"/>
+                </a:xfrm>
+                <a:prstGeom prst="rect">
+                  <a:avLst/>
+                </a:prstGeom>
+              </p:spPr>
+              <p:style>
+                <a:lnRef idx="2">
+                  <a:schemeClr val="accent6">
+                    <a:shade val="50000"/>
+                  </a:schemeClr>
+                </a:lnRef>
+                <a:fillRef idx="1">
+                  <a:schemeClr val="accent6"/>
+                </a:fillRef>
+                <a:effectRef idx="0">
+                  <a:schemeClr val="accent6"/>
+                </a:effectRef>
+                <a:fontRef idx="minor">
+                  <a:schemeClr val="lt1"/>
+                </a:fontRef>
+              </p:style>
+              <p:txBody>
+                <a:bodyPr rtlCol="0" anchor="ctr"/>
+                <a:lstStyle/>
+                <a:p>
+                  <a:pPr algn="ctr"/>
+                  <a:endParaRPr lang="en-GB"/>
+                </a:p>
+              </p:txBody>
+            </p:sp>
+            <p:sp>
+              <p:nvSpPr>
+                <p:cNvPr id="59" name="Rectangle 58">
+                  <a:extLst>
+                    <a:ext uri="{FF2B5EF4-FFF2-40B4-BE49-F238E27FC236}">
+                      <a16:creationId xmlns:a16="http://schemas.microsoft.com/office/drawing/2014/main" id="{F614A73C-D01C-4D8C-8A84-35B055D0132D}"/>
+                    </a:ext>
+                  </a:extLst>
+                </p:cNvPr>
+                <p:cNvSpPr/>
+                <p:nvPr/>
+              </p:nvSpPr>
+              <p:spPr>
+                <a:xfrm>
+                  <a:off x="8859790" y="1402050"/>
+                  <a:ext cx="958463" cy="111471"/>
+                </a:xfrm>
+                <a:prstGeom prst="rect">
+                  <a:avLst/>
+                </a:prstGeom>
+              </p:spPr>
+              <p:style>
+                <a:lnRef idx="2">
+                  <a:schemeClr val="accent5">
+                    <a:shade val="50000"/>
+                  </a:schemeClr>
+                </a:lnRef>
+                <a:fillRef idx="1">
+                  <a:schemeClr val="accent5"/>
+                </a:fillRef>
+                <a:effectRef idx="0">
+                  <a:schemeClr val="accent5"/>
+                </a:effectRef>
+                <a:fontRef idx="minor">
+                  <a:schemeClr val="lt1"/>
+                </a:fontRef>
+              </p:style>
+              <p:txBody>
+                <a:bodyPr rtlCol="0" anchor="ctr"/>
+                <a:lstStyle/>
+                <a:p>
+                  <a:pPr algn="ctr"/>
+                  <a:endParaRPr lang="en-GB"/>
+                </a:p>
+              </p:txBody>
+            </p:sp>
+          </p:grpSp>
+          <p:sp>
+            <p:nvSpPr>
+              <p:cNvPr id="54" name="Arrow: Curved Right 53">
+                <a:extLst>
+                  <a:ext uri="{FF2B5EF4-FFF2-40B4-BE49-F238E27FC236}">
+                    <a16:creationId xmlns:a16="http://schemas.microsoft.com/office/drawing/2014/main" id="{BCBEFE5F-1E53-4B58-B3F1-3AD092FE9F8A}"/>
+                  </a:ext>
+                </a:extLst>
+              </p:cNvPr>
+              <p:cNvSpPr/>
+              <p:nvPr/>
+            </p:nvSpPr>
+            <p:spPr>
+              <a:xfrm rot="5400000">
+                <a:off x="10486890" y="1677057"/>
+                <a:ext cx="252000" cy="252000"/>
+              </a:xfrm>
+              <a:prstGeom prst="curvedRightArrow">
+                <a:avLst/>
+              </a:prstGeom>
+            </p:spPr>
+            <p:style>
+              <a:lnRef idx="2">
+                <a:schemeClr val="dk1"/>
+              </a:lnRef>
+              <a:fillRef idx="1">
+                <a:schemeClr val="lt1"/>
+              </a:fillRef>
+              <a:effectRef idx="0">
+                <a:schemeClr val="dk1"/>
+              </a:effectRef>
+              <a:fontRef idx="minor">
+                <a:schemeClr val="dk1"/>
+              </a:fontRef>
+            </p:style>
+            <p:txBody>
+              <a:bodyPr rtlCol="0" anchor="ctr"/>
+              <a:lstStyle/>
+              <a:p>
+                <a:pPr algn="ctr"/>
+                <a:endParaRPr lang="en-GB">
+                  <a:solidFill>
+                    <a:schemeClr val="tx1"/>
+                  </a:solidFill>
+                </a:endParaRPr>
+              </a:p>
+            </p:txBody>
+          </p:sp>
+        </p:grpSp>
+        <p:sp>
+          <p:nvSpPr>
+            <p:cNvPr id="52" name="Arrow: Curved Right 51">
+              <a:extLst>
+                <a:ext uri="{FF2B5EF4-FFF2-40B4-BE49-F238E27FC236}">
+                  <a16:creationId xmlns:a16="http://schemas.microsoft.com/office/drawing/2014/main" id="{AE8F19AB-DD57-4513-837C-5867BA691F0E}"/>
+                </a:ext>
+              </a:extLst>
+            </p:cNvPr>
+            <p:cNvSpPr/>
+            <p:nvPr/>
+          </p:nvSpPr>
+          <p:spPr>
+            <a:xfrm rot="5400000">
+              <a:off x="11127870" y="1683307"/>
+              <a:ext cx="252000" cy="252000"/>
+            </a:xfrm>
+            <a:prstGeom prst="curvedRightArrow">
+              <a:avLst/>
+            </a:prstGeom>
+          </p:spPr>
+          <p:style>
+            <a:lnRef idx="2">
+              <a:schemeClr val="accent4"/>
+            </a:lnRef>
+            <a:fillRef idx="1">
+              <a:schemeClr val="lt1"/>
+            </a:fillRef>
+            <a:effectRef idx="0">
+              <a:schemeClr val="accent4"/>
+            </a:effectRef>
+            <a:fontRef idx="minor">
+              <a:schemeClr val="dk1"/>
+            </a:fontRef>
+          </p:style>
+          <p:txBody>
+            <a:bodyPr rtlCol="0" anchor="ctr"/>
+            <a:lstStyle/>
+            <a:p>
+              <a:pPr algn="ctr"/>
+              <a:endParaRPr lang="en-GB">
+                <a:solidFill>
+                  <a:schemeClr val="tx1"/>
+                </a:solidFill>
+              </a:endParaRPr>
+            </a:p>
+          </p:txBody>
+        </p:sp>
+      </p:grpSp>
     </p:spTree>
     <p:extLst>
       <p:ext uri="{BB962C8B-B14F-4D97-AF65-F5344CB8AC3E}">
@@ -7331,7 +8308,7 @@
 </p:sld>
 </file>
 
-<file path=ppt/slides/slide3.xml><?xml version="1.0" encoding="utf-8"?>
+<file path=ppt/slides/slide9.xml><?xml version="1.0" encoding="utf-8"?>
 <p:sld xmlns:a="http://schemas.openxmlformats.org/drawingml/2006/main" xmlns:r="http://schemas.openxmlformats.org/officeDocument/2006/relationships" xmlns:p="http://schemas.openxmlformats.org/presentationml/2006/main">
   <p:cSld>
     <p:spTree>
@@ -8163,6 +9140,165 @@
           </a:p>
         </p:txBody>
       </p:sp>
+      <p:grpSp>
+        <p:nvGrpSpPr>
+          <p:cNvPr id="6" name="Group 5">
+            <a:extLst>
+              <a:ext uri="{FF2B5EF4-FFF2-40B4-BE49-F238E27FC236}">
+                <a16:creationId xmlns:a16="http://schemas.microsoft.com/office/drawing/2014/main" id="{B124E156-34AF-418F-96C9-817AEFE514E7}"/>
+              </a:ext>
+            </a:extLst>
+          </p:cNvPr>
+          <p:cNvGrpSpPr/>
+          <p:nvPr/>
+        </p:nvGrpSpPr>
+        <p:grpSpPr>
+          <a:xfrm>
+            <a:off x="1947629" y="1015426"/>
+            <a:ext cx="184557" cy="5170502"/>
+            <a:chOff x="1947629" y="969246"/>
+            <a:chExt cx="184557" cy="5170502"/>
+          </a:xfrm>
+        </p:grpSpPr>
+        <p:sp>
+          <p:nvSpPr>
+            <p:cNvPr id="22" name="Arrow: Down 21">
+              <a:extLst>
+                <a:ext uri="{FF2B5EF4-FFF2-40B4-BE49-F238E27FC236}">
+                  <a16:creationId xmlns:a16="http://schemas.microsoft.com/office/drawing/2014/main" id="{68055556-D431-40FE-AB5E-60C51CDAA482}"/>
+                </a:ext>
+              </a:extLst>
+            </p:cNvPr>
+            <p:cNvSpPr/>
+            <p:nvPr/>
+          </p:nvSpPr>
+          <p:spPr>
+            <a:xfrm>
+              <a:off x="1947629" y="969246"/>
+              <a:ext cx="184557" cy="1368000"/>
+            </a:xfrm>
+            <a:prstGeom prst="downArrow">
+              <a:avLst/>
+            </a:prstGeom>
+          </p:spPr>
+          <p:style>
+            <a:lnRef idx="2">
+              <a:schemeClr val="accent3">
+                <a:shade val="50000"/>
+              </a:schemeClr>
+            </a:lnRef>
+            <a:fillRef idx="1">
+              <a:schemeClr val="accent3"/>
+            </a:fillRef>
+            <a:effectRef idx="0">
+              <a:schemeClr val="accent3"/>
+            </a:effectRef>
+            <a:fontRef idx="minor">
+              <a:schemeClr val="lt1"/>
+            </a:fontRef>
+          </p:style>
+          <p:txBody>
+            <a:bodyPr rtlCol="0" anchor="ctr"/>
+            <a:lstStyle/>
+            <a:p>
+              <a:pPr algn="ctr"/>
+              <a:endParaRPr lang="en-GB"/>
+            </a:p>
+          </p:txBody>
+        </p:sp>
+        <p:sp>
+          <p:nvSpPr>
+            <p:cNvPr id="23" name="Arrow: Down 22">
+              <a:extLst>
+                <a:ext uri="{FF2B5EF4-FFF2-40B4-BE49-F238E27FC236}">
+                  <a16:creationId xmlns:a16="http://schemas.microsoft.com/office/drawing/2014/main" id="{410BDBD6-DAA5-49AF-AE95-5380D37D6AE8}"/>
+                </a:ext>
+              </a:extLst>
+            </p:cNvPr>
+            <p:cNvSpPr/>
+            <p:nvPr/>
+          </p:nvSpPr>
+          <p:spPr>
+            <a:xfrm>
+              <a:off x="1947629" y="2839376"/>
+              <a:ext cx="184557" cy="1368000"/>
+            </a:xfrm>
+            <a:prstGeom prst="downArrow">
+              <a:avLst/>
+            </a:prstGeom>
+          </p:spPr>
+          <p:style>
+            <a:lnRef idx="2">
+              <a:schemeClr val="accent3">
+                <a:shade val="50000"/>
+              </a:schemeClr>
+            </a:lnRef>
+            <a:fillRef idx="1">
+              <a:schemeClr val="accent3"/>
+            </a:fillRef>
+            <a:effectRef idx="0">
+              <a:schemeClr val="accent3"/>
+            </a:effectRef>
+            <a:fontRef idx="minor">
+              <a:schemeClr val="lt1"/>
+            </a:fontRef>
+          </p:style>
+          <p:txBody>
+            <a:bodyPr rtlCol="0" anchor="ctr"/>
+            <a:lstStyle/>
+            <a:p>
+              <a:pPr algn="ctr"/>
+              <a:endParaRPr lang="en-GB"/>
+            </a:p>
+          </p:txBody>
+        </p:sp>
+        <p:sp>
+          <p:nvSpPr>
+            <p:cNvPr id="27" name="Arrow: Down 26">
+              <a:extLst>
+                <a:ext uri="{FF2B5EF4-FFF2-40B4-BE49-F238E27FC236}">
+                  <a16:creationId xmlns:a16="http://schemas.microsoft.com/office/drawing/2014/main" id="{90155B68-0903-478D-85D5-8D780126E84A}"/>
+                </a:ext>
+              </a:extLst>
+            </p:cNvPr>
+            <p:cNvSpPr/>
+            <p:nvPr/>
+          </p:nvSpPr>
+          <p:spPr>
+            <a:xfrm>
+              <a:off x="1947629" y="4771748"/>
+              <a:ext cx="184557" cy="1368000"/>
+            </a:xfrm>
+            <a:prstGeom prst="downArrow">
+              <a:avLst/>
+            </a:prstGeom>
+          </p:spPr>
+          <p:style>
+            <a:lnRef idx="2">
+              <a:schemeClr val="accent3">
+                <a:shade val="50000"/>
+              </a:schemeClr>
+            </a:lnRef>
+            <a:fillRef idx="1">
+              <a:schemeClr val="accent3"/>
+            </a:fillRef>
+            <a:effectRef idx="0">
+              <a:schemeClr val="accent3"/>
+            </a:effectRef>
+            <a:fontRef idx="minor">
+              <a:schemeClr val="lt1"/>
+            </a:fontRef>
+          </p:style>
+          <p:txBody>
+            <a:bodyPr rtlCol="0" anchor="ctr"/>
+            <a:lstStyle/>
+            <a:p>
+              <a:pPr algn="ctr"/>
+              <a:endParaRPr lang="en-GB"/>
+            </a:p>
+          </p:txBody>
+        </p:sp>
+      </p:grpSp>
     </p:spTree>
     <p:extLst>
       <p:ext uri="{BB962C8B-B14F-4D97-AF65-F5344CB8AC3E}">

</xml_diff>